<commit_message>
Präsentation Powerpoint als Vorlage für die Summit-Präsentation
</commit_message>
<xml_diff>
--- a/doc/adesso_Template_summIT.pptx
+++ b/doc/adesso_Template_summIT.pptx
@@ -5,11 +5,21 @@
     <p:sldMasterId id="2147483673" r:id="rId4"/>
   </p:sldMasterIdLst>
   <p:notesMasterIdLst>
-    <p:notesMasterId r:id="rId7"/>
+    <p:notesMasterId r:id="rId17"/>
   </p:notesMasterIdLst>
   <p:sldIdLst>
-    <p:sldId id="257" r:id="rId5"/>
-    <p:sldId id="258" r:id="rId6"/>
+    <p:sldId id="259" r:id="rId5"/>
+    <p:sldId id="260" r:id="rId6"/>
+    <p:sldId id="258" r:id="rId7"/>
+    <p:sldId id="261" r:id="rId8"/>
+    <p:sldId id="262" r:id="rId9"/>
+    <p:sldId id="263" r:id="rId10"/>
+    <p:sldId id="267" r:id="rId11"/>
+    <p:sldId id="264" r:id="rId12"/>
+    <p:sldId id="265" r:id="rId13"/>
+    <p:sldId id="268" r:id="rId14"/>
+    <p:sldId id="266" r:id="rId15"/>
+    <p:sldId id="257" r:id="rId16"/>
   </p:sldIdLst>
   <p:sldSz cx="11522075" cy="6480175"/>
   <p:notesSz cx="6858000" cy="9144000"/>
@@ -110,7 +120,7 @@
   </p:defaultTextStyle>
   <p:extLst>
     <p:ext uri="{EFAFB233-063F-42B5-8137-9DF3F51BA10A}">
-      <p15:sldGuideLst xmlns:p15="http://schemas.microsoft.com/office/powerpoint/2012/main" xmlns="">
+      <p15:sldGuideLst xmlns="" xmlns:p15="http://schemas.microsoft.com/office/powerpoint/2012/main">
         <p15:guide id="1" orient="horz" pos="227">
           <p15:clr>
             <a:srgbClr val="A4A3A4"/>
@@ -179,7 +189,7 @@
       </p15:sldGuideLst>
     </p:ext>
     <p:ext uri="{2D200454-40CA-4A62-9FC3-DE9A4176ACB9}">
-      <p15:notesGuideLst xmlns:p15="http://schemas.microsoft.com/office/powerpoint/2012/main" xmlns="">
+      <p15:notesGuideLst xmlns="" xmlns:p15="http://schemas.microsoft.com/office/powerpoint/2012/main">
         <p15:guide id="1" orient="horz" pos="2880">
           <p15:clr>
             <a:srgbClr val="A4A3A4"/>
@@ -278,7 +288,7 @@
           <a:p>
             <a:fld id="{05408900-6234-440B-A027-38F10FF7E2F1}" type="datetimeFigureOut">
               <a:rPr lang="de-DE" smtClean="0"/>
-              <a:t>16.11.2016</a:t>
+              <a:t>21.11.2016</a:t>
             </a:fld>
             <a:endParaRPr lang="de-DE"/>
           </a:p>
@@ -549,6 +559,818 @@
 </p:notesMaster>
 </file>
 
+<file path=ppt/notesSlides/notesSlide1.xml><?xml version="1.0" encoding="utf-8"?>
+<p:notes xmlns:a="http://schemas.openxmlformats.org/drawingml/2006/main" xmlns:r="http://schemas.openxmlformats.org/officeDocument/2006/relationships" xmlns:p="http://schemas.openxmlformats.org/presentationml/2006/main">
+  <p:cSld>
+    <p:spTree>
+      <p:nvGrpSpPr>
+        <p:cNvPr id="1" name=""/>
+        <p:cNvGrpSpPr/>
+        <p:nvPr/>
+      </p:nvGrpSpPr>
+      <p:grpSpPr>
+        <a:xfrm>
+          <a:off x="0" y="0"/>
+          <a:ext cx="0" cy="0"/>
+          <a:chOff x="0" y="0"/>
+          <a:chExt cx="0" cy="0"/>
+        </a:xfrm>
+      </p:grpSpPr>
+      <p:sp>
+        <p:nvSpPr>
+          <p:cNvPr id="2" name="Folienbildplatzhalter 1"/>
+          <p:cNvSpPr>
+            <a:spLocks noGrp="1" noRot="1" noChangeAspect="1"/>
+          </p:cNvSpPr>
+          <p:nvPr>
+            <p:ph type="sldImg"/>
+          </p:nvPr>
+        </p:nvSpPr>
+        <p:spPr/>
+      </p:sp>
+      <p:sp>
+        <p:nvSpPr>
+          <p:cNvPr id="3" name="Notizenplatzhalter 2"/>
+          <p:cNvSpPr>
+            <a:spLocks noGrp="1"/>
+          </p:cNvSpPr>
+          <p:nvPr>
+            <p:ph type="body" idx="1"/>
+          </p:nvPr>
+        </p:nvSpPr>
+        <p:spPr/>
+        <p:txBody>
+          <a:bodyPr/>
+          <a:lstStyle/>
+          <a:p>
+            <a:endParaRPr lang="de-DE" dirty="0"/>
+          </a:p>
+        </p:txBody>
+      </p:sp>
+      <p:sp>
+        <p:nvSpPr>
+          <p:cNvPr id="4" name="Foliennummernplatzhalter 3"/>
+          <p:cNvSpPr>
+            <a:spLocks noGrp="1"/>
+          </p:cNvSpPr>
+          <p:nvPr>
+            <p:ph type="sldNum" sz="quarter" idx="10"/>
+          </p:nvPr>
+        </p:nvSpPr>
+        <p:spPr/>
+        <p:txBody>
+          <a:bodyPr/>
+          <a:lstStyle/>
+          <a:p>
+            <a:fld id="{112C3873-BA08-40A5-BDCC-B6406E6CD40B}" type="slidenum">
+              <a:rPr lang="de-DE" smtClean="0"/>
+              <a:t>1</a:t>
+            </a:fld>
+            <a:endParaRPr lang="de-DE"/>
+          </a:p>
+        </p:txBody>
+      </p:sp>
+    </p:spTree>
+    <p:extLst>
+      <p:ext uri="{BB962C8B-B14F-4D97-AF65-F5344CB8AC3E}">
+        <p14:creationId xmlns:p14="http://schemas.microsoft.com/office/powerpoint/2010/main" val="24594278"/>
+      </p:ext>
+    </p:extLst>
+  </p:cSld>
+  <p:clrMapOvr>
+    <a:masterClrMapping/>
+  </p:clrMapOvr>
+</p:notes>
+</file>
+
+<file path=ppt/notesSlides/notesSlide2.xml><?xml version="1.0" encoding="utf-8"?>
+<p:notes xmlns:a="http://schemas.openxmlformats.org/drawingml/2006/main" xmlns:r="http://schemas.openxmlformats.org/officeDocument/2006/relationships" xmlns:p="http://schemas.openxmlformats.org/presentationml/2006/main">
+  <p:cSld>
+    <p:spTree>
+      <p:nvGrpSpPr>
+        <p:cNvPr id="1" name=""/>
+        <p:cNvGrpSpPr/>
+        <p:nvPr/>
+      </p:nvGrpSpPr>
+      <p:grpSpPr>
+        <a:xfrm>
+          <a:off x="0" y="0"/>
+          <a:ext cx="0" cy="0"/>
+          <a:chOff x="0" y="0"/>
+          <a:chExt cx="0" cy="0"/>
+        </a:xfrm>
+      </p:grpSpPr>
+      <p:sp>
+        <p:nvSpPr>
+          <p:cNvPr id="2" name="Folienbildplatzhalter 1"/>
+          <p:cNvSpPr>
+            <a:spLocks noGrp="1" noRot="1" noChangeAspect="1"/>
+          </p:cNvSpPr>
+          <p:nvPr>
+            <p:ph type="sldImg"/>
+          </p:nvPr>
+        </p:nvSpPr>
+        <p:spPr/>
+      </p:sp>
+      <p:sp>
+        <p:nvSpPr>
+          <p:cNvPr id="3" name="Notizenplatzhalter 2"/>
+          <p:cNvSpPr>
+            <a:spLocks noGrp="1"/>
+          </p:cNvSpPr>
+          <p:nvPr>
+            <p:ph type="body" idx="1"/>
+          </p:nvPr>
+        </p:nvSpPr>
+        <p:spPr/>
+        <p:txBody>
+          <a:bodyPr/>
+          <a:lstStyle/>
+          <a:p>
+            <a:endParaRPr lang="de-DE" dirty="0"/>
+          </a:p>
+        </p:txBody>
+      </p:sp>
+      <p:sp>
+        <p:nvSpPr>
+          <p:cNvPr id="4" name="Foliennummernplatzhalter 3"/>
+          <p:cNvSpPr>
+            <a:spLocks noGrp="1"/>
+          </p:cNvSpPr>
+          <p:nvPr>
+            <p:ph type="sldNum" sz="quarter" idx="10"/>
+          </p:nvPr>
+        </p:nvSpPr>
+        <p:spPr/>
+        <p:txBody>
+          <a:bodyPr/>
+          <a:lstStyle/>
+          <a:p>
+            <a:fld id="{112C3873-BA08-40A5-BDCC-B6406E6CD40B}" type="slidenum">
+              <a:rPr lang="de-DE" smtClean="0"/>
+              <a:t>2</a:t>
+            </a:fld>
+            <a:endParaRPr lang="de-DE"/>
+          </a:p>
+        </p:txBody>
+      </p:sp>
+    </p:spTree>
+    <p:extLst>
+      <p:ext uri="{BB962C8B-B14F-4D97-AF65-F5344CB8AC3E}">
+        <p14:creationId xmlns:p14="http://schemas.microsoft.com/office/powerpoint/2010/main" val="2562422178"/>
+      </p:ext>
+    </p:extLst>
+  </p:cSld>
+  <p:clrMapOvr>
+    <a:masterClrMapping/>
+  </p:clrMapOvr>
+</p:notes>
+</file>
+
+<file path=ppt/notesSlides/notesSlide3.xml><?xml version="1.0" encoding="utf-8"?>
+<p:notes xmlns:a="http://schemas.openxmlformats.org/drawingml/2006/main" xmlns:r="http://schemas.openxmlformats.org/officeDocument/2006/relationships" xmlns:p="http://schemas.openxmlformats.org/presentationml/2006/main">
+  <p:cSld>
+    <p:spTree>
+      <p:nvGrpSpPr>
+        <p:cNvPr id="1" name=""/>
+        <p:cNvGrpSpPr/>
+        <p:nvPr/>
+      </p:nvGrpSpPr>
+      <p:grpSpPr>
+        <a:xfrm>
+          <a:off x="0" y="0"/>
+          <a:ext cx="0" cy="0"/>
+          <a:chOff x="0" y="0"/>
+          <a:chExt cx="0" cy="0"/>
+        </a:xfrm>
+      </p:grpSpPr>
+      <p:sp>
+        <p:nvSpPr>
+          <p:cNvPr id="2" name="Folienbildplatzhalter 1"/>
+          <p:cNvSpPr>
+            <a:spLocks noGrp="1" noRot="1" noChangeAspect="1"/>
+          </p:cNvSpPr>
+          <p:nvPr>
+            <p:ph type="sldImg"/>
+          </p:nvPr>
+        </p:nvSpPr>
+        <p:spPr/>
+      </p:sp>
+      <p:sp>
+        <p:nvSpPr>
+          <p:cNvPr id="3" name="Notizenplatzhalter 2"/>
+          <p:cNvSpPr>
+            <a:spLocks noGrp="1"/>
+          </p:cNvSpPr>
+          <p:nvPr>
+            <p:ph type="body" idx="1"/>
+          </p:nvPr>
+        </p:nvSpPr>
+        <p:spPr/>
+        <p:txBody>
+          <a:bodyPr/>
+          <a:lstStyle/>
+          <a:p>
+            <a:r>
+              <a:rPr lang="de-DE" dirty="0" smtClean="0"/>
+              <a:t>Internet der Dinge, das hat jeder zumindest schon einmal</a:t>
+            </a:r>
+            <a:r>
+              <a:rPr lang="de-DE" baseline="0" dirty="0" smtClean="0"/>
+              <a:t> gehört. </a:t>
+            </a:r>
+          </a:p>
+          <a:p>
+            <a:r>
+              <a:rPr lang="de-DE" baseline="0" dirty="0" smtClean="0"/>
+              <a:t>Der ein oder andere hat damit auch sicher schon etwas zu tun gehabt. </a:t>
+            </a:r>
+          </a:p>
+          <a:p>
+            <a:r>
+              <a:rPr lang="de-DE" baseline="0" dirty="0" smtClean="0"/>
+              <a:t>(Beispiele Smartphone Phillips HUE etc.)</a:t>
+            </a:r>
+          </a:p>
+          <a:p>
+            <a:r>
+              <a:rPr lang="de-DE" baseline="0" dirty="0" smtClean="0"/>
+              <a:t>Wir wollen heute zeigen, wie wir uns dem Thema auf unsere eigene Weise genähert haben.</a:t>
+            </a:r>
+            <a:endParaRPr lang="de-DE" dirty="0"/>
+          </a:p>
+        </p:txBody>
+      </p:sp>
+      <p:sp>
+        <p:nvSpPr>
+          <p:cNvPr id="4" name="Foliennummernplatzhalter 3"/>
+          <p:cNvSpPr>
+            <a:spLocks noGrp="1"/>
+          </p:cNvSpPr>
+          <p:nvPr>
+            <p:ph type="sldNum" sz="quarter" idx="10"/>
+          </p:nvPr>
+        </p:nvSpPr>
+        <p:spPr/>
+        <p:txBody>
+          <a:bodyPr/>
+          <a:lstStyle/>
+          <a:p>
+            <a:fld id="{112C3873-BA08-40A5-BDCC-B6406E6CD40B}" type="slidenum">
+              <a:rPr lang="de-DE" smtClean="0"/>
+              <a:t>3</a:t>
+            </a:fld>
+            <a:endParaRPr lang="de-DE"/>
+          </a:p>
+        </p:txBody>
+      </p:sp>
+    </p:spTree>
+    <p:extLst>
+      <p:ext uri="{BB962C8B-B14F-4D97-AF65-F5344CB8AC3E}">
+        <p14:creationId xmlns:p14="http://schemas.microsoft.com/office/powerpoint/2010/main" val="1427469291"/>
+      </p:ext>
+    </p:extLst>
+  </p:cSld>
+  <p:clrMapOvr>
+    <a:masterClrMapping/>
+  </p:clrMapOvr>
+</p:notes>
+</file>
+
+<file path=ppt/notesSlides/notesSlide4.xml><?xml version="1.0" encoding="utf-8"?>
+<p:notes xmlns:a="http://schemas.openxmlformats.org/drawingml/2006/main" xmlns:r="http://schemas.openxmlformats.org/officeDocument/2006/relationships" xmlns:p="http://schemas.openxmlformats.org/presentationml/2006/main">
+  <p:cSld>
+    <p:spTree>
+      <p:nvGrpSpPr>
+        <p:cNvPr id="1" name=""/>
+        <p:cNvGrpSpPr/>
+        <p:nvPr/>
+      </p:nvGrpSpPr>
+      <p:grpSpPr>
+        <a:xfrm>
+          <a:off x="0" y="0"/>
+          <a:ext cx="0" cy="0"/>
+          <a:chOff x="0" y="0"/>
+          <a:chExt cx="0" cy="0"/>
+        </a:xfrm>
+      </p:grpSpPr>
+      <p:sp>
+        <p:nvSpPr>
+          <p:cNvPr id="2" name="Folienbildplatzhalter 1"/>
+          <p:cNvSpPr>
+            <a:spLocks noGrp="1" noRot="1" noChangeAspect="1"/>
+          </p:cNvSpPr>
+          <p:nvPr>
+            <p:ph type="sldImg"/>
+          </p:nvPr>
+        </p:nvSpPr>
+        <p:spPr/>
+      </p:sp>
+      <p:sp>
+        <p:nvSpPr>
+          <p:cNvPr id="3" name="Notizenplatzhalter 2"/>
+          <p:cNvSpPr>
+            <a:spLocks noGrp="1"/>
+          </p:cNvSpPr>
+          <p:nvPr>
+            <p:ph type="body" idx="1"/>
+          </p:nvPr>
+        </p:nvSpPr>
+        <p:spPr/>
+        <p:txBody>
+          <a:bodyPr/>
+          <a:lstStyle/>
+          <a:p>
+            <a:r>
+              <a:rPr lang="de-DE" dirty="0" smtClean="0"/>
+              <a:t>Wir arbeiten seit</a:t>
+            </a:r>
+            <a:r>
+              <a:rPr lang="de-DE" baseline="0" dirty="0" smtClean="0"/>
+              <a:t> einiger Zeit am </a:t>
+            </a:r>
+            <a:r>
+              <a:rPr lang="de-DE" baseline="0" dirty="0" err="1" smtClean="0"/>
+              <a:t>Symphony</a:t>
+            </a:r>
+            <a:r>
+              <a:rPr lang="de-DE" baseline="0" dirty="0" smtClean="0"/>
+              <a:t>-Projekt.</a:t>
+            </a:r>
+          </a:p>
+          <a:p>
+            <a:r>
+              <a:rPr lang="de-DE" baseline="0" dirty="0" smtClean="0"/>
+              <a:t>Immer wieder gab es Versatz zwischen Frontend-Implementierung und API.</a:t>
+            </a:r>
+          </a:p>
+          <a:p>
+            <a:r>
+              <a:rPr lang="de-DE" baseline="0" dirty="0" smtClean="0"/>
+              <a:t>Um das Frontend mit Daten von einer noch nicht vorhandenen Schnittstelle zu Versorgen haben wir einen </a:t>
+            </a:r>
+            <a:r>
+              <a:rPr lang="de-DE" baseline="0" dirty="0" err="1" smtClean="0"/>
+              <a:t>MockUp</a:t>
+            </a:r>
+            <a:r>
+              <a:rPr lang="de-DE" baseline="0" dirty="0" smtClean="0"/>
+              <a:t>-Tunnel eingebaut.</a:t>
+            </a:r>
+          </a:p>
+          <a:p>
+            <a:r>
+              <a:rPr lang="de-DE" baseline="0" dirty="0" smtClean="0"/>
+              <a:t>Entsprechend der Philosophie des Rapid-</a:t>
+            </a:r>
+            <a:r>
+              <a:rPr lang="de-DE" baseline="0" dirty="0" err="1" smtClean="0"/>
+              <a:t>Prototyping</a:t>
+            </a:r>
+            <a:r>
+              <a:rPr lang="de-DE" baseline="0" dirty="0" smtClean="0"/>
+              <a:t> kann der Tunnel die Zukünftige API mittels </a:t>
+            </a:r>
+            <a:r>
+              <a:rPr lang="de-DE" baseline="0" dirty="0" err="1" smtClean="0"/>
+              <a:t>NodeJS</a:t>
+            </a:r>
+            <a:r>
+              <a:rPr lang="de-DE" baseline="0" dirty="0" smtClean="0"/>
+              <a:t> und Express anbieten.</a:t>
+            </a:r>
+          </a:p>
+          <a:p>
+            <a:r>
+              <a:rPr lang="de-DE" baseline="0" dirty="0" smtClean="0"/>
+              <a:t>Die einfache Implementierung von kleinen Features hat uns zunächst beeindruckt.</a:t>
+            </a:r>
+          </a:p>
+          <a:p>
+            <a:r>
+              <a:rPr lang="de-DE" baseline="0" dirty="0" smtClean="0"/>
+              <a:t>Und dann siegt der Spieltrieb…</a:t>
+            </a:r>
+          </a:p>
+          <a:p>
+            <a:endParaRPr lang="de-DE" dirty="0"/>
+          </a:p>
+        </p:txBody>
+      </p:sp>
+      <p:sp>
+        <p:nvSpPr>
+          <p:cNvPr id="4" name="Foliennummernplatzhalter 3"/>
+          <p:cNvSpPr>
+            <a:spLocks noGrp="1"/>
+          </p:cNvSpPr>
+          <p:nvPr>
+            <p:ph type="sldNum" sz="quarter" idx="10"/>
+          </p:nvPr>
+        </p:nvSpPr>
+        <p:spPr/>
+        <p:txBody>
+          <a:bodyPr/>
+          <a:lstStyle/>
+          <a:p>
+            <a:fld id="{112C3873-BA08-40A5-BDCC-B6406E6CD40B}" type="slidenum">
+              <a:rPr lang="de-DE" smtClean="0"/>
+              <a:t>4</a:t>
+            </a:fld>
+            <a:endParaRPr lang="de-DE"/>
+          </a:p>
+        </p:txBody>
+      </p:sp>
+    </p:spTree>
+    <p:extLst>
+      <p:ext uri="{BB962C8B-B14F-4D97-AF65-F5344CB8AC3E}">
+        <p14:creationId xmlns:p14="http://schemas.microsoft.com/office/powerpoint/2010/main" val="3743490821"/>
+      </p:ext>
+    </p:extLst>
+  </p:cSld>
+  <p:clrMapOvr>
+    <a:masterClrMapping/>
+  </p:clrMapOvr>
+</p:notes>
+</file>
+
+<file path=ppt/notesSlides/notesSlide5.xml><?xml version="1.0" encoding="utf-8"?>
+<p:notes xmlns:a="http://schemas.openxmlformats.org/drawingml/2006/main" xmlns:r="http://schemas.openxmlformats.org/officeDocument/2006/relationships" xmlns:p="http://schemas.openxmlformats.org/presentationml/2006/main">
+  <p:cSld>
+    <p:spTree>
+      <p:nvGrpSpPr>
+        <p:cNvPr id="1" name=""/>
+        <p:cNvGrpSpPr/>
+        <p:nvPr/>
+      </p:nvGrpSpPr>
+      <p:grpSpPr>
+        <a:xfrm>
+          <a:off x="0" y="0"/>
+          <a:ext cx="0" cy="0"/>
+          <a:chOff x="0" y="0"/>
+          <a:chExt cx="0" cy="0"/>
+        </a:xfrm>
+      </p:grpSpPr>
+      <p:sp>
+        <p:nvSpPr>
+          <p:cNvPr id="2" name="Folienbildplatzhalter 1"/>
+          <p:cNvSpPr>
+            <a:spLocks noGrp="1" noRot="1" noChangeAspect="1"/>
+          </p:cNvSpPr>
+          <p:nvPr>
+            <p:ph type="sldImg"/>
+          </p:nvPr>
+        </p:nvSpPr>
+        <p:spPr/>
+      </p:sp>
+      <p:sp>
+        <p:nvSpPr>
+          <p:cNvPr id="3" name="Notizenplatzhalter 2"/>
+          <p:cNvSpPr>
+            <a:spLocks noGrp="1"/>
+          </p:cNvSpPr>
+          <p:nvPr>
+            <p:ph type="body" idx="1"/>
+          </p:nvPr>
+        </p:nvSpPr>
+        <p:spPr/>
+        <p:txBody>
+          <a:bodyPr/>
+          <a:lstStyle/>
+          <a:p>
+            <a:r>
+              <a:rPr lang="de-DE" dirty="0" smtClean="0"/>
+              <a:t>Wichtig aus der heutigen Perspektive sind zwei</a:t>
+            </a:r>
+            <a:r>
+              <a:rPr lang="de-DE" baseline="0" dirty="0" smtClean="0"/>
+              <a:t> Dinge:</a:t>
+            </a:r>
+          </a:p>
+          <a:p>
+            <a:r>
+              <a:rPr lang="de-DE" baseline="0" dirty="0" smtClean="0"/>
+              <a:t>Neugier und Spaß an blankem Metall (konkreter: Hardware und C)</a:t>
+            </a:r>
+          </a:p>
+          <a:p>
+            <a:r>
+              <a:rPr lang="de-DE" baseline="0" dirty="0" smtClean="0"/>
+              <a:t>#TODO</a:t>
+            </a:r>
+          </a:p>
+          <a:p>
+            <a:endParaRPr lang="de-DE" dirty="0"/>
+          </a:p>
+        </p:txBody>
+      </p:sp>
+      <p:sp>
+        <p:nvSpPr>
+          <p:cNvPr id="4" name="Foliennummernplatzhalter 3"/>
+          <p:cNvSpPr>
+            <a:spLocks noGrp="1"/>
+          </p:cNvSpPr>
+          <p:nvPr>
+            <p:ph type="sldNum" sz="quarter" idx="10"/>
+          </p:nvPr>
+        </p:nvSpPr>
+        <p:spPr/>
+        <p:txBody>
+          <a:bodyPr/>
+          <a:lstStyle/>
+          <a:p>
+            <a:fld id="{112C3873-BA08-40A5-BDCC-B6406E6CD40B}" type="slidenum">
+              <a:rPr lang="de-DE" smtClean="0"/>
+              <a:t>5</a:t>
+            </a:fld>
+            <a:endParaRPr lang="de-DE"/>
+          </a:p>
+        </p:txBody>
+      </p:sp>
+    </p:spTree>
+    <p:extLst>
+      <p:ext uri="{BB962C8B-B14F-4D97-AF65-F5344CB8AC3E}">
+        <p14:creationId xmlns:p14="http://schemas.microsoft.com/office/powerpoint/2010/main" val="3743490821"/>
+      </p:ext>
+    </p:extLst>
+  </p:cSld>
+  <p:clrMapOvr>
+    <a:masterClrMapping/>
+  </p:clrMapOvr>
+</p:notes>
+</file>
+
+<file path=ppt/notesSlides/notesSlide6.xml><?xml version="1.0" encoding="utf-8"?>
+<p:notes xmlns:a="http://schemas.openxmlformats.org/drawingml/2006/main" xmlns:r="http://schemas.openxmlformats.org/officeDocument/2006/relationships" xmlns:p="http://schemas.openxmlformats.org/presentationml/2006/main">
+  <p:cSld>
+    <p:spTree>
+      <p:nvGrpSpPr>
+        <p:cNvPr id="1" name=""/>
+        <p:cNvGrpSpPr/>
+        <p:nvPr/>
+      </p:nvGrpSpPr>
+      <p:grpSpPr>
+        <a:xfrm>
+          <a:off x="0" y="0"/>
+          <a:ext cx="0" cy="0"/>
+          <a:chOff x="0" y="0"/>
+          <a:chExt cx="0" cy="0"/>
+        </a:xfrm>
+      </p:grpSpPr>
+      <p:sp>
+        <p:nvSpPr>
+          <p:cNvPr id="2" name="Folienbildplatzhalter 1"/>
+          <p:cNvSpPr>
+            <a:spLocks noGrp="1" noRot="1" noChangeAspect="1"/>
+          </p:cNvSpPr>
+          <p:nvPr>
+            <p:ph type="sldImg"/>
+          </p:nvPr>
+        </p:nvSpPr>
+        <p:spPr/>
+      </p:sp>
+      <p:sp>
+        <p:nvSpPr>
+          <p:cNvPr id="3" name="Notizenplatzhalter 2"/>
+          <p:cNvSpPr>
+            <a:spLocks noGrp="1"/>
+          </p:cNvSpPr>
+          <p:nvPr>
+            <p:ph type="body" idx="1"/>
+          </p:nvPr>
+        </p:nvSpPr>
+        <p:spPr/>
+        <p:txBody>
+          <a:bodyPr/>
+          <a:lstStyle/>
+          <a:p>
+            <a:r>
+              <a:rPr lang="de-DE" dirty="0" smtClean="0"/>
+              <a:t>Wichtig aus der heutigen Perspektive sind zwei</a:t>
+            </a:r>
+            <a:r>
+              <a:rPr lang="de-DE" baseline="0" dirty="0" smtClean="0"/>
+              <a:t> Dinge:</a:t>
+            </a:r>
+          </a:p>
+          <a:p>
+            <a:r>
+              <a:rPr lang="de-DE" baseline="0" dirty="0" smtClean="0"/>
+              <a:t>Neugier und Spaß an blankem Metall (konkreter: Hardware und C)</a:t>
+            </a:r>
+          </a:p>
+          <a:p>
+            <a:endParaRPr lang="de-DE" dirty="0"/>
+          </a:p>
+        </p:txBody>
+      </p:sp>
+      <p:sp>
+        <p:nvSpPr>
+          <p:cNvPr id="4" name="Foliennummernplatzhalter 3"/>
+          <p:cNvSpPr>
+            <a:spLocks noGrp="1"/>
+          </p:cNvSpPr>
+          <p:nvPr>
+            <p:ph type="sldNum" sz="quarter" idx="10"/>
+          </p:nvPr>
+        </p:nvSpPr>
+        <p:spPr/>
+        <p:txBody>
+          <a:bodyPr/>
+          <a:lstStyle/>
+          <a:p>
+            <a:fld id="{112C3873-BA08-40A5-BDCC-B6406E6CD40B}" type="slidenum">
+              <a:rPr lang="de-DE" smtClean="0"/>
+              <a:t>6</a:t>
+            </a:fld>
+            <a:endParaRPr lang="de-DE"/>
+          </a:p>
+        </p:txBody>
+      </p:sp>
+    </p:spTree>
+    <p:extLst>
+      <p:ext uri="{BB962C8B-B14F-4D97-AF65-F5344CB8AC3E}">
+        <p14:creationId xmlns:p14="http://schemas.microsoft.com/office/powerpoint/2010/main" val="3743490821"/>
+      </p:ext>
+    </p:extLst>
+  </p:cSld>
+  <p:clrMapOvr>
+    <a:masterClrMapping/>
+  </p:clrMapOvr>
+</p:notes>
+</file>
+
+<file path=ppt/notesSlides/notesSlide7.xml><?xml version="1.0" encoding="utf-8"?>
+<p:notes xmlns:a="http://schemas.openxmlformats.org/drawingml/2006/main" xmlns:r="http://schemas.openxmlformats.org/officeDocument/2006/relationships" xmlns:p="http://schemas.openxmlformats.org/presentationml/2006/main">
+  <p:cSld>
+    <p:spTree>
+      <p:nvGrpSpPr>
+        <p:cNvPr id="1" name=""/>
+        <p:cNvGrpSpPr/>
+        <p:nvPr/>
+      </p:nvGrpSpPr>
+      <p:grpSpPr>
+        <a:xfrm>
+          <a:off x="0" y="0"/>
+          <a:ext cx="0" cy="0"/>
+          <a:chOff x="0" y="0"/>
+          <a:chExt cx="0" cy="0"/>
+        </a:xfrm>
+      </p:grpSpPr>
+      <p:sp>
+        <p:nvSpPr>
+          <p:cNvPr id="2" name="Folienbildplatzhalter 1"/>
+          <p:cNvSpPr>
+            <a:spLocks noGrp="1" noRot="1" noChangeAspect="1"/>
+          </p:cNvSpPr>
+          <p:nvPr>
+            <p:ph type="sldImg"/>
+          </p:nvPr>
+        </p:nvSpPr>
+        <p:spPr/>
+      </p:sp>
+      <p:sp>
+        <p:nvSpPr>
+          <p:cNvPr id="3" name="Notizenplatzhalter 2"/>
+          <p:cNvSpPr>
+            <a:spLocks noGrp="1"/>
+          </p:cNvSpPr>
+          <p:nvPr>
+            <p:ph type="body" idx="1"/>
+          </p:nvPr>
+        </p:nvSpPr>
+        <p:spPr/>
+        <p:txBody>
+          <a:bodyPr/>
+          <a:lstStyle/>
+          <a:p>
+            <a:endParaRPr lang="de-DE" dirty="0"/>
+          </a:p>
+        </p:txBody>
+      </p:sp>
+      <p:sp>
+        <p:nvSpPr>
+          <p:cNvPr id="4" name="Foliennummernplatzhalter 3"/>
+          <p:cNvSpPr>
+            <a:spLocks noGrp="1"/>
+          </p:cNvSpPr>
+          <p:nvPr>
+            <p:ph type="sldNum" sz="quarter" idx="10"/>
+          </p:nvPr>
+        </p:nvSpPr>
+        <p:spPr/>
+        <p:txBody>
+          <a:bodyPr/>
+          <a:lstStyle/>
+          <a:p>
+            <a:fld id="{112C3873-BA08-40A5-BDCC-B6406E6CD40B}" type="slidenum">
+              <a:rPr lang="de-DE" smtClean="0"/>
+              <a:t>8</a:t>
+            </a:fld>
+            <a:endParaRPr lang="de-DE"/>
+          </a:p>
+        </p:txBody>
+      </p:sp>
+    </p:spTree>
+    <p:extLst>
+      <p:ext uri="{BB962C8B-B14F-4D97-AF65-F5344CB8AC3E}">
+        <p14:creationId xmlns:p14="http://schemas.microsoft.com/office/powerpoint/2010/main" val="3242249222"/>
+      </p:ext>
+    </p:extLst>
+  </p:cSld>
+  <p:clrMapOvr>
+    <a:masterClrMapping/>
+  </p:clrMapOvr>
+</p:notes>
+</file>
+
+<file path=ppt/notesSlides/notesSlide8.xml><?xml version="1.0" encoding="utf-8"?>
+<p:notes xmlns:a="http://schemas.openxmlformats.org/drawingml/2006/main" xmlns:r="http://schemas.openxmlformats.org/officeDocument/2006/relationships" xmlns:p="http://schemas.openxmlformats.org/presentationml/2006/main">
+  <p:cSld>
+    <p:spTree>
+      <p:nvGrpSpPr>
+        <p:cNvPr id="1" name=""/>
+        <p:cNvGrpSpPr/>
+        <p:nvPr/>
+      </p:nvGrpSpPr>
+      <p:grpSpPr>
+        <a:xfrm>
+          <a:off x="0" y="0"/>
+          <a:ext cx="0" cy="0"/>
+          <a:chOff x="0" y="0"/>
+          <a:chExt cx="0" cy="0"/>
+        </a:xfrm>
+      </p:grpSpPr>
+      <p:sp>
+        <p:nvSpPr>
+          <p:cNvPr id="2" name="Folienbildplatzhalter 1"/>
+          <p:cNvSpPr>
+            <a:spLocks noGrp="1" noRot="1" noChangeAspect="1"/>
+          </p:cNvSpPr>
+          <p:nvPr>
+            <p:ph type="sldImg"/>
+          </p:nvPr>
+        </p:nvSpPr>
+        <p:spPr/>
+      </p:sp>
+      <p:sp>
+        <p:nvSpPr>
+          <p:cNvPr id="3" name="Notizenplatzhalter 2"/>
+          <p:cNvSpPr>
+            <a:spLocks noGrp="1"/>
+          </p:cNvSpPr>
+          <p:nvPr>
+            <p:ph type="body" idx="1"/>
+          </p:nvPr>
+        </p:nvSpPr>
+        <p:spPr/>
+        <p:txBody>
+          <a:bodyPr/>
+          <a:lstStyle/>
+          <a:p>
+            <a:r>
+              <a:rPr lang="de-DE" dirty="0" smtClean="0"/>
+              <a:t>Diese Daten werden während der Demo angezeigt um den Zuschauern den Login zu ermöglichen</a:t>
+            </a:r>
+            <a:endParaRPr lang="de-DE" dirty="0"/>
+          </a:p>
+        </p:txBody>
+      </p:sp>
+      <p:sp>
+        <p:nvSpPr>
+          <p:cNvPr id="4" name="Foliennummernplatzhalter 3"/>
+          <p:cNvSpPr>
+            <a:spLocks noGrp="1"/>
+          </p:cNvSpPr>
+          <p:nvPr>
+            <p:ph type="sldNum" sz="quarter" idx="10"/>
+          </p:nvPr>
+        </p:nvSpPr>
+        <p:spPr/>
+        <p:txBody>
+          <a:bodyPr/>
+          <a:lstStyle/>
+          <a:p>
+            <a:fld id="{112C3873-BA08-40A5-BDCC-B6406E6CD40B}" type="slidenum">
+              <a:rPr lang="de-DE" smtClean="0"/>
+              <a:t>9</a:t>
+            </a:fld>
+            <a:endParaRPr lang="de-DE"/>
+          </a:p>
+        </p:txBody>
+      </p:sp>
+    </p:spTree>
+    <p:extLst>
+      <p:ext uri="{BB962C8B-B14F-4D97-AF65-F5344CB8AC3E}">
+        <p14:creationId xmlns:p14="http://schemas.microsoft.com/office/powerpoint/2010/main" val="2844586462"/>
+      </p:ext>
+    </p:extLst>
+  </p:cSld>
+  <p:clrMapOvr>
+    <a:masterClrMapping/>
+  </p:clrMapOvr>
+</p:notes>
+</file>
+
 <file path=ppt/slideLayouts/slideLayout1.xml><?xml version="1.0" encoding="utf-8"?>
 <p:sldLayout xmlns:a="http://schemas.openxmlformats.org/drawingml/2006/main" xmlns:r="http://schemas.openxmlformats.org/officeDocument/2006/relationships" xmlns:p="http://schemas.openxmlformats.org/presentationml/2006/main" preserve="1" userDrawn="1">
   <p:cSld name="Titelfolie">
@@ -1158,7 +1980,7 @@
           <a:p>
             <a:fld id="{3B23B96D-9616-4176-AEF6-AF1317711023}" type="datetime1">
               <a:rPr lang="de-DE" smtClean="0"/>
-              <a:t>16.11.2016</a:t>
+              <a:t>21.11.2016</a:t>
             </a:fld>
             <a:endParaRPr lang="de-DE"/>
           </a:p>
@@ -1338,7 +2160,7 @@
           <a:p>
             <a:fld id="{0D71886E-8C9D-4E97-9EB5-D99BA89A8533}" type="datetime1">
               <a:rPr lang="de-DE" smtClean="0"/>
-              <a:t>16.11.2016</a:t>
+              <a:t>21.11.2016</a:t>
             </a:fld>
             <a:endParaRPr lang="de-DE"/>
           </a:p>
@@ -1480,7 +2302,7 @@
           <a:p>
             <a:fld id="{8DBF69B3-62E3-4AF4-971E-1AB7F9FB69DD}" type="datetime1">
               <a:rPr lang="de-DE" smtClean="0"/>
-              <a:t>16.11.2016</a:t>
+              <a:t>21.11.2016</a:t>
             </a:fld>
             <a:endParaRPr lang="de-DE"/>
           </a:p>
@@ -1772,7 +2594,7 @@
           <a:p>
             <a:fld id="{F898127A-2E85-486B-8AA5-E90E3CCEC0E9}" type="datetime1">
               <a:rPr lang="de-DE" smtClean="0"/>
-              <a:t>16.11.2016</a:t>
+              <a:t>21.11.2016</a:t>
             </a:fld>
             <a:endParaRPr lang="de-DE"/>
           </a:p>
@@ -2416,7 +3238,7 @@
           <a:p>
             <a:fld id="{A4FEDFCE-8709-4D76-8036-EE5278C2237F}" type="datetime1">
               <a:rPr lang="de-DE" smtClean="0"/>
-              <a:t>16.11.2016</a:t>
+              <a:t>21.11.2016</a:t>
             </a:fld>
             <a:endParaRPr lang="de-DE"/>
           </a:p>
@@ -2551,7 +3373,7 @@
           <a:p>
             <a:fld id="{48352B5A-167D-4ED6-B7C9-BDA647A8BA51}" type="datetime1">
               <a:rPr lang="de-DE" smtClean="0"/>
-              <a:t>16.11.2016</a:t>
+              <a:t>21.11.2016</a:t>
             </a:fld>
             <a:endParaRPr lang="de-DE"/>
           </a:p>
@@ -2753,7 +3575,7 @@
           <a:p>
             <a:fld id="{F782B8C6-A2A3-4B66-A839-DF7B16517350}" type="datetime1">
               <a:rPr lang="de-DE" smtClean="0"/>
-              <a:t>16.11.2016</a:t>
+              <a:t>21.11.2016</a:t>
             </a:fld>
             <a:endParaRPr lang="de-DE"/>
           </a:p>
@@ -3156,7 +3978,7 @@
           <a:p>
             <a:fld id="{649D13A7-6296-4A54-8C64-66A02EB71342}" type="datetime1">
               <a:rPr lang="de-DE" smtClean="0"/>
-              <a:t>16.11.2016</a:t>
+              <a:t>21.11.2016</a:t>
             </a:fld>
             <a:endParaRPr lang="de-DE"/>
           </a:p>
@@ -3707,7 +4529,7 @@
           <a:p>
             <a:fld id="{ED7E8129-6AB0-4316-89DD-05AD9ABD1F9D}" type="datetime1">
               <a:rPr lang="de-DE" smtClean="0"/>
-              <a:t>16.11.2016</a:t>
+              <a:t>21.11.2016</a:t>
             </a:fld>
             <a:endParaRPr lang="de-DE"/>
           </a:p>
@@ -3832,7 +4654,7 @@
           <a:p>
             <a:fld id="{4FD0AE75-8AA0-449D-989F-B1E818A5B67A}" type="datetime1">
               <a:rPr lang="de-DE" smtClean="0"/>
-              <a:t>16.11.2016</a:t>
+              <a:t>21.11.2016</a:t>
             </a:fld>
             <a:endParaRPr lang="de-DE"/>
           </a:p>
@@ -3927,7 +4749,7 @@
           <a:p>
             <a:fld id="{455D07A7-0ED1-4138-9FBD-0F4825E4365D}" type="datetime1">
               <a:rPr lang="de-DE" smtClean="0"/>
-              <a:t>16.11.2016</a:t>
+              <a:t>21.11.2016</a:t>
             </a:fld>
             <a:endParaRPr lang="de-DE"/>
           </a:p>
@@ -4022,7 +4844,7 @@
           <a:p>
             <a:fld id="{6A743ADA-15EC-46F2-B124-7B3EABB341FC}" type="datetime1">
               <a:rPr lang="de-DE" smtClean="0"/>
-              <a:t>16.11.2016</a:t>
+              <a:t>21.11.2016</a:t>
             </a:fld>
             <a:endParaRPr lang="de-DE"/>
           </a:p>
@@ -4445,7 +5267,7 @@
           <a:p>
             <a:fld id="{34F16289-DF57-4F0A-9158-80987495B444}" type="datetime1">
               <a:rPr lang="de-DE" smtClean="0"/>
-              <a:t>16.11.2016</a:t>
+              <a:t>21.11.2016</a:t>
             </a:fld>
             <a:endParaRPr lang="de-DE"/>
           </a:p>
@@ -4682,7 +5504,7 @@
           <a:p>
             <a:fld id="{30694A65-3AA1-42B9-B750-09273D0D99B8}" type="datetime1">
               <a:rPr lang="de-DE" smtClean="0"/>
-              <a:t>16.11.2016</a:t>
+              <a:t>21.11.2016</a:t>
             </a:fld>
             <a:endParaRPr lang="de-DE"/>
           </a:p>
@@ -5267,6 +6089,242 @@
           <a:chExt cx="0" cy="0"/>
         </a:xfrm>
       </p:grpSpPr>
+      <p:pic>
+        <p:nvPicPr>
+          <p:cNvPr id="6" name="Bildplatzhalter 5"/>
+          <p:cNvPicPr>
+            <a:picLocks noGrp="1" noChangeAspect="1"/>
+          </p:cNvPicPr>
+          <p:nvPr>
+            <p:ph type="pic" sz="quarter" idx="14"/>
+          </p:nvPr>
+        </p:nvPicPr>
+        <p:blipFill>
+          <a:blip r:embed="rId3">
+            <a:extLst>
+              <a:ext uri="{28A0092B-C50C-407E-A947-70E740481C1C}">
+                <a14:useLocalDpi xmlns:a14="http://schemas.microsoft.com/office/drawing/2010/main" val="0"/>
+              </a:ext>
+            </a:extLst>
+          </a:blip>
+          <a:stretch>
+            <a:fillRect/>
+          </a:stretch>
+        </p:blipFill>
+        <p:spPr>
+          <a:xfrm>
+            <a:off x="621301" y="2087563"/>
+            <a:ext cx="10026458" cy="4167543"/>
+          </a:xfrm>
+          <a:prstGeom prst="rect">
+            <a:avLst/>
+          </a:prstGeom>
+          <a:ln>
+            <a:noFill/>
+          </a:ln>
+          <a:effectLst>
+            <a:outerShdw blurRad="292100" dist="139700" dir="2700000" algn="tl" rotWithShape="0">
+              <a:srgbClr val="333333">
+                <a:alpha val="65000"/>
+              </a:srgbClr>
+            </a:outerShdw>
+          </a:effectLst>
+        </p:spPr>
+      </p:pic>
+      <p:sp>
+        <p:nvSpPr>
+          <p:cNvPr id="3" name="Untertitel 2"/>
+          <p:cNvSpPr>
+            <a:spLocks noGrp="1"/>
+          </p:cNvSpPr>
+          <p:nvPr>
+            <p:ph type="subTitle" idx="1"/>
+          </p:nvPr>
+        </p:nvSpPr>
+        <p:spPr/>
+        <p:txBody>
+          <a:bodyPr/>
+          <a:lstStyle/>
+          <a:p>
+            <a:r>
+              <a:rPr lang="de-DE" dirty="0"/>
+              <a:t>mit Jan und Torben</a:t>
+            </a:r>
+          </a:p>
+        </p:txBody>
+      </p:sp>
+      <p:sp>
+        <p:nvSpPr>
+          <p:cNvPr id="4" name="Titel 3"/>
+          <p:cNvSpPr>
+            <a:spLocks noGrp="1"/>
+          </p:cNvSpPr>
+          <p:nvPr>
+            <p:ph type="ctrTitle"/>
+          </p:nvPr>
+        </p:nvSpPr>
+        <p:spPr/>
+        <p:txBody>
+          <a:bodyPr/>
+          <a:lstStyle/>
+          <a:p>
+            <a:r>
+              <a:rPr lang="de-DE" dirty="0" smtClean="0"/>
+              <a:t>Verrückte </a:t>
+            </a:r>
+            <a:r>
+              <a:rPr lang="de-DE" dirty="0" err="1" smtClean="0"/>
+              <a:t>IoT</a:t>
+            </a:r>
+            <a:r>
+              <a:rPr lang="de-DE" dirty="0" smtClean="0"/>
+              <a:t>-Live-Demo</a:t>
+            </a:r>
+            <a:endParaRPr lang="de-DE" dirty="0"/>
+          </a:p>
+        </p:txBody>
+      </p:sp>
+      <p:sp>
+        <p:nvSpPr>
+          <p:cNvPr id="5" name="Textplatzhalter 4"/>
+          <p:cNvSpPr>
+            <a:spLocks noGrp="1"/>
+          </p:cNvSpPr>
+          <p:nvPr>
+            <p:ph type="body" sz="quarter" idx="13"/>
+          </p:nvPr>
+        </p:nvSpPr>
+        <p:spPr>
+          <a:xfrm>
+            <a:off x="792163" y="2340000"/>
+            <a:ext cx="4536826" cy="648146"/>
+          </a:xfrm>
+        </p:spPr>
+        <p:txBody>
+          <a:bodyPr/>
+          <a:lstStyle/>
+          <a:p>
+            <a:r>
+              <a:rPr lang="de-DE" b="1" dirty="0" smtClean="0"/>
+              <a:t>Im </a:t>
+            </a:r>
+            <a:r>
+              <a:rPr lang="de-DE" b="1" dirty="0"/>
+              <a:t>Fokus stehen </a:t>
+            </a:r>
+            <a:r>
+              <a:rPr lang="de-DE" b="1" dirty="0" smtClean="0"/>
+              <a:t>Interaktion mit </a:t>
+            </a:r>
+            <a:r>
+              <a:rPr lang="de-DE" b="1" dirty="0"/>
+              <a:t>REST-APIs und Node.js.</a:t>
+            </a:r>
+            <a:endParaRPr lang="de-DE" dirty="0"/>
+          </a:p>
+        </p:txBody>
+      </p:sp>
+      <p:pic>
+        <p:nvPicPr>
+          <p:cNvPr id="7" name="Picture 2"/>
+          <p:cNvPicPr>
+            <a:picLocks noChangeAspect="1" noChangeArrowheads="1"/>
+          </p:cNvPicPr>
+          <p:nvPr/>
+        </p:nvPicPr>
+        <p:blipFill>
+          <a:blip r:embed="rId4" cstate="print">
+            <a:extLst>
+              <a:ext uri="{28A0092B-C50C-407E-A947-70E740481C1C}">
+                <a14:useLocalDpi xmlns:a14="http://schemas.microsoft.com/office/drawing/2010/main" val="0"/>
+              </a:ext>
+            </a:extLst>
+          </a:blip>
+          <a:srcRect/>
+          <a:stretch>
+            <a:fillRect/>
+          </a:stretch>
+        </p:blipFill>
+        <p:spPr bwMode="auto">
+          <a:xfrm>
+            <a:off x="6337101" y="2303983"/>
+            <a:ext cx="1639342" cy="1639342"/>
+          </a:xfrm>
+          <a:prstGeom prst="rect">
+            <a:avLst/>
+          </a:prstGeom>
+          <a:noFill/>
+          <a:ln>
+            <a:noFill/>
+          </a:ln>
+          <a:effectLst/>
+          <a:extLst>
+            <a:ext uri="{909E8E84-426E-40DD-AFC4-6F175D3DCCD1}">
+              <a14:hiddenFill xmlns:a14="http://schemas.microsoft.com/office/drawing/2010/main">
+                <a:solidFill>
+                  <a:schemeClr val="accent1"/>
+                </a:solidFill>
+              </a14:hiddenFill>
+            </a:ext>
+            <a:ext uri="{91240B29-F687-4F45-9708-019B960494DF}">
+              <a14:hiddenLine xmlns:a14="http://schemas.microsoft.com/office/drawing/2010/main" w="9525">
+                <a:solidFill>
+                  <a:schemeClr val="tx1"/>
+                </a:solidFill>
+                <a:miter lim="800000"/>
+                <a:headEnd/>
+                <a:tailEnd/>
+              </a14:hiddenLine>
+            </a:ext>
+            <a:ext uri="{AF507438-7753-43E0-B8FC-AC1667EBCBE1}">
+              <a14:hiddenEffects xmlns:a14="http://schemas.microsoft.com/office/drawing/2010/main">
+                <a:effectLst>
+                  <a:outerShdw dist="35921" dir="2700000" algn="ctr" rotWithShape="0">
+                    <a:schemeClr val="bg2"/>
+                  </a:outerShdw>
+                </a:effectLst>
+              </a14:hiddenEffects>
+            </a:ext>
+          </a:extLst>
+        </p:spPr>
+      </p:pic>
+    </p:spTree>
+    <p:extLst>
+      <p:ext uri="{BB962C8B-B14F-4D97-AF65-F5344CB8AC3E}">
+        <p14:creationId xmlns:p14="http://schemas.microsoft.com/office/powerpoint/2010/main" val="196183586"/>
+      </p:ext>
+    </p:extLst>
+  </p:cSld>
+  <p:clrMapOvr>
+    <a:masterClrMapping/>
+  </p:clrMapOvr>
+  <p:timing>
+    <p:tnLst>
+      <p:par>
+        <p:cTn id="1" dur="indefinite" restart="never" nodeType="tmRoot"/>
+      </p:par>
+    </p:tnLst>
+  </p:timing>
+</p:sld>
+</file>
+
+<file path=ppt/slides/slide10.xml><?xml version="1.0" encoding="utf-8"?>
+<p:sld xmlns:a="http://schemas.openxmlformats.org/drawingml/2006/main" xmlns:r="http://schemas.openxmlformats.org/officeDocument/2006/relationships" xmlns:p="http://schemas.openxmlformats.org/presentationml/2006/main">
+  <p:cSld>
+    <p:spTree>
+      <p:nvGrpSpPr>
+        <p:cNvPr id="1" name=""/>
+        <p:cNvGrpSpPr/>
+        <p:nvPr/>
+      </p:nvGrpSpPr>
+      <p:grpSpPr>
+        <a:xfrm>
+          <a:off x="0" y="0"/>
+          <a:ext cx="0" cy="0"/>
+          <a:chOff x="0" y="0"/>
+          <a:chExt cx="0" cy="0"/>
+        </a:xfrm>
+      </p:grpSpPr>
       <p:sp>
         <p:nvSpPr>
           <p:cNvPr id="2" name="Titel 1"/>
@@ -5282,7 +6340,11 @@
           <a:bodyPr/>
           <a:lstStyle/>
           <a:p>
-            <a:endParaRPr lang="de-DE"/>
+            <a:r>
+              <a:rPr lang="de-DE" dirty="0" err="1" smtClean="0"/>
+              <a:t>LiveDemo</a:t>
+            </a:r>
+            <a:endParaRPr lang="de-DE" dirty="0"/>
           </a:p>
         </p:txBody>
       </p:sp>
@@ -5303,7 +6365,7 @@
           <a:p>
             <a:fld id="{48352B5A-167D-4ED6-B7C9-BDA647A8BA51}" type="datetime1">
               <a:rPr lang="de-DE" smtClean="0"/>
-              <a:t>16.11.2016</a:t>
+              <a:t>21.11.2016</a:t>
             </a:fld>
             <a:endParaRPr lang="de-DE"/>
           </a:p>
@@ -5345,7 +6407,7 @@
           <a:p>
             <a:fld id="{E07F1749-2C29-4AD9-BF92-E70F8884412B}" type="slidenum">
               <a:rPr lang="de-DE" smtClean="0"/>
-              <a:t>1</a:t>
+              <a:t>10</a:t>
             </a:fld>
             <a:endParaRPr lang="de-DE"/>
           </a:p>
@@ -5366,10 +6428,383 @@
           <a:bodyPr/>
           <a:lstStyle/>
           <a:p>
-            <a:endParaRPr lang="de-DE"/>
-          </a:p>
-        </p:txBody>
-      </p:sp>
+            <a:r>
+              <a:rPr lang="de-DE" dirty="0" smtClean="0"/>
+              <a:t>Vorstellung der Devices in Persona</a:t>
+            </a:r>
+          </a:p>
+          <a:p>
+            <a:r>
+              <a:rPr lang="de-DE" dirty="0" smtClean="0"/>
+              <a:t>Zeigen, dass das Dashboard tut, was es soll</a:t>
+            </a:r>
+          </a:p>
+          <a:p>
+            <a:endParaRPr lang="de-DE" dirty="0"/>
+          </a:p>
+        </p:txBody>
+      </p:sp>
+    </p:spTree>
+    <p:extLst>
+      <p:ext uri="{BB962C8B-B14F-4D97-AF65-F5344CB8AC3E}">
+        <p14:creationId xmlns:p14="http://schemas.microsoft.com/office/powerpoint/2010/main" val="454365051"/>
+      </p:ext>
+    </p:extLst>
+  </p:cSld>
+  <p:clrMapOvr>
+    <a:masterClrMapping/>
+  </p:clrMapOvr>
+</p:sld>
+</file>
+
+<file path=ppt/slides/slide11.xml><?xml version="1.0" encoding="utf-8"?>
+<p:sld xmlns:a="http://schemas.openxmlformats.org/drawingml/2006/main" xmlns:r="http://schemas.openxmlformats.org/officeDocument/2006/relationships" xmlns:p="http://schemas.openxmlformats.org/presentationml/2006/main">
+  <p:cSld>
+    <p:spTree>
+      <p:nvGrpSpPr>
+        <p:cNvPr id="1" name=""/>
+        <p:cNvGrpSpPr/>
+        <p:nvPr/>
+      </p:nvGrpSpPr>
+      <p:grpSpPr>
+        <a:xfrm>
+          <a:off x="0" y="0"/>
+          <a:ext cx="0" cy="0"/>
+          <a:chOff x="0" y="0"/>
+          <a:chExt cx="0" cy="0"/>
+        </a:xfrm>
+      </p:grpSpPr>
+      <p:sp>
+        <p:nvSpPr>
+          <p:cNvPr id="2" name="Titel 1"/>
+          <p:cNvSpPr>
+            <a:spLocks noGrp="1"/>
+          </p:cNvSpPr>
+          <p:nvPr>
+            <p:ph type="title"/>
+          </p:nvPr>
+        </p:nvSpPr>
+        <p:spPr/>
+        <p:txBody>
+          <a:bodyPr/>
+          <a:lstStyle/>
+          <a:p>
+            <a:r>
+              <a:rPr lang="de-DE" dirty="0" smtClean="0"/>
+              <a:t>LIVE-CODING: Rapid-</a:t>
+            </a:r>
+            <a:r>
+              <a:rPr lang="de-DE" dirty="0" err="1" smtClean="0"/>
+              <a:t>Prototyping</a:t>
+            </a:r>
+            <a:endParaRPr lang="de-DE" dirty="0"/>
+          </a:p>
+        </p:txBody>
+      </p:sp>
+      <p:sp>
+        <p:nvSpPr>
+          <p:cNvPr id="3" name="Datumsplatzhalter 2"/>
+          <p:cNvSpPr>
+            <a:spLocks noGrp="1"/>
+          </p:cNvSpPr>
+          <p:nvPr>
+            <p:ph type="dt" sz="half" idx="10"/>
+          </p:nvPr>
+        </p:nvSpPr>
+        <p:spPr/>
+        <p:txBody>
+          <a:bodyPr/>
+          <a:lstStyle/>
+          <a:p>
+            <a:fld id="{48352B5A-167D-4ED6-B7C9-BDA647A8BA51}" type="datetime1">
+              <a:rPr lang="de-DE" smtClean="0"/>
+              <a:t>21.11.2016</a:t>
+            </a:fld>
+            <a:endParaRPr lang="de-DE"/>
+          </a:p>
+        </p:txBody>
+      </p:sp>
+      <p:sp>
+        <p:nvSpPr>
+          <p:cNvPr id="4" name="Fußzeilenplatzhalter 3"/>
+          <p:cNvSpPr>
+            <a:spLocks noGrp="1"/>
+          </p:cNvSpPr>
+          <p:nvPr>
+            <p:ph type="ftr" sz="quarter" idx="11"/>
+          </p:nvPr>
+        </p:nvSpPr>
+        <p:spPr/>
+        <p:txBody>
+          <a:bodyPr/>
+          <a:lstStyle/>
+          <a:p>
+            <a:endParaRPr lang="de-DE"/>
+          </a:p>
+        </p:txBody>
+      </p:sp>
+      <p:sp>
+        <p:nvSpPr>
+          <p:cNvPr id="5" name="Foliennummernplatzhalter 4"/>
+          <p:cNvSpPr>
+            <a:spLocks noGrp="1"/>
+          </p:cNvSpPr>
+          <p:nvPr>
+            <p:ph type="sldNum" sz="quarter" idx="12"/>
+          </p:nvPr>
+        </p:nvSpPr>
+        <p:spPr/>
+        <p:txBody>
+          <a:bodyPr/>
+          <a:lstStyle/>
+          <a:p>
+            <a:fld id="{E07F1749-2C29-4AD9-BF92-E70F8884412B}" type="slidenum">
+              <a:rPr lang="de-DE" smtClean="0"/>
+              <a:t>11</a:t>
+            </a:fld>
+            <a:endParaRPr lang="de-DE"/>
+          </a:p>
+        </p:txBody>
+      </p:sp>
+      <p:sp>
+        <p:nvSpPr>
+          <p:cNvPr id="6" name="Inhaltsplatzhalter 5"/>
+          <p:cNvSpPr>
+            <a:spLocks noGrp="1"/>
+          </p:cNvSpPr>
+          <p:nvPr>
+            <p:ph sz="quarter" idx="13"/>
+          </p:nvPr>
+        </p:nvSpPr>
+        <p:spPr/>
+        <p:txBody>
+          <a:bodyPr/>
+          <a:lstStyle/>
+          <a:p>
+            <a:r>
+              <a:rPr lang="de-DE" dirty="0" smtClean="0"/>
+              <a:t>Torben zeigt wie ?eine Zufällig gewählte Aufgabe? </a:t>
+            </a:r>
+          </a:p>
+          <a:p>
+            <a:r>
+              <a:rPr lang="de-DE" dirty="0" smtClean="0"/>
+              <a:t>Über unsere Umgebung umgesetzt wird…</a:t>
+            </a:r>
+          </a:p>
+          <a:p>
+            <a:r>
+              <a:rPr lang="de-DE" dirty="0" smtClean="0"/>
+              <a:t>Anbindung des Würfels an das Nachrichten System</a:t>
+            </a:r>
+            <a:endParaRPr lang="de-DE" dirty="0"/>
+          </a:p>
+        </p:txBody>
+      </p:sp>
+    </p:spTree>
+    <p:extLst>
+      <p:ext uri="{BB962C8B-B14F-4D97-AF65-F5344CB8AC3E}">
+        <p14:creationId xmlns:p14="http://schemas.microsoft.com/office/powerpoint/2010/main" val="3035020756"/>
+      </p:ext>
+    </p:extLst>
+  </p:cSld>
+  <p:clrMapOvr>
+    <a:masterClrMapping/>
+  </p:clrMapOvr>
+</p:sld>
+</file>
+
+<file path=ppt/slides/slide12.xml><?xml version="1.0" encoding="utf-8"?>
+<p:sld xmlns:a="http://schemas.openxmlformats.org/drawingml/2006/main" xmlns:r="http://schemas.openxmlformats.org/officeDocument/2006/relationships" xmlns:p="http://schemas.openxmlformats.org/presentationml/2006/main">
+  <p:cSld>
+    <p:spTree>
+      <p:nvGrpSpPr>
+        <p:cNvPr id="1" name=""/>
+        <p:cNvGrpSpPr/>
+        <p:nvPr/>
+      </p:nvGrpSpPr>
+      <p:grpSpPr>
+        <a:xfrm>
+          <a:off x="0" y="0"/>
+          <a:ext cx="0" cy="0"/>
+          <a:chOff x="0" y="0"/>
+          <a:chExt cx="0" cy="0"/>
+        </a:xfrm>
+      </p:grpSpPr>
+      <p:sp>
+        <p:nvSpPr>
+          <p:cNvPr id="2" name="Titel 1"/>
+          <p:cNvSpPr>
+            <a:spLocks noGrp="1"/>
+          </p:cNvSpPr>
+          <p:nvPr>
+            <p:ph type="title"/>
+          </p:nvPr>
+        </p:nvSpPr>
+        <p:spPr/>
+        <p:txBody>
+          <a:bodyPr/>
+          <a:lstStyle/>
+          <a:p>
+            <a:r>
+              <a:rPr lang="de-DE" dirty="0" smtClean="0"/>
+              <a:t>IOT – :+1:</a:t>
+            </a:r>
+            <a:endParaRPr lang="de-DE" dirty="0"/>
+          </a:p>
+        </p:txBody>
+      </p:sp>
+      <p:sp>
+        <p:nvSpPr>
+          <p:cNvPr id="3" name="Datumsplatzhalter 2"/>
+          <p:cNvSpPr>
+            <a:spLocks noGrp="1"/>
+          </p:cNvSpPr>
+          <p:nvPr>
+            <p:ph type="dt" sz="half" idx="10"/>
+          </p:nvPr>
+        </p:nvSpPr>
+        <p:spPr/>
+        <p:txBody>
+          <a:bodyPr/>
+          <a:lstStyle/>
+          <a:p>
+            <a:fld id="{48352B5A-167D-4ED6-B7C9-BDA647A8BA51}" type="datetime1">
+              <a:rPr lang="de-DE" smtClean="0"/>
+              <a:t>21.11.2016</a:t>
+            </a:fld>
+            <a:endParaRPr lang="de-DE"/>
+          </a:p>
+        </p:txBody>
+      </p:sp>
+      <p:sp>
+        <p:nvSpPr>
+          <p:cNvPr id="4" name="Fußzeilenplatzhalter 3"/>
+          <p:cNvSpPr>
+            <a:spLocks noGrp="1"/>
+          </p:cNvSpPr>
+          <p:nvPr>
+            <p:ph type="ftr" sz="quarter" idx="11"/>
+          </p:nvPr>
+        </p:nvSpPr>
+        <p:spPr/>
+        <p:txBody>
+          <a:bodyPr/>
+          <a:lstStyle/>
+          <a:p>
+            <a:r>
+              <a:rPr lang="de-DE" b="1" dirty="0"/>
+              <a:t>Live-Demo </a:t>
+            </a:r>
+            <a:r>
+              <a:rPr lang="de-DE" b="1" dirty="0" err="1"/>
+              <a:t>IoT</a:t>
+            </a:r>
+            <a:r>
+              <a:rPr lang="de-DE" b="1" dirty="0"/>
+              <a:t> (Internet </a:t>
+            </a:r>
+            <a:r>
+              <a:rPr lang="de-DE" b="1" dirty="0" err="1"/>
+              <a:t>of</a:t>
+            </a:r>
+            <a:r>
+              <a:rPr lang="de-DE" b="1" dirty="0"/>
+              <a:t> Things)</a:t>
+            </a:r>
+            <a:endParaRPr lang="de-DE" dirty="0"/>
+          </a:p>
+        </p:txBody>
+      </p:sp>
+      <p:sp>
+        <p:nvSpPr>
+          <p:cNvPr id="5" name="Foliennummernplatzhalter 4"/>
+          <p:cNvSpPr>
+            <a:spLocks noGrp="1"/>
+          </p:cNvSpPr>
+          <p:nvPr>
+            <p:ph type="sldNum" sz="quarter" idx="12"/>
+          </p:nvPr>
+        </p:nvSpPr>
+        <p:spPr/>
+        <p:txBody>
+          <a:bodyPr/>
+          <a:lstStyle/>
+          <a:p>
+            <a:fld id="{E07F1749-2C29-4AD9-BF92-E70F8884412B}" type="slidenum">
+              <a:rPr lang="de-DE" smtClean="0"/>
+              <a:t>12</a:t>
+            </a:fld>
+            <a:endParaRPr lang="de-DE"/>
+          </a:p>
+        </p:txBody>
+      </p:sp>
+      <p:pic>
+        <p:nvPicPr>
+          <p:cNvPr id="8" name="Picture 2"/>
+          <p:cNvPicPr>
+            <a:picLocks noGrp="1" noChangeAspect="1" noChangeArrowheads="1"/>
+          </p:cNvPicPr>
+          <p:nvPr>
+            <p:ph sz="quarter" idx="13"/>
+          </p:nvPr>
+        </p:nvPicPr>
+        <p:blipFill>
+          <a:blip r:embed="rId2">
+            <a:extLst>
+              <a:ext uri="{28A0092B-C50C-407E-A947-70E740481C1C}">
+                <a14:useLocalDpi xmlns:a14="http://schemas.microsoft.com/office/drawing/2010/main" val="0"/>
+              </a:ext>
+            </a:extLst>
+          </a:blip>
+          <a:srcRect/>
+          <a:stretch>
+            <a:fillRect/>
+          </a:stretch>
+        </p:blipFill>
+        <p:spPr bwMode="auto">
+          <a:xfrm>
+            <a:off x="3059906" y="1511300"/>
+            <a:ext cx="4681538" cy="4681538"/>
+          </a:xfrm>
+          <a:prstGeom prst="rect">
+            <a:avLst/>
+          </a:prstGeom>
+          <a:noFill/>
+          <a:ln>
+            <a:noFill/>
+          </a:ln>
+          <a:effectLst/>
+          <a:extLst>
+            <a:ext uri="{909E8E84-426E-40DD-AFC4-6F175D3DCCD1}">
+              <a14:hiddenFill xmlns:a14="http://schemas.microsoft.com/office/drawing/2010/main">
+                <a:solidFill>
+                  <a:schemeClr val="accent1"/>
+                </a:solidFill>
+              </a14:hiddenFill>
+            </a:ext>
+            <a:ext uri="{91240B29-F687-4F45-9708-019B960494DF}">
+              <a14:hiddenLine xmlns:a14="http://schemas.microsoft.com/office/drawing/2010/main" w="9525">
+                <a:solidFill>
+                  <a:schemeClr val="tx1"/>
+                </a:solidFill>
+                <a:miter lim="800000"/>
+                <a:headEnd/>
+                <a:tailEnd/>
+              </a14:hiddenLine>
+            </a:ext>
+            <a:ext uri="{AF507438-7753-43E0-B8FC-AC1667EBCBE1}">
+              <a14:hiddenEffects xmlns:a14="http://schemas.microsoft.com/office/drawing/2010/main">
+                <a:effectLst>
+                  <a:outerShdw dist="35921" dir="2700000" algn="ctr" rotWithShape="0">
+                    <a:schemeClr val="bg2"/>
+                  </a:outerShdw>
+                </a:effectLst>
+              </a14:hiddenEffects>
+            </a:ext>
+          </a:extLst>
+        </p:spPr>
+      </p:pic>
     </p:spTree>
     <p:extLst>
       <p:ext uri="{BB962C8B-B14F-4D97-AF65-F5344CB8AC3E}">
@@ -5422,7 +6857,190 @@
           <a:bodyPr/>
           <a:lstStyle/>
           <a:p>
-            <a:endParaRPr lang="de-DE"/>
+            <a:r>
+              <a:rPr lang="de-DE" dirty="0" smtClean="0"/>
+              <a:t>WIR</a:t>
+            </a:r>
+            <a:endParaRPr lang="de-DE" dirty="0"/>
+          </a:p>
+        </p:txBody>
+      </p:sp>
+      <p:sp>
+        <p:nvSpPr>
+          <p:cNvPr id="7" name="Textplatzhalter 6"/>
+          <p:cNvSpPr>
+            <a:spLocks noGrp="1"/>
+          </p:cNvSpPr>
+          <p:nvPr>
+            <p:ph type="body" idx="1"/>
+          </p:nvPr>
+        </p:nvSpPr>
+        <p:spPr/>
+        <p:txBody>
+          <a:bodyPr/>
+          <a:lstStyle/>
+          <a:p>
+            <a:r>
+              <a:rPr lang="de-DE" dirty="0" smtClean="0"/>
+              <a:t>Torben Mader</a:t>
+            </a:r>
+            <a:endParaRPr lang="de-DE" dirty="0"/>
+          </a:p>
+        </p:txBody>
+      </p:sp>
+      <p:sp>
+        <p:nvSpPr>
+          <p:cNvPr id="8" name="Inhaltsplatzhalter 7"/>
+          <p:cNvSpPr>
+            <a:spLocks noGrp="1"/>
+          </p:cNvSpPr>
+          <p:nvPr>
+            <p:ph sz="half" idx="2"/>
+          </p:nvPr>
+        </p:nvSpPr>
+        <p:spPr/>
+        <p:txBody>
+          <a:bodyPr/>
+          <a:lstStyle/>
+          <a:p>
+            <a:pPr marL="342900" indent="-342900">
+              <a:buFont typeface="Arial" panose="020B0604020202020204" pitchFamily="34" charset="0"/>
+              <a:buChar char="•"/>
+            </a:pPr>
+            <a:r>
+              <a:rPr lang="it-IT" sz="2000" b="0" dirty="0"/>
+              <a:t>adesso Hamburg - Java CC CI - Uwe </a:t>
+            </a:r>
+            <a:r>
+              <a:rPr lang="it-IT" sz="2000" b="0" dirty="0" smtClean="0"/>
+              <a:t>Lutter</a:t>
+            </a:r>
+          </a:p>
+          <a:p>
+            <a:pPr marL="342900" indent="-342900">
+              <a:buFont typeface="Arial" panose="020B0604020202020204" pitchFamily="34" charset="0"/>
+              <a:buChar char="•"/>
+            </a:pPr>
+            <a:r>
+              <a:rPr lang="de-DE" sz="2000" b="0" dirty="0" smtClean="0"/>
+              <a:t>Student, angewandte Informatik</a:t>
+            </a:r>
+            <a:br>
+              <a:rPr lang="de-DE" sz="2000" b="0" dirty="0" smtClean="0"/>
+            </a:br>
+            <a:r>
+              <a:rPr lang="de-DE" sz="2000" b="0" dirty="0" err="1" smtClean="0"/>
+              <a:t>Bc.Sc</a:t>
+            </a:r>
+            <a:r>
+              <a:rPr lang="de-DE" sz="2000" b="0" dirty="0"/>
+              <a:t>. an der HAW-Hamburg</a:t>
+            </a:r>
+            <a:endParaRPr lang="de-DE" sz="2000" dirty="0"/>
+          </a:p>
+        </p:txBody>
+      </p:sp>
+      <p:sp>
+        <p:nvSpPr>
+          <p:cNvPr id="9" name="Textplatzhalter 8"/>
+          <p:cNvSpPr>
+            <a:spLocks noGrp="1"/>
+          </p:cNvSpPr>
+          <p:nvPr>
+            <p:ph type="body" sz="quarter" idx="3"/>
+          </p:nvPr>
+        </p:nvSpPr>
+        <p:spPr/>
+        <p:txBody>
+          <a:bodyPr/>
+          <a:lstStyle/>
+          <a:p>
+            <a:r>
+              <a:rPr lang="de-DE" dirty="0" smtClean="0"/>
+              <a:t>Jan Stieglitz</a:t>
+            </a:r>
+            <a:endParaRPr lang="de-DE" dirty="0"/>
+          </a:p>
+        </p:txBody>
+      </p:sp>
+      <p:sp>
+        <p:nvSpPr>
+          <p:cNvPr id="10" name="Inhaltsplatzhalter 9"/>
+          <p:cNvSpPr>
+            <a:spLocks noGrp="1"/>
+          </p:cNvSpPr>
+          <p:nvPr>
+            <p:ph sz="quarter" idx="4"/>
+          </p:nvPr>
+        </p:nvSpPr>
+        <p:spPr/>
+        <p:txBody>
+          <a:bodyPr/>
+          <a:lstStyle/>
+          <a:p>
+            <a:pPr marL="342900" indent="-342900">
+              <a:buFont typeface="Arial" panose="020B0604020202020204" pitchFamily="34" charset="0"/>
+              <a:buChar char="•"/>
+            </a:pPr>
+            <a:r>
+              <a:rPr lang="it-IT" sz="2000" b="0" dirty="0"/>
+              <a:t>adesso </a:t>
+            </a:r>
+            <a:r>
+              <a:rPr lang="it-IT" sz="2000" b="0" dirty="0" smtClean="0"/>
+              <a:t>Hamburg</a:t>
+            </a:r>
+            <a:br>
+              <a:rPr lang="it-IT" sz="2000" b="0" dirty="0" smtClean="0"/>
+            </a:br>
+            <a:r>
+              <a:rPr lang="it-IT" sz="2000" b="0" dirty="0" smtClean="0"/>
+              <a:t>Java </a:t>
+            </a:r>
+            <a:r>
+              <a:rPr lang="it-IT" sz="2000" b="0" dirty="0"/>
+              <a:t>CC CI - Uwe </a:t>
+            </a:r>
+            <a:r>
+              <a:rPr lang="it-IT" sz="2000" b="0" dirty="0" smtClean="0"/>
+              <a:t>Lutter</a:t>
+            </a:r>
+          </a:p>
+          <a:p>
+            <a:pPr marL="342900" indent="-342900">
+              <a:buFont typeface="Arial" panose="020B0604020202020204" pitchFamily="34" charset="0"/>
+              <a:buChar char="•"/>
+            </a:pPr>
+            <a:r>
+              <a:rPr lang="de-DE" sz="2000" b="0" dirty="0" smtClean="0"/>
+              <a:t>Student, angewandte Informatik</a:t>
+            </a:r>
+            <a:br>
+              <a:rPr lang="de-DE" sz="2000" b="0" dirty="0" smtClean="0"/>
+            </a:br>
+            <a:r>
+              <a:rPr lang="de-DE" sz="2000" b="0" dirty="0" err="1" smtClean="0"/>
+              <a:t>Bc.Sc</a:t>
+            </a:r>
+            <a:r>
+              <a:rPr lang="de-DE" sz="2000" b="0" dirty="0"/>
+              <a:t>. an der </a:t>
+            </a:r>
+            <a:r>
+              <a:rPr lang="de-DE" sz="2000" b="0" dirty="0" smtClean="0"/>
+              <a:t>HAW-Hamburg</a:t>
+            </a:r>
+          </a:p>
+          <a:p>
+            <a:pPr marL="342900" indent="-342900">
+              <a:buFont typeface="Arial" panose="020B0604020202020204" pitchFamily="34" charset="0"/>
+              <a:buChar char="•"/>
+            </a:pPr>
+            <a:r>
+              <a:rPr lang="de-DE" sz="2000" b="0" i="1" dirty="0"/>
+              <a:t>#VogelDesJahres2016</a:t>
+            </a:r>
+            <a:endParaRPr lang="de-DE" sz="2000" dirty="0"/>
           </a:p>
         </p:txBody>
       </p:sp>
@@ -5443,7 +7061,7 @@
           <a:p>
             <a:fld id="{48352B5A-167D-4ED6-B7C9-BDA647A8BA51}" type="datetime1">
               <a:rPr lang="de-DE" smtClean="0"/>
-              <a:t>16.11.2016</a:t>
+              <a:t>21.11.2016</a:t>
             </a:fld>
             <a:endParaRPr lang="de-DE"/>
           </a:p>
@@ -5464,7 +7082,7 @@
           <a:bodyPr/>
           <a:lstStyle/>
           <a:p>
-            <a:endParaRPr lang="de-DE"/>
+            <a:endParaRPr lang="de-DE" dirty="0"/>
           </a:p>
         </p:txBody>
       </p:sp>
@@ -5491,25 +7109,464 @@
           </a:p>
         </p:txBody>
       </p:sp>
-      <p:sp>
-        <p:nvSpPr>
-          <p:cNvPr id="6" name="Inhaltsplatzhalter 5"/>
-          <p:cNvSpPr>
-            <a:spLocks noGrp="1"/>
-          </p:cNvSpPr>
+    </p:spTree>
+    <p:extLst>
+      <p:ext uri="{BB962C8B-B14F-4D97-AF65-F5344CB8AC3E}">
+        <p14:creationId xmlns:p14="http://schemas.microsoft.com/office/powerpoint/2010/main" val="2429141699"/>
+      </p:ext>
+    </p:extLst>
+  </p:cSld>
+  <p:clrMapOvr>
+    <a:masterClrMapping/>
+  </p:clrMapOvr>
+  <p:timing>
+    <p:tnLst>
+      <p:par>
+        <p:cTn id="1" dur="indefinite" restart="never" nodeType="tmRoot"/>
+      </p:par>
+    </p:tnLst>
+  </p:timing>
+</p:sld>
+</file>
+
+<file path=ppt/slides/slide3.xml><?xml version="1.0" encoding="utf-8"?>
+<p:sld xmlns:a="http://schemas.openxmlformats.org/drawingml/2006/main" xmlns:r="http://schemas.openxmlformats.org/officeDocument/2006/relationships" xmlns:p="http://schemas.openxmlformats.org/presentationml/2006/main">
+  <p:cSld>
+    <p:spTree>
+      <p:nvGrpSpPr>
+        <p:cNvPr id="1" name=""/>
+        <p:cNvGrpSpPr/>
+        <p:nvPr/>
+      </p:nvGrpSpPr>
+      <p:grpSpPr>
+        <a:xfrm>
+          <a:off x="0" y="0"/>
+          <a:ext cx="0" cy="0"/>
+          <a:chOff x="0" y="0"/>
+          <a:chExt cx="0" cy="0"/>
+        </a:xfrm>
+      </p:grpSpPr>
+      <p:sp>
+        <p:nvSpPr>
+          <p:cNvPr id="2049" name="Ellipse 2048"/>
+          <p:cNvSpPr/>
+          <p:nvPr/>
+        </p:nvSpPr>
+        <p:spPr>
+          <a:xfrm>
+            <a:off x="938855" y="1809303"/>
+            <a:ext cx="2782740" cy="2597224"/>
+          </a:xfrm>
+          <a:prstGeom prst="ellipse">
+            <a:avLst/>
+          </a:prstGeom>
+          <a:ln w="76200"/>
+        </p:spPr>
+        <p:style>
+          <a:lnRef idx="2">
+            <a:schemeClr val="accent1"/>
+          </a:lnRef>
+          <a:fillRef idx="1">
+            <a:schemeClr val="lt1"/>
+          </a:fillRef>
+          <a:effectRef idx="0">
+            <a:schemeClr val="accent1"/>
+          </a:effectRef>
+          <a:fontRef idx="minor">
+            <a:schemeClr val="dk1"/>
+          </a:fontRef>
+        </p:style>
+        <p:txBody>
+          <a:bodyPr rtlCol="0" anchor="ctr"/>
+          <a:lstStyle/>
+          <a:p>
+            <a:pPr algn="ctr"/>
+            <a:endParaRPr lang="de-DE"/>
+          </a:p>
+        </p:txBody>
+      </p:sp>
+      <p:sp>
+        <p:nvSpPr>
+          <p:cNvPr id="2" name="Titel 1"/>
+          <p:cNvSpPr>
+            <a:spLocks noGrp="1"/>
+          </p:cNvSpPr>
+          <p:nvPr>
+            <p:ph type="title"/>
+          </p:nvPr>
+        </p:nvSpPr>
+        <p:spPr/>
+        <p:txBody>
+          <a:bodyPr/>
+          <a:lstStyle/>
+          <a:p>
+            <a:r>
+              <a:rPr lang="de-DE" dirty="0" smtClean="0"/>
+              <a:t>Internet der Dinge</a:t>
+            </a:r>
+            <a:endParaRPr lang="de-DE" dirty="0"/>
+          </a:p>
+        </p:txBody>
+      </p:sp>
+      <p:sp>
+        <p:nvSpPr>
+          <p:cNvPr id="3" name="Datumsplatzhalter 2"/>
+          <p:cNvSpPr>
+            <a:spLocks noGrp="1"/>
+          </p:cNvSpPr>
+          <p:nvPr>
+            <p:ph type="dt" sz="half" idx="10"/>
+          </p:nvPr>
+        </p:nvSpPr>
+        <p:spPr/>
+        <p:txBody>
+          <a:bodyPr/>
+          <a:lstStyle/>
+          <a:p>
+            <a:fld id="{48352B5A-167D-4ED6-B7C9-BDA647A8BA51}" type="datetime1">
+              <a:rPr lang="de-DE" smtClean="0"/>
+              <a:t>21.11.2016</a:t>
+            </a:fld>
+            <a:endParaRPr lang="de-DE"/>
+          </a:p>
+        </p:txBody>
+      </p:sp>
+      <p:sp>
+        <p:nvSpPr>
+          <p:cNvPr id="4" name="Fußzeilenplatzhalter 3"/>
+          <p:cNvSpPr>
+            <a:spLocks noGrp="1"/>
+          </p:cNvSpPr>
+          <p:nvPr>
+            <p:ph type="ftr" sz="quarter" idx="11"/>
+          </p:nvPr>
+        </p:nvSpPr>
+        <p:spPr/>
+        <p:txBody>
+          <a:bodyPr/>
+          <a:lstStyle/>
+          <a:p>
+            <a:r>
+              <a:rPr lang="de-DE" dirty="0" smtClean="0"/>
+              <a:t>1999 – Die Geburt des Internet-Kühlschranks</a:t>
+            </a:r>
+            <a:endParaRPr lang="de-DE" dirty="0"/>
+          </a:p>
+        </p:txBody>
+      </p:sp>
+      <p:sp>
+        <p:nvSpPr>
+          <p:cNvPr id="5" name="Foliennummernplatzhalter 4"/>
+          <p:cNvSpPr>
+            <a:spLocks noGrp="1"/>
+          </p:cNvSpPr>
+          <p:nvPr>
+            <p:ph type="sldNum" sz="quarter" idx="12"/>
+          </p:nvPr>
+        </p:nvSpPr>
+        <p:spPr/>
+        <p:txBody>
+          <a:bodyPr/>
+          <a:lstStyle/>
+          <a:p>
+            <a:fld id="{E07F1749-2C29-4AD9-BF92-E70F8884412B}" type="slidenum">
+              <a:rPr lang="de-DE" smtClean="0"/>
+              <a:t>3</a:t>
+            </a:fld>
+            <a:endParaRPr lang="de-DE"/>
+          </a:p>
+        </p:txBody>
+      </p:sp>
+      <p:pic>
+        <p:nvPicPr>
+          <p:cNvPr id="2051" name="Picture 3" descr="C:\Users\ruebbelke\AppData\Local\Microsoft\Windows\Temporary Internet Files\Content.IE5\C07D39A8\lgi01a201310271300[1].jpg"/>
+          <p:cNvPicPr>
+            <a:picLocks noChangeAspect="1" noChangeArrowheads="1"/>
+          </p:cNvPicPr>
+          <p:nvPr/>
+        </p:nvPicPr>
+        <p:blipFill>
+          <a:blip r:embed="rId3" cstate="print">
+            <a:extLst>
+              <a:ext uri="{28A0092B-C50C-407E-A947-70E740481C1C}">
+                <a14:useLocalDpi xmlns:a14="http://schemas.microsoft.com/office/drawing/2010/main" val="0"/>
+              </a:ext>
+            </a:extLst>
+          </a:blip>
+          <a:srcRect/>
+          <a:stretch>
+            <a:fillRect/>
+          </a:stretch>
+        </p:blipFill>
+        <p:spPr bwMode="auto">
+          <a:xfrm flipH="1">
+            <a:off x="7273205" y="935831"/>
+            <a:ext cx="1440160" cy="2272302"/>
+          </a:xfrm>
+          <a:prstGeom prst="rect">
+            <a:avLst/>
+          </a:prstGeom>
+          <a:noFill/>
+          <a:extLst>
+            <a:ext uri="{909E8E84-426E-40DD-AFC4-6F175D3DCCD1}">
+              <a14:hiddenFill xmlns:a14="http://schemas.microsoft.com/office/drawing/2010/main">
+                <a:solidFill>
+                  <a:srgbClr val="FFFFFF"/>
+                </a:solidFill>
+              </a14:hiddenFill>
+            </a:ext>
+          </a:extLst>
+        </p:spPr>
+      </p:pic>
+      <p:pic>
+        <p:nvPicPr>
+          <p:cNvPr id="2052" name="Picture 4" descr="C:\Users\ruebbelke\AppData\Local\Microsoft\Windows\Temporary Internet Files\Content.IE5\C0B56Y4X\pipo-italian-coffee-maker[1].png"/>
+          <p:cNvPicPr>
+            <a:picLocks noChangeAspect="1" noChangeArrowheads="1"/>
+          </p:cNvPicPr>
+          <p:nvPr/>
+        </p:nvPicPr>
+        <p:blipFill>
+          <a:blip r:embed="rId4" cstate="print">
+            <a:extLst>
+              <a:ext uri="{28A0092B-C50C-407E-A947-70E740481C1C}">
+                <a14:useLocalDpi xmlns:a14="http://schemas.microsoft.com/office/drawing/2010/main" val="0"/>
+              </a:ext>
+            </a:extLst>
+          </a:blip>
+          <a:srcRect/>
+          <a:stretch>
+            <a:fillRect/>
+          </a:stretch>
+        </p:blipFill>
+        <p:spPr bwMode="auto">
+          <a:xfrm>
+            <a:off x="9297044" y="3528119"/>
+            <a:ext cx="1169040" cy="1652353"/>
+          </a:xfrm>
+          <a:prstGeom prst="rect">
+            <a:avLst/>
+          </a:prstGeom>
+          <a:noFill/>
+          <a:extLst>
+            <a:ext uri="{909E8E84-426E-40DD-AFC4-6F175D3DCCD1}">
+              <a14:hiddenFill xmlns:a14="http://schemas.microsoft.com/office/drawing/2010/main">
+                <a:solidFill>
+                  <a:srgbClr val="FFFFFF"/>
+                </a:solidFill>
+              </a14:hiddenFill>
+            </a:ext>
+          </a:extLst>
+        </p:spPr>
+      </p:pic>
+      <p:pic>
+        <p:nvPicPr>
+          <p:cNvPr id="2055" name="Picture 7" descr="C:\Users\ruebbelke\AppData\Local\Microsoft\Windows\Temporary Internet Files\Content.IE5\QWJLVP2M\228x228_grundig-ps-8710-gmm0800-personenwaage-von-edelghost[1].jpg"/>
+          <p:cNvPicPr>
+            <a:picLocks noChangeAspect="1" noChangeArrowheads="1"/>
+          </p:cNvPicPr>
+          <p:nvPr/>
+        </p:nvPicPr>
+        <p:blipFill>
+          <a:blip r:embed="rId5">
+            <a:extLst>
+              <a:ext uri="{28A0092B-C50C-407E-A947-70E740481C1C}">
+                <a14:useLocalDpi xmlns:a14="http://schemas.microsoft.com/office/drawing/2010/main" val="0"/>
+              </a:ext>
+            </a:extLst>
+          </a:blip>
+          <a:srcRect/>
+          <a:stretch>
+            <a:fillRect/>
+          </a:stretch>
+        </p:blipFill>
+        <p:spPr bwMode="auto">
+          <a:xfrm>
+            <a:off x="5112965" y="935831"/>
+            <a:ext cx="1746945" cy="1746945"/>
+          </a:xfrm>
+          <a:prstGeom prst="rect">
+            <a:avLst/>
+          </a:prstGeom>
+          <a:noFill/>
+          <a:extLst>
+            <a:ext uri="{909E8E84-426E-40DD-AFC4-6F175D3DCCD1}">
+              <a14:hiddenFill xmlns:a14="http://schemas.microsoft.com/office/drawing/2010/main">
+                <a:solidFill>
+                  <a:srgbClr val="FFFFFF"/>
+                </a:solidFill>
+              </a14:hiddenFill>
+            </a:ext>
+          </a:extLst>
+        </p:spPr>
+      </p:pic>
+      <p:cxnSp>
+        <p:nvCxnSpPr>
+          <p:cNvPr id="2057" name="Gekrümmte Verbindung 2056"/>
+          <p:cNvCxnSpPr>
+            <a:stCxn id="2049" idx="6"/>
+            <a:endCxn id="2055" idx="2"/>
+          </p:cNvCxnSpPr>
+          <p:nvPr/>
+        </p:nvCxnSpPr>
+        <p:spPr>
+          <a:xfrm flipV="1">
+            <a:off x="3721595" y="2682776"/>
+            <a:ext cx="2264843" cy="425139"/>
+          </a:xfrm>
+          <a:prstGeom prst="curvedConnector2">
+            <a:avLst/>
+          </a:prstGeom>
+          <a:ln w="76200">
+            <a:solidFill>
+              <a:schemeClr val="accent1"/>
+            </a:solidFill>
+            <a:headEnd type="none" w="med" len="med"/>
+            <a:tailEnd type="none" w="med" len="med"/>
+          </a:ln>
+        </p:spPr>
+        <p:style>
+          <a:lnRef idx="1">
+            <a:schemeClr val="accent1"/>
+          </a:lnRef>
+          <a:fillRef idx="0">
+            <a:schemeClr val="accent1"/>
+          </a:fillRef>
+          <a:effectRef idx="0">
+            <a:schemeClr val="accent1"/>
+          </a:effectRef>
+          <a:fontRef idx="minor">
+            <a:schemeClr val="tx1"/>
+          </a:fontRef>
+        </p:style>
+      </p:cxnSp>
+      <p:cxnSp>
+        <p:nvCxnSpPr>
+          <p:cNvPr id="2059" name="Gekrümmte Verbindung 2058"/>
+          <p:cNvCxnSpPr>
+            <a:stCxn id="2049" idx="5"/>
+            <a:endCxn id="2051" idx="2"/>
+          </p:cNvCxnSpPr>
+          <p:nvPr/>
+        </p:nvCxnSpPr>
+        <p:spPr>
+          <a:xfrm rot="5400000" flipH="1" flipV="1">
+            <a:off x="5244658" y="1277546"/>
+            <a:ext cx="818039" cy="4679213"/>
+          </a:xfrm>
+          <a:prstGeom prst="curvedConnector3">
+            <a:avLst>
+              <a:gd name="adj1" fmla="val -74441"/>
+            </a:avLst>
+          </a:prstGeom>
+          <a:ln w="76200">
+            <a:solidFill>
+              <a:schemeClr val="accent1"/>
+            </a:solidFill>
+            <a:headEnd type="none" w="med" len="med"/>
+            <a:tailEnd type="none" w="med" len="med"/>
+          </a:ln>
+        </p:spPr>
+        <p:style>
+          <a:lnRef idx="1">
+            <a:schemeClr val="accent1"/>
+          </a:lnRef>
+          <a:fillRef idx="0">
+            <a:schemeClr val="accent1"/>
+          </a:fillRef>
+          <a:effectRef idx="0">
+            <a:schemeClr val="accent1"/>
+          </a:effectRef>
+          <a:fontRef idx="minor">
+            <a:schemeClr val="tx1"/>
+          </a:fontRef>
+        </p:style>
+      </p:cxnSp>
+      <p:cxnSp>
+        <p:nvCxnSpPr>
+          <p:cNvPr id="2061" name="Gekrümmte Verbindung 2060"/>
+          <p:cNvCxnSpPr>
+            <a:stCxn id="2049" idx="4"/>
+            <a:endCxn id="2052" idx="2"/>
+          </p:cNvCxnSpPr>
+          <p:nvPr/>
+        </p:nvCxnSpPr>
+        <p:spPr>
+          <a:xfrm rot="16200000" flipH="1">
+            <a:off x="5718922" y="1017829"/>
+            <a:ext cx="773945" cy="7551339"/>
+          </a:xfrm>
+          <a:prstGeom prst="curvedConnector3">
+            <a:avLst>
+              <a:gd name="adj1" fmla="val 129537"/>
+            </a:avLst>
+          </a:prstGeom>
+          <a:ln w="76200">
+            <a:solidFill>
+              <a:schemeClr val="accent1"/>
+            </a:solidFill>
+            <a:headEnd type="none" w="med" len="med"/>
+            <a:tailEnd type="none" w="med" len="med"/>
+          </a:ln>
+        </p:spPr>
+        <p:style>
+          <a:lnRef idx="1">
+            <a:schemeClr val="accent1"/>
+          </a:lnRef>
+          <a:fillRef idx="0">
+            <a:schemeClr val="accent1"/>
+          </a:fillRef>
+          <a:effectRef idx="0">
+            <a:schemeClr val="accent1"/>
+          </a:effectRef>
+          <a:fontRef idx="minor">
+            <a:schemeClr val="tx1"/>
+          </a:fontRef>
+        </p:style>
+      </p:cxnSp>
+      <p:pic>
+        <p:nvPicPr>
+          <p:cNvPr id="2050" name="Picture 2" descr="C:\Users\ruebbelke\AppData\Local\Microsoft\Windows\Temporary Internet Files\Content.IE5\QWJLVP2M\768px-Applications-internet.svg[1].png"/>
+          <p:cNvPicPr>
+            <a:picLocks noGrp="1" noChangeAspect="1" noChangeArrowheads="1"/>
+          </p:cNvPicPr>
           <p:nvPr>
             <p:ph sz="quarter" idx="13"/>
           </p:nvPr>
-        </p:nvSpPr>
-        <p:spPr/>
-        <p:txBody>
-          <a:bodyPr/>
-          <a:lstStyle/>
-          <a:p>
-            <a:endParaRPr lang="de-DE"/>
-          </a:p>
-        </p:txBody>
-      </p:sp>
+        </p:nvPicPr>
+        <p:blipFill>
+          <a:blip r:embed="rId6">
+            <a:extLst>
+              <a:ext uri="{28A0092B-C50C-407E-A947-70E740481C1C}">
+                <a14:useLocalDpi xmlns:a14="http://schemas.microsoft.com/office/drawing/2010/main" val="0"/>
+              </a:ext>
+            </a:extLst>
+          </a:blip>
+          <a:srcRect/>
+          <a:stretch>
+            <a:fillRect/>
+          </a:stretch>
+        </p:blipFill>
+        <p:spPr bwMode="auto">
+          <a:xfrm>
+            <a:off x="576461" y="1511895"/>
+            <a:ext cx="3385394" cy="3385394"/>
+          </a:xfrm>
+          <a:prstGeom prst="rect">
+            <a:avLst/>
+          </a:prstGeom>
+          <a:noFill/>
+          <a:extLst>
+            <a:ext uri="{909E8E84-426E-40DD-AFC4-6F175D3DCCD1}">
+              <a14:hiddenFill xmlns:a14="http://schemas.microsoft.com/office/drawing/2010/main">
+                <a:solidFill>
+                  <a:srgbClr val="FFFFFF"/>
+                </a:solidFill>
+              </a14:hiddenFill>
+            </a:ext>
+          </a:extLst>
+        </p:spPr>
+      </p:pic>
     </p:spTree>
     <p:extLst>
       <p:ext uri="{BB962C8B-B14F-4D97-AF65-F5344CB8AC3E}">
@@ -5520,6 +7577,1723 @@
   <p:clrMapOvr>
     <a:masterClrMapping/>
   </p:clrMapOvr>
+  <p:timing>
+    <p:tnLst>
+      <p:par>
+        <p:cTn id="1" dur="indefinite" restart="never" nodeType="tmRoot"/>
+      </p:par>
+    </p:tnLst>
+  </p:timing>
+</p:sld>
+</file>
+
+<file path=ppt/slides/slide4.xml><?xml version="1.0" encoding="utf-8"?>
+<p:sld xmlns:a="http://schemas.openxmlformats.org/drawingml/2006/main" xmlns:r="http://schemas.openxmlformats.org/officeDocument/2006/relationships" xmlns:p="http://schemas.openxmlformats.org/presentationml/2006/main">
+  <p:cSld>
+    <p:spTree>
+      <p:nvGrpSpPr>
+        <p:cNvPr id="1" name=""/>
+        <p:cNvGrpSpPr/>
+        <p:nvPr/>
+      </p:nvGrpSpPr>
+      <p:grpSpPr>
+        <a:xfrm>
+          <a:off x="0" y="0"/>
+          <a:ext cx="0" cy="0"/>
+          <a:chOff x="0" y="0"/>
+          <a:chExt cx="0" cy="0"/>
+        </a:xfrm>
+      </p:grpSpPr>
+      <p:sp>
+        <p:nvSpPr>
+          <p:cNvPr id="2" name="Titel 1"/>
+          <p:cNvSpPr>
+            <a:spLocks noGrp="1"/>
+          </p:cNvSpPr>
+          <p:nvPr>
+            <p:ph type="title"/>
+          </p:nvPr>
+        </p:nvSpPr>
+        <p:spPr/>
+        <p:txBody>
+          <a:bodyPr/>
+          <a:lstStyle/>
+          <a:p>
+            <a:r>
+              <a:rPr lang="de-DE" dirty="0" smtClean="0"/>
+              <a:t>Wie wir angefangen haben</a:t>
+            </a:r>
+            <a:endParaRPr lang="de-DE" dirty="0"/>
+          </a:p>
+        </p:txBody>
+      </p:sp>
+      <p:sp>
+        <p:nvSpPr>
+          <p:cNvPr id="3" name="Datumsplatzhalter 2"/>
+          <p:cNvSpPr>
+            <a:spLocks noGrp="1"/>
+          </p:cNvSpPr>
+          <p:nvPr>
+            <p:ph type="dt" sz="half" idx="10"/>
+          </p:nvPr>
+        </p:nvSpPr>
+        <p:spPr/>
+        <p:txBody>
+          <a:bodyPr/>
+          <a:lstStyle/>
+          <a:p>
+            <a:fld id="{48352B5A-167D-4ED6-B7C9-BDA647A8BA51}" type="datetime1">
+              <a:rPr lang="de-DE" smtClean="0"/>
+              <a:t>21.11.2016</a:t>
+            </a:fld>
+            <a:endParaRPr lang="de-DE"/>
+          </a:p>
+        </p:txBody>
+      </p:sp>
+      <p:sp>
+        <p:nvSpPr>
+          <p:cNvPr id="4" name="Fußzeilenplatzhalter 3"/>
+          <p:cNvSpPr>
+            <a:spLocks noGrp="1"/>
+          </p:cNvSpPr>
+          <p:nvPr>
+            <p:ph type="ftr" sz="quarter" idx="11"/>
+          </p:nvPr>
+        </p:nvSpPr>
+        <p:spPr/>
+        <p:txBody>
+          <a:bodyPr/>
+          <a:lstStyle/>
+          <a:p>
+            <a:endParaRPr lang="de-DE"/>
+          </a:p>
+        </p:txBody>
+      </p:sp>
+      <p:sp>
+        <p:nvSpPr>
+          <p:cNvPr id="5" name="Foliennummernplatzhalter 4"/>
+          <p:cNvSpPr>
+            <a:spLocks noGrp="1"/>
+          </p:cNvSpPr>
+          <p:nvPr>
+            <p:ph type="sldNum" sz="quarter" idx="12"/>
+          </p:nvPr>
+        </p:nvSpPr>
+        <p:spPr/>
+        <p:txBody>
+          <a:bodyPr/>
+          <a:lstStyle/>
+          <a:p>
+            <a:fld id="{E07F1749-2C29-4AD9-BF92-E70F8884412B}" type="slidenum">
+              <a:rPr lang="de-DE" smtClean="0"/>
+              <a:t>4</a:t>
+            </a:fld>
+            <a:endParaRPr lang="de-DE"/>
+          </a:p>
+        </p:txBody>
+      </p:sp>
+      <p:sp>
+        <p:nvSpPr>
+          <p:cNvPr id="6" name="Inhaltsplatzhalter 5"/>
+          <p:cNvSpPr>
+            <a:spLocks noGrp="1"/>
+          </p:cNvSpPr>
+          <p:nvPr>
+            <p:ph sz="quarter" idx="13"/>
+          </p:nvPr>
+        </p:nvSpPr>
+        <p:spPr/>
+        <p:txBody>
+          <a:bodyPr/>
+          <a:lstStyle/>
+          <a:p>
+            <a:pPr marL="342900" indent="-342900">
+              <a:buFont typeface="Arial" panose="020B0604020202020204" pitchFamily="34" charset="0"/>
+              <a:buChar char="•"/>
+            </a:pPr>
+            <a:r>
+              <a:rPr lang="de-DE" b="0" dirty="0" smtClean="0"/>
+              <a:t>Arbeiten am Forschungsprojekt </a:t>
+            </a:r>
+            <a:r>
+              <a:rPr lang="de-DE" b="0" dirty="0" err="1" smtClean="0"/>
+              <a:t>Symphony</a:t>
+            </a:r>
+            <a:endParaRPr lang="de-DE" b="0" dirty="0" smtClean="0"/>
+          </a:p>
+          <a:p>
+            <a:pPr marL="342900" indent="-342900">
+              <a:buFont typeface="Arial" panose="020B0604020202020204" pitchFamily="34" charset="0"/>
+              <a:buChar char="•"/>
+            </a:pPr>
+            <a:r>
+              <a:rPr lang="de-DE" b="0" dirty="0" smtClean="0"/>
+              <a:t>Agiles vorgehen?!</a:t>
+            </a:r>
+          </a:p>
+          <a:p>
+            <a:pPr marL="594900" lvl="2" indent="-342900">
+              <a:buFont typeface="Arial" panose="020B0604020202020204" pitchFamily="34" charset="0"/>
+              <a:buChar char="•"/>
+            </a:pPr>
+            <a:r>
+              <a:rPr lang="de-DE" dirty="0" err="1" smtClean="0"/>
+              <a:t>MockUpWeiche</a:t>
+            </a:r>
+            <a:r>
+              <a:rPr lang="de-DE" dirty="0" smtClean="0"/>
+              <a:t> für (noch) nicht Implementiertes</a:t>
+            </a:r>
+          </a:p>
+          <a:p>
+            <a:pPr marL="342900" lvl="1" indent="-342900">
+              <a:buFont typeface="Arial" panose="020B0604020202020204" pitchFamily="34" charset="0"/>
+              <a:buChar char="•"/>
+            </a:pPr>
+            <a:r>
+              <a:rPr lang="de-DE" b="0" dirty="0" err="1" smtClean="0"/>
+              <a:t>Mockups</a:t>
+            </a:r>
+            <a:r>
+              <a:rPr lang="de-DE" b="0" dirty="0" smtClean="0"/>
+              <a:t> mit </a:t>
+            </a:r>
+            <a:r>
+              <a:rPr lang="de-DE" b="0" dirty="0" err="1" smtClean="0"/>
+              <a:t>NodeJS</a:t>
+            </a:r>
+            <a:endParaRPr lang="de-DE" b="0" dirty="0" smtClean="0"/>
+          </a:p>
+          <a:p>
+            <a:pPr marL="594900" lvl="2" indent="-342900">
+              <a:buFont typeface="Arial" panose="020B0604020202020204" pitchFamily="34" charset="0"/>
+              <a:buChar char="•"/>
+            </a:pPr>
+            <a:r>
+              <a:rPr lang="de-DE" dirty="0" smtClean="0"/>
+              <a:t>… und dann kam der Spieltrieb…</a:t>
+            </a:r>
+            <a:endParaRPr lang="de-DE" b="0" dirty="0" smtClean="0"/>
+          </a:p>
+          <a:p>
+            <a:endParaRPr lang="de-DE" b="0" dirty="0"/>
+          </a:p>
+        </p:txBody>
+      </p:sp>
+    </p:spTree>
+    <p:extLst>
+      <p:ext uri="{BB962C8B-B14F-4D97-AF65-F5344CB8AC3E}">
+        <p14:creationId xmlns:p14="http://schemas.microsoft.com/office/powerpoint/2010/main" val="4198500984"/>
+      </p:ext>
+    </p:extLst>
+  </p:cSld>
+  <p:clrMapOvr>
+    <a:masterClrMapping/>
+  </p:clrMapOvr>
+  <p:timing>
+    <p:tnLst>
+      <p:par>
+        <p:cTn id="1" dur="indefinite" restart="never" nodeType="tmRoot"/>
+      </p:par>
+    </p:tnLst>
+  </p:timing>
+</p:sld>
+</file>
+
+<file path=ppt/slides/slide5.xml><?xml version="1.0" encoding="utf-8"?>
+<p:sld xmlns:a="http://schemas.openxmlformats.org/drawingml/2006/main" xmlns:r="http://schemas.openxmlformats.org/officeDocument/2006/relationships" xmlns:p="http://schemas.openxmlformats.org/presentationml/2006/main">
+  <p:cSld>
+    <p:spTree>
+      <p:nvGrpSpPr>
+        <p:cNvPr id="1" name=""/>
+        <p:cNvGrpSpPr/>
+        <p:nvPr/>
+      </p:nvGrpSpPr>
+      <p:grpSpPr>
+        <a:xfrm>
+          <a:off x="0" y="0"/>
+          <a:ext cx="0" cy="0"/>
+          <a:chOff x="0" y="0"/>
+          <a:chExt cx="0" cy="0"/>
+        </a:xfrm>
+      </p:grpSpPr>
+      <p:sp>
+        <p:nvSpPr>
+          <p:cNvPr id="2" name="Titel 1"/>
+          <p:cNvSpPr>
+            <a:spLocks noGrp="1"/>
+          </p:cNvSpPr>
+          <p:nvPr>
+            <p:ph type="title"/>
+          </p:nvPr>
+        </p:nvSpPr>
+        <p:spPr/>
+        <p:txBody>
+          <a:bodyPr/>
+          <a:lstStyle/>
+          <a:p>
+            <a:r>
+              <a:rPr lang="de-DE" dirty="0" smtClean="0"/>
+              <a:t>…Spieltrieb</a:t>
+            </a:r>
+            <a:endParaRPr lang="de-DE" dirty="0"/>
+          </a:p>
+        </p:txBody>
+      </p:sp>
+      <p:sp>
+        <p:nvSpPr>
+          <p:cNvPr id="3" name="Datumsplatzhalter 2"/>
+          <p:cNvSpPr>
+            <a:spLocks noGrp="1"/>
+          </p:cNvSpPr>
+          <p:nvPr>
+            <p:ph type="dt" sz="half" idx="10"/>
+          </p:nvPr>
+        </p:nvSpPr>
+        <p:spPr/>
+        <p:txBody>
+          <a:bodyPr/>
+          <a:lstStyle/>
+          <a:p>
+            <a:fld id="{48352B5A-167D-4ED6-B7C9-BDA647A8BA51}" type="datetime1">
+              <a:rPr lang="de-DE" smtClean="0"/>
+              <a:t>21.11.2016</a:t>
+            </a:fld>
+            <a:endParaRPr lang="de-DE"/>
+          </a:p>
+        </p:txBody>
+      </p:sp>
+      <p:sp>
+        <p:nvSpPr>
+          <p:cNvPr id="4" name="Fußzeilenplatzhalter 3"/>
+          <p:cNvSpPr>
+            <a:spLocks noGrp="1"/>
+          </p:cNvSpPr>
+          <p:nvPr>
+            <p:ph type="ftr" sz="quarter" idx="11"/>
+          </p:nvPr>
+        </p:nvSpPr>
+        <p:spPr/>
+        <p:txBody>
+          <a:bodyPr/>
+          <a:lstStyle/>
+          <a:p>
+            <a:endParaRPr lang="de-DE"/>
+          </a:p>
+        </p:txBody>
+      </p:sp>
+      <p:sp>
+        <p:nvSpPr>
+          <p:cNvPr id="5" name="Foliennummernplatzhalter 4"/>
+          <p:cNvSpPr>
+            <a:spLocks noGrp="1"/>
+          </p:cNvSpPr>
+          <p:nvPr>
+            <p:ph type="sldNum" sz="quarter" idx="12"/>
+          </p:nvPr>
+        </p:nvSpPr>
+        <p:spPr/>
+        <p:txBody>
+          <a:bodyPr/>
+          <a:lstStyle/>
+          <a:p>
+            <a:fld id="{E07F1749-2C29-4AD9-BF92-E70F8884412B}" type="slidenum">
+              <a:rPr lang="de-DE" smtClean="0"/>
+              <a:t>5</a:t>
+            </a:fld>
+            <a:endParaRPr lang="de-DE"/>
+          </a:p>
+        </p:txBody>
+      </p:sp>
+      <p:sp>
+        <p:nvSpPr>
+          <p:cNvPr id="6" name="Inhaltsplatzhalter 5"/>
+          <p:cNvSpPr>
+            <a:spLocks noGrp="1"/>
+          </p:cNvSpPr>
+          <p:nvPr>
+            <p:ph sz="quarter" idx="13"/>
+          </p:nvPr>
+        </p:nvSpPr>
+        <p:spPr/>
+        <p:txBody>
+          <a:bodyPr/>
+          <a:lstStyle/>
+          <a:p>
+            <a:r>
+              <a:rPr lang="de-DE" dirty="0" smtClean="0"/>
+              <a:t>Man nehme…</a:t>
+            </a:r>
+          </a:p>
+          <a:p>
+            <a:pPr marL="342900" indent="-342900">
+              <a:buFont typeface="Arial" panose="020B0604020202020204" pitchFamily="34" charset="0"/>
+              <a:buChar char="•"/>
+            </a:pPr>
+            <a:r>
+              <a:rPr lang="de-DE" b="0" dirty="0" smtClean="0"/>
+              <a:t>2 Studenten</a:t>
+            </a:r>
+          </a:p>
+          <a:p>
+            <a:pPr marL="342900" indent="-342900">
+              <a:buFont typeface="Arial" panose="020B0604020202020204" pitchFamily="34" charset="0"/>
+              <a:buChar char="•"/>
+            </a:pPr>
+            <a:r>
+              <a:rPr lang="de-DE" b="0" dirty="0" smtClean="0"/>
+              <a:t>Etwas Hardware</a:t>
+            </a:r>
+          </a:p>
+          <a:p>
+            <a:pPr marL="342900" indent="-342900">
+              <a:buFont typeface="Arial" panose="020B0604020202020204" pitchFamily="34" charset="0"/>
+              <a:buChar char="•"/>
+            </a:pPr>
+            <a:r>
+              <a:rPr lang="de-DE" b="0" dirty="0" smtClean="0"/>
+              <a:t>Eine priese Neugier</a:t>
+            </a:r>
+          </a:p>
+          <a:p>
+            <a:pPr marL="342900" indent="-342900">
+              <a:buFont typeface="Arial" panose="020B0604020202020204" pitchFamily="34" charset="0"/>
+              <a:buChar char="•"/>
+            </a:pPr>
+            <a:r>
+              <a:rPr lang="de-DE" b="0" dirty="0" smtClean="0"/>
+              <a:t>Die ein oder andere Portion Node.JS</a:t>
+            </a:r>
+          </a:p>
+          <a:p>
+            <a:pPr marL="342900" indent="-342900">
+              <a:buFont typeface="Arial" panose="020B0604020202020204" pitchFamily="34" charset="0"/>
+              <a:buChar char="•"/>
+            </a:pPr>
+            <a:r>
+              <a:rPr lang="de-DE" b="0" dirty="0" smtClean="0"/>
+              <a:t>Kräftig spielen…</a:t>
+            </a:r>
+          </a:p>
+          <a:p>
+            <a:pPr algn="ctr"/>
+            <a:r>
+              <a:rPr lang="de-DE" b="0" dirty="0" smtClean="0"/>
+              <a:t>… fertig ist das </a:t>
+            </a:r>
+            <a:r>
+              <a:rPr lang="de-DE" b="0" dirty="0" err="1" smtClean="0"/>
+              <a:t>IoT</a:t>
+            </a:r>
+            <a:r>
+              <a:rPr lang="de-DE" b="0" dirty="0" smtClean="0"/>
+              <a:t>?</a:t>
+            </a:r>
+          </a:p>
+          <a:p>
+            <a:pPr algn="ctr"/>
+            <a:r>
+              <a:rPr lang="de-DE" b="0" dirty="0" smtClean="0"/>
+              <a:t>Nicht ganz aber fast!</a:t>
+            </a:r>
+          </a:p>
+          <a:p>
+            <a:pPr marL="342900" indent="-342900">
+              <a:buFont typeface="Arial" panose="020B0604020202020204" pitchFamily="34" charset="0"/>
+              <a:buChar char="•"/>
+            </a:pPr>
+            <a:endParaRPr lang="de-DE" dirty="0"/>
+          </a:p>
+        </p:txBody>
+      </p:sp>
+    </p:spTree>
+    <p:extLst>
+      <p:ext uri="{BB962C8B-B14F-4D97-AF65-F5344CB8AC3E}">
+        <p14:creationId xmlns:p14="http://schemas.microsoft.com/office/powerpoint/2010/main" val="34334879"/>
+      </p:ext>
+    </p:extLst>
+  </p:cSld>
+  <p:clrMapOvr>
+    <a:masterClrMapping/>
+  </p:clrMapOvr>
+  <p:timing>
+    <p:tnLst>
+      <p:par>
+        <p:cTn id="1" dur="indefinite" restart="never" nodeType="tmRoot"/>
+      </p:par>
+    </p:tnLst>
+  </p:timing>
+</p:sld>
+</file>
+
+<file path=ppt/slides/slide6.xml><?xml version="1.0" encoding="utf-8"?>
+<p:sld xmlns:a="http://schemas.openxmlformats.org/drawingml/2006/main" xmlns:r="http://schemas.openxmlformats.org/officeDocument/2006/relationships" xmlns:p="http://schemas.openxmlformats.org/presentationml/2006/main">
+  <p:cSld>
+    <p:spTree>
+      <p:nvGrpSpPr>
+        <p:cNvPr id="1" name=""/>
+        <p:cNvGrpSpPr/>
+        <p:nvPr/>
+      </p:nvGrpSpPr>
+      <p:grpSpPr>
+        <a:xfrm>
+          <a:off x="0" y="0"/>
+          <a:ext cx="0" cy="0"/>
+          <a:chOff x="0" y="0"/>
+          <a:chExt cx="0" cy="0"/>
+        </a:xfrm>
+      </p:grpSpPr>
+      <p:sp>
+        <p:nvSpPr>
+          <p:cNvPr id="2" name="Titel 1"/>
+          <p:cNvSpPr>
+            <a:spLocks noGrp="1"/>
+          </p:cNvSpPr>
+          <p:nvPr>
+            <p:ph type="title"/>
+          </p:nvPr>
+        </p:nvSpPr>
+        <p:spPr/>
+        <p:txBody>
+          <a:bodyPr/>
+          <a:lstStyle/>
+          <a:p>
+            <a:r>
+              <a:rPr lang="de-DE" dirty="0"/>
+              <a:t>Für unsere </a:t>
+            </a:r>
+            <a:r>
+              <a:rPr lang="de-DE" dirty="0" smtClean="0"/>
+              <a:t>Demo</a:t>
+            </a:r>
+            <a:r>
+              <a:rPr lang="de-DE" dirty="0"/>
+              <a:t> </a:t>
+            </a:r>
+            <a:r>
+              <a:rPr lang="de-DE" dirty="0" smtClean="0"/>
+              <a:t>verwenden wir:</a:t>
+            </a:r>
+            <a:endParaRPr lang="de-DE" dirty="0"/>
+          </a:p>
+        </p:txBody>
+      </p:sp>
+      <p:sp>
+        <p:nvSpPr>
+          <p:cNvPr id="3" name="Datumsplatzhalter 2"/>
+          <p:cNvSpPr>
+            <a:spLocks noGrp="1"/>
+          </p:cNvSpPr>
+          <p:nvPr>
+            <p:ph type="dt" sz="half" idx="10"/>
+          </p:nvPr>
+        </p:nvSpPr>
+        <p:spPr/>
+        <p:txBody>
+          <a:bodyPr/>
+          <a:lstStyle/>
+          <a:p>
+            <a:fld id="{48352B5A-167D-4ED6-B7C9-BDA647A8BA51}" type="datetime1">
+              <a:rPr lang="de-DE" smtClean="0"/>
+              <a:t>21.11.2016</a:t>
+            </a:fld>
+            <a:endParaRPr lang="de-DE"/>
+          </a:p>
+        </p:txBody>
+      </p:sp>
+      <p:sp>
+        <p:nvSpPr>
+          <p:cNvPr id="4" name="Fußzeilenplatzhalter 3"/>
+          <p:cNvSpPr>
+            <a:spLocks noGrp="1"/>
+          </p:cNvSpPr>
+          <p:nvPr>
+            <p:ph type="ftr" sz="quarter" idx="11"/>
+          </p:nvPr>
+        </p:nvSpPr>
+        <p:spPr/>
+        <p:txBody>
+          <a:bodyPr/>
+          <a:lstStyle/>
+          <a:p>
+            <a:endParaRPr lang="de-DE"/>
+          </a:p>
+        </p:txBody>
+      </p:sp>
+      <p:sp>
+        <p:nvSpPr>
+          <p:cNvPr id="5" name="Foliennummernplatzhalter 4"/>
+          <p:cNvSpPr>
+            <a:spLocks noGrp="1"/>
+          </p:cNvSpPr>
+          <p:nvPr>
+            <p:ph type="sldNum" sz="quarter" idx="12"/>
+          </p:nvPr>
+        </p:nvSpPr>
+        <p:spPr/>
+        <p:txBody>
+          <a:bodyPr/>
+          <a:lstStyle/>
+          <a:p>
+            <a:fld id="{E07F1749-2C29-4AD9-BF92-E70F8884412B}" type="slidenum">
+              <a:rPr lang="de-DE" smtClean="0"/>
+              <a:t>6</a:t>
+            </a:fld>
+            <a:endParaRPr lang="de-DE"/>
+          </a:p>
+        </p:txBody>
+      </p:sp>
+      <p:sp>
+        <p:nvSpPr>
+          <p:cNvPr id="6" name="Inhaltsplatzhalter 5"/>
+          <p:cNvSpPr>
+            <a:spLocks noGrp="1"/>
+          </p:cNvSpPr>
+          <p:nvPr>
+            <p:ph sz="quarter" idx="13"/>
+          </p:nvPr>
+        </p:nvSpPr>
+        <p:spPr/>
+        <p:txBody>
+          <a:bodyPr/>
+          <a:lstStyle/>
+          <a:p>
+            <a:r>
+              <a:rPr lang="de-DE" dirty="0" err="1" smtClean="0"/>
+              <a:t>Fritz.Box</a:t>
+            </a:r>
+            <a:r>
+              <a:rPr lang="de-DE" b="0" dirty="0" smtClean="0"/>
+              <a:t> </a:t>
+            </a:r>
+            <a:r>
+              <a:rPr lang="de-DE" b="0" dirty="0"/>
+              <a:t>als </a:t>
+            </a:r>
+            <a:r>
+              <a:rPr lang="de-DE" b="0" dirty="0" smtClean="0"/>
+              <a:t>Access-Point </a:t>
+            </a:r>
+            <a:r>
+              <a:rPr lang="de-DE" b="0" dirty="0"/>
+              <a:t>und </a:t>
+            </a:r>
+            <a:r>
+              <a:rPr lang="de-DE" b="0" dirty="0" smtClean="0"/>
+              <a:t>Router</a:t>
+            </a:r>
+          </a:p>
+          <a:p>
+            <a:endParaRPr lang="de-DE" b="0" dirty="0"/>
+          </a:p>
+          <a:p>
+            <a:r>
+              <a:rPr lang="de-DE" dirty="0" err="1" smtClean="0"/>
+              <a:t>Raspberry</a:t>
+            </a:r>
+            <a:r>
+              <a:rPr lang="de-DE" dirty="0"/>
+              <a:t>-</a:t>
+            </a:r>
+            <a:r>
+              <a:rPr lang="de-DE" dirty="0" smtClean="0"/>
+              <a:t>PI 2B </a:t>
+            </a:r>
+            <a:r>
+              <a:rPr lang="de-DE" b="0" dirty="0" smtClean="0"/>
+              <a:t>als Host</a:t>
+            </a:r>
+          </a:p>
+          <a:p>
+            <a:r>
+              <a:rPr lang="de-DE" b="0" dirty="0"/>
+              <a:t>	</a:t>
+            </a:r>
+            <a:r>
+              <a:rPr lang="de-DE" b="0" dirty="0" err="1" smtClean="0"/>
+              <a:t>NodeJS</a:t>
+            </a:r>
+            <a:r>
+              <a:rPr lang="de-DE" b="0" dirty="0" smtClean="0"/>
+              <a:t>, </a:t>
+            </a:r>
+            <a:r>
+              <a:rPr lang="de-DE" b="0" dirty="0" err="1" smtClean="0"/>
+              <a:t>ExpressJS</a:t>
+            </a:r>
+            <a:r>
+              <a:rPr lang="de-DE" b="0" dirty="0" smtClean="0"/>
+              <a:t>, …</a:t>
+            </a:r>
+          </a:p>
+          <a:p>
+            <a:endParaRPr lang="de-DE" b="0" dirty="0" smtClean="0"/>
+          </a:p>
+          <a:p>
+            <a:r>
+              <a:rPr lang="de-DE" dirty="0" smtClean="0"/>
+              <a:t>ESP8266</a:t>
+            </a:r>
+            <a:r>
+              <a:rPr lang="de-DE" b="0" dirty="0" smtClean="0"/>
+              <a:t> als programmierbare </a:t>
+            </a:r>
+            <a:r>
+              <a:rPr lang="de-DE" b="0" dirty="0" err="1" smtClean="0"/>
+              <a:t>WiFi</a:t>
+            </a:r>
+            <a:r>
+              <a:rPr lang="de-DE" b="0" dirty="0" smtClean="0"/>
+              <a:t>-Devices</a:t>
+            </a:r>
+            <a:endParaRPr lang="de-DE" b="0" dirty="0"/>
+          </a:p>
+          <a:p>
+            <a:r>
+              <a:rPr lang="de-DE" b="0" dirty="0"/>
+              <a:t>	</a:t>
+            </a:r>
+            <a:r>
+              <a:rPr lang="de-DE" b="0" dirty="0" err="1"/>
+              <a:t>Arduino</a:t>
+            </a:r>
+            <a:r>
+              <a:rPr lang="de-DE" b="0" dirty="0"/>
+              <a:t>-IDE, C, C</a:t>
+            </a:r>
+            <a:r>
+              <a:rPr lang="de-DE" b="0" dirty="0" smtClean="0"/>
+              <a:t>++</a:t>
+            </a:r>
+          </a:p>
+          <a:p>
+            <a:r>
+              <a:rPr lang="de-DE" b="0" dirty="0"/>
+              <a:t>	</a:t>
+            </a:r>
+            <a:r>
+              <a:rPr lang="de-DE" b="0" dirty="0" smtClean="0"/>
+              <a:t>Diverse Hardware zur Demonstration</a:t>
+            </a:r>
+          </a:p>
+          <a:p>
+            <a:endParaRPr lang="de-DE" b="0" dirty="0" smtClean="0"/>
+          </a:p>
+          <a:p>
+            <a:endParaRPr lang="de-DE" dirty="0" smtClean="0"/>
+          </a:p>
+        </p:txBody>
+      </p:sp>
+    </p:spTree>
+    <p:extLst>
+      <p:ext uri="{BB962C8B-B14F-4D97-AF65-F5344CB8AC3E}">
+        <p14:creationId xmlns:p14="http://schemas.microsoft.com/office/powerpoint/2010/main" val="3325320967"/>
+      </p:ext>
+    </p:extLst>
+  </p:cSld>
+  <p:clrMapOvr>
+    <a:masterClrMapping/>
+  </p:clrMapOvr>
+  <p:timing>
+    <p:tnLst>
+      <p:par>
+        <p:cTn id="1" dur="indefinite" restart="never" nodeType="tmRoot"/>
+      </p:par>
+    </p:tnLst>
+  </p:timing>
+</p:sld>
+</file>
+
+<file path=ppt/slides/slide7.xml><?xml version="1.0" encoding="utf-8"?>
+<p:sld xmlns:a="http://schemas.openxmlformats.org/drawingml/2006/main" xmlns:r="http://schemas.openxmlformats.org/officeDocument/2006/relationships" xmlns:p="http://schemas.openxmlformats.org/presentationml/2006/main">
+  <p:cSld>
+    <p:spTree>
+      <p:nvGrpSpPr>
+        <p:cNvPr id="1" name=""/>
+        <p:cNvGrpSpPr/>
+        <p:nvPr/>
+      </p:nvGrpSpPr>
+      <p:grpSpPr>
+        <a:xfrm>
+          <a:off x="0" y="0"/>
+          <a:ext cx="0" cy="0"/>
+          <a:chOff x="0" y="0"/>
+          <a:chExt cx="0" cy="0"/>
+        </a:xfrm>
+      </p:grpSpPr>
+      <p:sp>
+        <p:nvSpPr>
+          <p:cNvPr id="2" name="Titel 1"/>
+          <p:cNvSpPr>
+            <a:spLocks noGrp="1"/>
+          </p:cNvSpPr>
+          <p:nvPr>
+            <p:ph type="title"/>
+          </p:nvPr>
+        </p:nvSpPr>
+        <p:spPr/>
+        <p:txBody>
+          <a:bodyPr/>
+          <a:lstStyle/>
+          <a:p>
+            <a:r>
+              <a:rPr lang="de-DE" dirty="0" smtClean="0"/>
+              <a:t>Präsentation Dashboard und </a:t>
+            </a:r>
+            <a:r>
+              <a:rPr lang="de-DE" dirty="0" err="1" smtClean="0"/>
+              <a:t>SystemArchitektur</a:t>
+            </a:r>
+            <a:endParaRPr lang="de-DE" dirty="0"/>
+          </a:p>
+        </p:txBody>
+      </p:sp>
+      <p:sp>
+        <p:nvSpPr>
+          <p:cNvPr id="3" name="Datumsplatzhalter 2"/>
+          <p:cNvSpPr>
+            <a:spLocks noGrp="1"/>
+          </p:cNvSpPr>
+          <p:nvPr>
+            <p:ph type="dt" sz="half" idx="10"/>
+          </p:nvPr>
+        </p:nvSpPr>
+        <p:spPr/>
+        <p:txBody>
+          <a:bodyPr/>
+          <a:lstStyle/>
+          <a:p>
+            <a:fld id="{48352B5A-167D-4ED6-B7C9-BDA647A8BA51}" type="datetime1">
+              <a:rPr lang="de-DE" smtClean="0"/>
+              <a:t>21.11.2016</a:t>
+            </a:fld>
+            <a:endParaRPr lang="de-DE"/>
+          </a:p>
+        </p:txBody>
+      </p:sp>
+      <p:sp>
+        <p:nvSpPr>
+          <p:cNvPr id="4" name="Fußzeilenplatzhalter 3"/>
+          <p:cNvSpPr>
+            <a:spLocks noGrp="1"/>
+          </p:cNvSpPr>
+          <p:nvPr>
+            <p:ph type="ftr" sz="quarter" idx="11"/>
+          </p:nvPr>
+        </p:nvSpPr>
+        <p:spPr/>
+        <p:txBody>
+          <a:bodyPr/>
+          <a:lstStyle/>
+          <a:p>
+            <a:endParaRPr lang="de-DE"/>
+          </a:p>
+        </p:txBody>
+      </p:sp>
+      <p:sp>
+        <p:nvSpPr>
+          <p:cNvPr id="11" name="Abgerundetes Rechteck 10"/>
+          <p:cNvSpPr/>
+          <p:nvPr/>
+        </p:nvSpPr>
+        <p:spPr>
+          <a:xfrm>
+            <a:off x="792485" y="2065041"/>
+            <a:ext cx="4597875" cy="726751"/>
+          </a:xfrm>
+          <a:prstGeom prst="roundRect">
+            <a:avLst/>
+          </a:prstGeom>
+        </p:spPr>
+        <p:style>
+          <a:lnRef idx="2">
+            <a:schemeClr val="accent1">
+              <a:shade val="50000"/>
+            </a:schemeClr>
+          </a:lnRef>
+          <a:fillRef idx="1">
+            <a:schemeClr val="accent1"/>
+          </a:fillRef>
+          <a:effectRef idx="0">
+            <a:schemeClr val="accent1"/>
+          </a:effectRef>
+          <a:fontRef idx="minor">
+            <a:schemeClr val="lt1"/>
+          </a:fontRef>
+        </p:style>
+        <p:txBody>
+          <a:bodyPr rtlCol="0" anchor="ctr"/>
+          <a:lstStyle/>
+          <a:p>
+            <a:pPr algn="ctr"/>
+            <a:r>
+              <a:rPr lang="de-DE" dirty="0" smtClean="0"/>
+              <a:t>Dashboard View</a:t>
+            </a:r>
+            <a:endParaRPr lang="de-DE" dirty="0"/>
+          </a:p>
+        </p:txBody>
+      </p:sp>
+      <p:sp>
+        <p:nvSpPr>
+          <p:cNvPr id="5" name="Foliennummernplatzhalter 4"/>
+          <p:cNvSpPr>
+            <a:spLocks noGrp="1"/>
+          </p:cNvSpPr>
+          <p:nvPr>
+            <p:ph type="sldNum" sz="quarter" idx="12"/>
+          </p:nvPr>
+        </p:nvSpPr>
+        <p:spPr/>
+        <p:txBody>
+          <a:bodyPr/>
+          <a:lstStyle/>
+          <a:p>
+            <a:fld id="{E07F1749-2C29-4AD9-BF92-E70F8884412B}" type="slidenum">
+              <a:rPr lang="de-DE" smtClean="0"/>
+              <a:t>7</a:t>
+            </a:fld>
+            <a:endParaRPr lang="de-DE"/>
+          </a:p>
+        </p:txBody>
+      </p:sp>
+      <p:sp>
+        <p:nvSpPr>
+          <p:cNvPr id="9" name="Abgerundetes Rechteck 8"/>
+          <p:cNvSpPr/>
+          <p:nvPr/>
+        </p:nvSpPr>
+        <p:spPr>
+          <a:xfrm>
+            <a:off x="792484" y="3014649"/>
+            <a:ext cx="4597875" cy="589409"/>
+          </a:xfrm>
+          <a:prstGeom prst="roundRect">
+            <a:avLst/>
+          </a:prstGeom>
+        </p:spPr>
+        <p:style>
+          <a:lnRef idx="2">
+            <a:schemeClr val="accent4">
+              <a:shade val="50000"/>
+            </a:schemeClr>
+          </a:lnRef>
+          <a:fillRef idx="1">
+            <a:schemeClr val="accent4"/>
+          </a:fillRef>
+          <a:effectRef idx="0">
+            <a:schemeClr val="accent4"/>
+          </a:effectRef>
+          <a:fontRef idx="minor">
+            <a:schemeClr val="lt1"/>
+          </a:fontRef>
+        </p:style>
+        <p:txBody>
+          <a:bodyPr rtlCol="0" anchor="ctr"/>
+          <a:lstStyle/>
+          <a:p>
+            <a:pPr algn="ctr"/>
+            <a:r>
+              <a:rPr lang="de-DE" dirty="0" err="1" smtClean="0"/>
+              <a:t>SmartHomeServer</a:t>
+            </a:r>
+            <a:endParaRPr lang="de-DE" dirty="0"/>
+          </a:p>
+        </p:txBody>
+      </p:sp>
+      <p:sp>
+        <p:nvSpPr>
+          <p:cNvPr id="10" name="Abgerundetes Rechteck 9"/>
+          <p:cNvSpPr/>
+          <p:nvPr/>
+        </p:nvSpPr>
+        <p:spPr>
+          <a:xfrm>
+            <a:off x="792485" y="3789460"/>
+            <a:ext cx="9329128" cy="519983"/>
+          </a:xfrm>
+          <a:prstGeom prst="roundRect">
+            <a:avLst/>
+          </a:prstGeom>
+        </p:spPr>
+        <p:style>
+          <a:lnRef idx="2">
+            <a:schemeClr val="accent2">
+              <a:shade val="50000"/>
+            </a:schemeClr>
+          </a:lnRef>
+          <a:fillRef idx="1">
+            <a:schemeClr val="accent2"/>
+          </a:fillRef>
+          <a:effectRef idx="0">
+            <a:schemeClr val="accent2"/>
+          </a:effectRef>
+          <a:fontRef idx="minor">
+            <a:schemeClr val="lt1"/>
+          </a:fontRef>
+        </p:style>
+        <p:txBody>
+          <a:bodyPr rtlCol="0" anchor="ctr"/>
+          <a:lstStyle/>
+          <a:p>
+            <a:pPr algn="ctr"/>
+            <a:r>
+              <a:rPr lang="de-DE" dirty="0" err="1" smtClean="0"/>
+              <a:t>IoT</a:t>
+            </a:r>
+            <a:r>
+              <a:rPr lang="de-DE" dirty="0" smtClean="0"/>
+              <a:t>-Gateway</a:t>
+            </a:r>
+            <a:endParaRPr lang="de-DE" dirty="0"/>
+          </a:p>
+        </p:txBody>
+      </p:sp>
+      <p:sp>
+        <p:nvSpPr>
+          <p:cNvPr id="12" name="Abgerundetes Rechteck 11"/>
+          <p:cNvSpPr/>
+          <p:nvPr/>
+        </p:nvSpPr>
+        <p:spPr>
+          <a:xfrm>
+            <a:off x="792484" y="4481500"/>
+            <a:ext cx="2232248" cy="519982"/>
+          </a:xfrm>
+          <a:prstGeom prst="roundRect">
+            <a:avLst/>
+          </a:prstGeom>
+        </p:spPr>
+        <p:style>
+          <a:lnRef idx="2">
+            <a:schemeClr val="accent3">
+              <a:shade val="50000"/>
+            </a:schemeClr>
+          </a:lnRef>
+          <a:fillRef idx="1">
+            <a:schemeClr val="accent3"/>
+          </a:fillRef>
+          <a:effectRef idx="0">
+            <a:schemeClr val="accent3"/>
+          </a:effectRef>
+          <a:fontRef idx="minor">
+            <a:schemeClr val="lt1"/>
+          </a:fontRef>
+        </p:style>
+        <p:txBody>
+          <a:bodyPr rtlCol="0" anchor="ctr"/>
+          <a:lstStyle/>
+          <a:p>
+            <a:pPr algn="ctr"/>
+            <a:r>
+              <a:rPr lang="de-DE" dirty="0" smtClean="0"/>
+              <a:t>Briefkasten</a:t>
+            </a:r>
+            <a:endParaRPr lang="de-DE" dirty="0"/>
+          </a:p>
+        </p:txBody>
+      </p:sp>
+      <p:sp>
+        <p:nvSpPr>
+          <p:cNvPr id="13" name="Abgerundetes Rechteck 12"/>
+          <p:cNvSpPr/>
+          <p:nvPr/>
+        </p:nvSpPr>
+        <p:spPr>
+          <a:xfrm>
+            <a:off x="3158110" y="4487828"/>
+            <a:ext cx="2232248" cy="519982"/>
+          </a:xfrm>
+          <a:prstGeom prst="roundRect">
+            <a:avLst/>
+          </a:prstGeom>
+        </p:spPr>
+        <p:style>
+          <a:lnRef idx="2">
+            <a:schemeClr val="accent3">
+              <a:shade val="50000"/>
+            </a:schemeClr>
+          </a:lnRef>
+          <a:fillRef idx="1">
+            <a:schemeClr val="accent3"/>
+          </a:fillRef>
+          <a:effectRef idx="0">
+            <a:schemeClr val="accent3"/>
+          </a:effectRef>
+          <a:fontRef idx="minor">
+            <a:schemeClr val="lt1"/>
+          </a:fontRef>
+        </p:style>
+        <p:txBody>
+          <a:bodyPr rtlCol="0" anchor="ctr"/>
+          <a:lstStyle/>
+          <a:p>
+            <a:pPr algn="ctr"/>
+            <a:r>
+              <a:rPr lang="de-DE" dirty="0" smtClean="0"/>
+              <a:t>LED-Display</a:t>
+            </a:r>
+            <a:endParaRPr lang="de-DE" dirty="0"/>
+          </a:p>
+        </p:txBody>
+      </p:sp>
+      <p:sp>
+        <p:nvSpPr>
+          <p:cNvPr id="14" name="Abgerundetes Rechteck 13"/>
+          <p:cNvSpPr/>
+          <p:nvPr/>
+        </p:nvSpPr>
+        <p:spPr>
+          <a:xfrm>
+            <a:off x="5523737" y="4487828"/>
+            <a:ext cx="2232248" cy="519982"/>
+          </a:xfrm>
+          <a:prstGeom prst="roundRect">
+            <a:avLst/>
+          </a:prstGeom>
+        </p:spPr>
+        <p:style>
+          <a:lnRef idx="2">
+            <a:schemeClr val="accent3">
+              <a:shade val="50000"/>
+            </a:schemeClr>
+          </a:lnRef>
+          <a:fillRef idx="1">
+            <a:schemeClr val="accent3"/>
+          </a:fillRef>
+          <a:effectRef idx="0">
+            <a:schemeClr val="accent3"/>
+          </a:effectRef>
+          <a:fontRef idx="minor">
+            <a:schemeClr val="lt1"/>
+          </a:fontRef>
+        </p:style>
+        <p:txBody>
+          <a:bodyPr rtlCol="0" anchor="ctr"/>
+          <a:lstStyle/>
+          <a:p>
+            <a:pPr algn="ctr"/>
+            <a:r>
+              <a:rPr lang="de-DE" dirty="0" err="1" smtClean="0"/>
+              <a:t>Termometer</a:t>
+            </a:r>
+            <a:endParaRPr lang="de-DE" dirty="0"/>
+          </a:p>
+        </p:txBody>
+      </p:sp>
+      <p:sp>
+        <p:nvSpPr>
+          <p:cNvPr id="15" name="Abgerundetes Rechteck 14"/>
+          <p:cNvSpPr/>
+          <p:nvPr/>
+        </p:nvSpPr>
+        <p:spPr>
+          <a:xfrm>
+            <a:off x="7889363" y="4487828"/>
+            <a:ext cx="2232248" cy="519982"/>
+          </a:xfrm>
+          <a:prstGeom prst="roundRect">
+            <a:avLst/>
+          </a:prstGeom>
+        </p:spPr>
+        <p:style>
+          <a:lnRef idx="2">
+            <a:schemeClr val="accent3">
+              <a:shade val="50000"/>
+            </a:schemeClr>
+          </a:lnRef>
+          <a:fillRef idx="1">
+            <a:schemeClr val="accent3"/>
+          </a:fillRef>
+          <a:effectRef idx="0">
+            <a:schemeClr val="accent3"/>
+          </a:effectRef>
+          <a:fontRef idx="minor">
+            <a:schemeClr val="lt1"/>
+          </a:fontRef>
+        </p:style>
+        <p:txBody>
+          <a:bodyPr rtlCol="0" anchor="ctr"/>
+          <a:lstStyle/>
+          <a:p>
+            <a:pPr algn="ctr"/>
+            <a:r>
+              <a:rPr lang="de-DE" dirty="0" smtClean="0"/>
+              <a:t>RGB-Würfel</a:t>
+            </a:r>
+            <a:endParaRPr lang="de-DE" dirty="0"/>
+          </a:p>
+        </p:txBody>
+      </p:sp>
+      <p:sp>
+        <p:nvSpPr>
+          <p:cNvPr id="16" name="Abgerundetes Rechteck 15"/>
+          <p:cNvSpPr/>
+          <p:nvPr/>
+        </p:nvSpPr>
+        <p:spPr>
+          <a:xfrm>
+            <a:off x="6523889" y="2065041"/>
+            <a:ext cx="3597724" cy="564306"/>
+          </a:xfrm>
+          <a:prstGeom prst="roundRect">
+            <a:avLst/>
+          </a:prstGeom>
+        </p:spPr>
+        <p:style>
+          <a:lnRef idx="1">
+            <a:schemeClr val="dk1"/>
+          </a:lnRef>
+          <a:fillRef idx="2">
+            <a:schemeClr val="dk1"/>
+          </a:fillRef>
+          <a:effectRef idx="1">
+            <a:schemeClr val="dk1"/>
+          </a:effectRef>
+          <a:fontRef idx="minor">
+            <a:schemeClr val="dk1"/>
+          </a:fontRef>
+        </p:style>
+        <p:txBody>
+          <a:bodyPr rtlCol="0" anchor="ctr"/>
+          <a:lstStyle/>
+          <a:p>
+            <a:pPr algn="ctr"/>
+            <a:r>
+              <a:rPr lang="de-DE" dirty="0" smtClean="0"/>
+              <a:t>WWW</a:t>
+            </a:r>
+            <a:endParaRPr lang="de-DE" dirty="0"/>
+          </a:p>
+        </p:txBody>
+      </p:sp>
+      <p:cxnSp>
+        <p:nvCxnSpPr>
+          <p:cNvPr id="18" name="Gerade Verbindung mit Pfeil 17"/>
+          <p:cNvCxnSpPr/>
+          <p:nvPr/>
+        </p:nvCxnSpPr>
+        <p:spPr>
+          <a:xfrm>
+            <a:off x="8713365" y="2613024"/>
+            <a:ext cx="1" cy="1160113"/>
+          </a:xfrm>
+          <a:prstGeom prst="straightConnector1">
+            <a:avLst/>
+          </a:prstGeom>
+          <a:ln w="57150">
+            <a:solidFill>
+              <a:schemeClr val="accent1"/>
+            </a:solidFill>
+            <a:headEnd type="triangle" w="med" len="med"/>
+            <a:tailEnd type="triangle" w="med" len="med"/>
+          </a:ln>
+        </p:spPr>
+        <p:style>
+          <a:lnRef idx="1">
+            <a:schemeClr val="accent1"/>
+          </a:lnRef>
+          <a:fillRef idx="0">
+            <a:schemeClr val="accent1"/>
+          </a:fillRef>
+          <a:effectRef idx="0">
+            <a:schemeClr val="accent1"/>
+          </a:effectRef>
+          <a:fontRef idx="minor">
+            <a:schemeClr val="tx1"/>
+          </a:fontRef>
+        </p:style>
+      </p:cxnSp>
+      <p:cxnSp>
+        <p:nvCxnSpPr>
+          <p:cNvPr id="20" name="Gewinkelte Verbindung 19"/>
+          <p:cNvCxnSpPr>
+            <a:stCxn id="16" idx="2"/>
+            <a:endCxn id="9" idx="3"/>
+          </p:cNvCxnSpPr>
+          <p:nvPr/>
+        </p:nvCxnSpPr>
+        <p:spPr>
+          <a:xfrm rot="5400000">
+            <a:off x="6516552" y="1503154"/>
+            <a:ext cx="680007" cy="2932392"/>
+          </a:xfrm>
+          <a:prstGeom prst="bentConnector2">
+            <a:avLst/>
+          </a:prstGeom>
+          <a:ln w="57150">
+            <a:solidFill>
+              <a:schemeClr val="accent1"/>
+            </a:solidFill>
+            <a:headEnd type="triangle" w="med" len="med"/>
+            <a:tailEnd type="triangle" w="med" len="med"/>
+          </a:ln>
+        </p:spPr>
+        <p:style>
+          <a:lnRef idx="1">
+            <a:schemeClr val="accent1"/>
+          </a:lnRef>
+          <a:fillRef idx="0">
+            <a:schemeClr val="accent1"/>
+          </a:fillRef>
+          <a:effectRef idx="0">
+            <a:schemeClr val="accent1"/>
+          </a:effectRef>
+          <a:fontRef idx="minor">
+            <a:schemeClr val="tx1"/>
+          </a:fontRef>
+        </p:style>
+      </p:cxnSp>
+    </p:spTree>
+    <p:extLst>
+      <p:ext uri="{BB962C8B-B14F-4D97-AF65-F5344CB8AC3E}">
+        <p14:creationId xmlns:p14="http://schemas.microsoft.com/office/powerpoint/2010/main" val="2765359304"/>
+      </p:ext>
+    </p:extLst>
+  </p:cSld>
+  <p:clrMapOvr>
+    <a:masterClrMapping/>
+  </p:clrMapOvr>
+</p:sld>
+</file>
+
+<file path=ppt/slides/slide8.xml><?xml version="1.0" encoding="utf-8"?>
+<p:sld xmlns:a="http://schemas.openxmlformats.org/drawingml/2006/main" xmlns:r="http://schemas.openxmlformats.org/officeDocument/2006/relationships" xmlns:p="http://schemas.openxmlformats.org/presentationml/2006/main">
+  <p:cSld>
+    <p:spTree>
+      <p:nvGrpSpPr>
+        <p:cNvPr id="1" name=""/>
+        <p:cNvGrpSpPr/>
+        <p:nvPr/>
+      </p:nvGrpSpPr>
+      <p:grpSpPr>
+        <a:xfrm>
+          <a:off x="0" y="0"/>
+          <a:ext cx="0" cy="0"/>
+          <a:chOff x="0" y="0"/>
+          <a:chExt cx="0" cy="0"/>
+        </a:xfrm>
+      </p:grpSpPr>
+      <p:sp>
+        <p:nvSpPr>
+          <p:cNvPr id="2" name="Titel 1"/>
+          <p:cNvSpPr>
+            <a:spLocks noGrp="1"/>
+          </p:cNvSpPr>
+          <p:nvPr>
+            <p:ph type="title"/>
+          </p:nvPr>
+        </p:nvSpPr>
+        <p:spPr/>
+        <p:txBody>
+          <a:bodyPr/>
+          <a:lstStyle/>
+          <a:p>
+            <a:r>
+              <a:rPr lang="de-DE" dirty="0" smtClean="0"/>
+              <a:t>Das Szenario</a:t>
+            </a:r>
+            <a:endParaRPr lang="de-DE" dirty="0"/>
+          </a:p>
+        </p:txBody>
+      </p:sp>
+      <p:sp>
+        <p:nvSpPr>
+          <p:cNvPr id="3" name="Datumsplatzhalter 2"/>
+          <p:cNvSpPr>
+            <a:spLocks noGrp="1"/>
+          </p:cNvSpPr>
+          <p:nvPr>
+            <p:ph type="dt" sz="half" idx="10"/>
+          </p:nvPr>
+        </p:nvSpPr>
+        <p:spPr/>
+        <p:txBody>
+          <a:bodyPr/>
+          <a:lstStyle/>
+          <a:p>
+            <a:fld id="{48352B5A-167D-4ED6-B7C9-BDA647A8BA51}" type="datetime1">
+              <a:rPr lang="de-DE" smtClean="0"/>
+              <a:t>21.11.2016</a:t>
+            </a:fld>
+            <a:endParaRPr lang="de-DE"/>
+          </a:p>
+        </p:txBody>
+      </p:sp>
+      <p:sp>
+        <p:nvSpPr>
+          <p:cNvPr id="4" name="Fußzeilenplatzhalter 3"/>
+          <p:cNvSpPr>
+            <a:spLocks noGrp="1"/>
+          </p:cNvSpPr>
+          <p:nvPr>
+            <p:ph type="ftr" sz="quarter" idx="11"/>
+          </p:nvPr>
+        </p:nvSpPr>
+        <p:spPr/>
+        <p:txBody>
+          <a:bodyPr/>
+          <a:lstStyle/>
+          <a:p>
+            <a:endParaRPr lang="de-DE" dirty="0"/>
+          </a:p>
+        </p:txBody>
+      </p:sp>
+      <p:sp>
+        <p:nvSpPr>
+          <p:cNvPr id="5" name="Foliennummernplatzhalter 4"/>
+          <p:cNvSpPr>
+            <a:spLocks noGrp="1"/>
+          </p:cNvSpPr>
+          <p:nvPr>
+            <p:ph type="sldNum" sz="quarter" idx="12"/>
+          </p:nvPr>
+        </p:nvSpPr>
+        <p:spPr/>
+        <p:txBody>
+          <a:bodyPr/>
+          <a:lstStyle/>
+          <a:p>
+            <a:fld id="{E07F1749-2C29-4AD9-BF92-E70F8884412B}" type="slidenum">
+              <a:rPr lang="de-DE" smtClean="0"/>
+              <a:t>8</a:t>
+            </a:fld>
+            <a:endParaRPr lang="de-DE"/>
+          </a:p>
+        </p:txBody>
+      </p:sp>
+      <p:sp>
+        <p:nvSpPr>
+          <p:cNvPr id="6" name="Inhaltsplatzhalter 5"/>
+          <p:cNvSpPr>
+            <a:spLocks noGrp="1"/>
+          </p:cNvSpPr>
+          <p:nvPr>
+            <p:ph sz="quarter" idx="13"/>
+          </p:nvPr>
+        </p:nvSpPr>
+        <p:spPr/>
+        <p:txBody>
+          <a:bodyPr/>
+          <a:lstStyle/>
+          <a:p>
+            <a:r>
+              <a:rPr lang="de-DE" dirty="0" smtClean="0"/>
+              <a:t>Der Farbwürfel</a:t>
+            </a:r>
+          </a:p>
+          <a:p>
+            <a:r>
+              <a:rPr lang="de-DE" dirty="0"/>
+              <a:t>	</a:t>
+            </a:r>
+            <a:r>
+              <a:rPr lang="de-DE" b="0" dirty="0" smtClean="0"/>
+              <a:t>Dient der Zustandsanzeige, durch RGB-</a:t>
+            </a:r>
+            <a:r>
+              <a:rPr lang="de-DE" b="0" dirty="0" err="1" smtClean="0"/>
+              <a:t>LEDs</a:t>
+            </a:r>
+            <a:r>
+              <a:rPr lang="de-DE" dirty="0" err="1" smtClean="0"/>
+              <a:t>Das</a:t>
+            </a:r>
+            <a:r>
+              <a:rPr lang="de-DE" dirty="0" smtClean="0"/>
+              <a:t> Thermometer</a:t>
+            </a:r>
+          </a:p>
+          <a:p>
+            <a:r>
+              <a:rPr lang="de-DE" dirty="0"/>
+              <a:t>	</a:t>
+            </a:r>
+            <a:r>
+              <a:rPr lang="de-DE" b="0" dirty="0" smtClean="0"/>
+              <a:t>Misst Temperatur, Luftfeuchtigkeit und Helligkeit</a:t>
+            </a:r>
+          </a:p>
+          <a:p>
+            <a:r>
+              <a:rPr lang="de-DE" dirty="0" smtClean="0"/>
+              <a:t>Das LED-Display</a:t>
+            </a:r>
+          </a:p>
+          <a:p>
+            <a:r>
+              <a:rPr lang="de-DE" b="0" dirty="0"/>
+              <a:t>	</a:t>
+            </a:r>
+            <a:r>
+              <a:rPr lang="de-DE" b="0" dirty="0" smtClean="0"/>
+              <a:t>Zeigt Texte und Symbole an…</a:t>
+            </a:r>
+            <a:endParaRPr lang="de-DE" b="0" dirty="0"/>
+          </a:p>
+          <a:p>
+            <a:r>
+              <a:rPr lang="de-DE" dirty="0"/>
+              <a:t>Der </a:t>
+            </a:r>
+            <a:r>
+              <a:rPr lang="de-DE" dirty="0" smtClean="0"/>
+              <a:t>Briefkasten</a:t>
+            </a:r>
+          </a:p>
+          <a:p>
+            <a:r>
+              <a:rPr lang="de-DE" dirty="0"/>
+              <a:t>	</a:t>
+            </a:r>
+            <a:r>
+              <a:rPr lang="de-DE" b="0" dirty="0" smtClean="0"/>
+              <a:t>Dient der Beantwortung eurer Fragen</a:t>
+            </a:r>
+          </a:p>
+          <a:p>
+            <a:r>
+              <a:rPr lang="de-DE" b="0" dirty="0"/>
+              <a:t>	</a:t>
+            </a:r>
+            <a:r>
+              <a:rPr lang="de-DE" b="0" dirty="0" smtClean="0"/>
+              <a:t>	</a:t>
+            </a:r>
+            <a:r>
+              <a:rPr lang="de-DE" b="0" dirty="0" smtClean="0">
+                <a:hlinkClick r:id="rId3"/>
+              </a:rPr>
+              <a:t>http://dashboard/Fragen</a:t>
+            </a:r>
+            <a:endParaRPr lang="de-DE" b="0" dirty="0" smtClean="0"/>
+          </a:p>
+          <a:p>
+            <a:endParaRPr lang="de-DE" b="0" dirty="0"/>
+          </a:p>
+          <a:p>
+            <a:r>
+              <a:rPr lang="de-DE" dirty="0"/>
+              <a:t>	</a:t>
+            </a:r>
+          </a:p>
+          <a:p>
+            <a:endParaRPr lang="de-DE" dirty="0" smtClean="0"/>
+          </a:p>
+          <a:p>
+            <a:endParaRPr lang="de-DE" dirty="0"/>
+          </a:p>
+        </p:txBody>
+      </p:sp>
+    </p:spTree>
+    <p:extLst>
+      <p:ext uri="{BB962C8B-B14F-4D97-AF65-F5344CB8AC3E}">
+        <p14:creationId xmlns:p14="http://schemas.microsoft.com/office/powerpoint/2010/main" val="4083865870"/>
+      </p:ext>
+    </p:extLst>
+  </p:cSld>
+  <p:clrMapOvr>
+    <a:masterClrMapping/>
+  </p:clrMapOvr>
+  <p:timing>
+    <p:tnLst>
+      <p:par>
+        <p:cTn id="1" dur="indefinite" restart="never" nodeType="tmRoot"/>
+      </p:par>
+    </p:tnLst>
+  </p:timing>
+</p:sld>
+</file>
+
+<file path=ppt/slides/slide9.xml><?xml version="1.0" encoding="utf-8"?>
+<p:sld xmlns:a="http://schemas.openxmlformats.org/drawingml/2006/main" xmlns:r="http://schemas.openxmlformats.org/officeDocument/2006/relationships" xmlns:p="http://schemas.openxmlformats.org/presentationml/2006/main">
+  <p:cSld>
+    <p:spTree>
+      <p:nvGrpSpPr>
+        <p:cNvPr id="1" name=""/>
+        <p:cNvGrpSpPr/>
+        <p:nvPr/>
+      </p:nvGrpSpPr>
+      <p:grpSpPr>
+        <a:xfrm>
+          <a:off x="0" y="0"/>
+          <a:ext cx="0" cy="0"/>
+          <a:chOff x="0" y="0"/>
+          <a:chExt cx="0" cy="0"/>
+        </a:xfrm>
+      </p:grpSpPr>
+      <p:sp>
+        <p:nvSpPr>
+          <p:cNvPr id="2" name="Titel 1"/>
+          <p:cNvSpPr>
+            <a:spLocks noGrp="1"/>
+          </p:cNvSpPr>
+          <p:nvPr>
+            <p:ph type="title"/>
+          </p:nvPr>
+        </p:nvSpPr>
+        <p:spPr/>
+        <p:txBody>
+          <a:bodyPr/>
+          <a:lstStyle/>
+          <a:p>
+            <a:r>
+              <a:rPr lang="de-DE" dirty="0" smtClean="0"/>
+              <a:t>LIVE DEMO RUNNING…</a:t>
+            </a:r>
+            <a:endParaRPr lang="de-DE" dirty="0"/>
+          </a:p>
+        </p:txBody>
+      </p:sp>
+      <p:sp>
+        <p:nvSpPr>
+          <p:cNvPr id="3" name="Datumsplatzhalter 2"/>
+          <p:cNvSpPr>
+            <a:spLocks noGrp="1"/>
+          </p:cNvSpPr>
+          <p:nvPr>
+            <p:ph type="dt" sz="half" idx="10"/>
+          </p:nvPr>
+        </p:nvSpPr>
+        <p:spPr/>
+        <p:txBody>
+          <a:bodyPr/>
+          <a:lstStyle/>
+          <a:p>
+            <a:fld id="{48352B5A-167D-4ED6-B7C9-BDA647A8BA51}" type="datetime1">
+              <a:rPr lang="de-DE" smtClean="0"/>
+              <a:t>21.11.2016</a:t>
+            </a:fld>
+            <a:endParaRPr lang="de-DE"/>
+          </a:p>
+        </p:txBody>
+      </p:sp>
+      <p:sp>
+        <p:nvSpPr>
+          <p:cNvPr id="4" name="Fußzeilenplatzhalter 3"/>
+          <p:cNvSpPr>
+            <a:spLocks noGrp="1"/>
+          </p:cNvSpPr>
+          <p:nvPr>
+            <p:ph type="ftr" sz="quarter" idx="11"/>
+          </p:nvPr>
+        </p:nvSpPr>
+        <p:spPr/>
+        <p:txBody>
+          <a:bodyPr/>
+          <a:lstStyle/>
+          <a:p>
+            <a:r>
+              <a:rPr lang="de-DE" dirty="0" smtClean="0"/>
+              <a:t>Verrückte </a:t>
+            </a:r>
+            <a:r>
+              <a:rPr lang="de-DE" dirty="0" err="1" smtClean="0"/>
+              <a:t>IoT</a:t>
+            </a:r>
+            <a:r>
+              <a:rPr lang="de-DE" dirty="0" smtClean="0"/>
+              <a:t>-Live-Demo mit Torben und Jan</a:t>
+            </a:r>
+            <a:endParaRPr lang="de-DE" dirty="0"/>
+          </a:p>
+        </p:txBody>
+      </p:sp>
+      <p:sp>
+        <p:nvSpPr>
+          <p:cNvPr id="5" name="Foliennummernplatzhalter 4"/>
+          <p:cNvSpPr>
+            <a:spLocks noGrp="1"/>
+          </p:cNvSpPr>
+          <p:nvPr>
+            <p:ph type="sldNum" sz="quarter" idx="12"/>
+          </p:nvPr>
+        </p:nvSpPr>
+        <p:spPr/>
+        <p:txBody>
+          <a:bodyPr/>
+          <a:lstStyle/>
+          <a:p>
+            <a:fld id="{E07F1749-2C29-4AD9-BF92-E70F8884412B}" type="slidenum">
+              <a:rPr lang="de-DE" smtClean="0"/>
+              <a:t>9</a:t>
+            </a:fld>
+            <a:endParaRPr lang="de-DE"/>
+          </a:p>
+        </p:txBody>
+      </p:sp>
+      <p:sp>
+        <p:nvSpPr>
+          <p:cNvPr id="6" name="Inhaltsplatzhalter 5"/>
+          <p:cNvSpPr>
+            <a:spLocks noGrp="1"/>
+          </p:cNvSpPr>
+          <p:nvPr>
+            <p:ph sz="quarter" idx="13"/>
+          </p:nvPr>
+        </p:nvSpPr>
+        <p:spPr/>
+        <p:txBody>
+          <a:bodyPr/>
+          <a:lstStyle/>
+          <a:p>
+            <a:r>
+              <a:rPr lang="de-DE" dirty="0" smtClean="0"/>
+              <a:t>SSID:			summit16IOT</a:t>
+            </a:r>
+          </a:p>
+          <a:p>
+            <a:endParaRPr lang="de-DE" dirty="0"/>
+          </a:p>
+          <a:p>
+            <a:r>
+              <a:rPr lang="de-DE" dirty="0" smtClean="0"/>
+              <a:t>PASSWORT:		</a:t>
+            </a:r>
+            <a:r>
+              <a:rPr lang="de-DE" dirty="0" err="1" smtClean="0"/>
+              <a:t>iotdemowlan</a:t>
+            </a:r>
+            <a:endParaRPr lang="de-DE" dirty="0" smtClean="0"/>
+          </a:p>
+          <a:p>
+            <a:endParaRPr lang="de-DE" dirty="0"/>
+          </a:p>
+          <a:p>
+            <a:r>
+              <a:rPr lang="de-DE" dirty="0" smtClean="0"/>
+              <a:t>Fragen unter: 	</a:t>
+            </a:r>
+            <a:r>
+              <a:rPr lang="de-DE" dirty="0" smtClean="0">
+                <a:hlinkClick r:id="rId3"/>
+              </a:rPr>
+              <a:t>http://dashboard/fragen</a:t>
+            </a:r>
+            <a:endParaRPr lang="de-DE" dirty="0" smtClean="0"/>
+          </a:p>
+          <a:p>
+            <a:endParaRPr lang="de-DE" dirty="0" smtClean="0"/>
+          </a:p>
+        </p:txBody>
+      </p:sp>
+    </p:spTree>
+    <p:extLst>
+      <p:ext uri="{BB962C8B-B14F-4D97-AF65-F5344CB8AC3E}">
+        <p14:creationId xmlns:p14="http://schemas.microsoft.com/office/powerpoint/2010/main" val="1998764375"/>
+      </p:ext>
+    </p:extLst>
+  </p:cSld>
+  <p:clrMapOvr>
+    <a:masterClrMapping/>
+  </p:clrMapOvr>
+  <p:timing>
+    <p:tnLst>
+      <p:par>
+        <p:cTn id="1" dur="indefinite" restart="never" nodeType="tmRoot"/>
+      </p:par>
+    </p:tnLst>
+  </p:timing>
 </p:sld>
 </file>
 
@@ -5786,7 +9560,7 @@
   <a:extraClrSchemeLst/>
   <a:extLst>
     <a:ext uri="{05A4C25C-085E-4340-85A3-A5531E510DB2}">
-      <thm15:themeFamily xmlns:thm15="http://schemas.microsoft.com/office/thememl/2012/main" xmlns="" name="adesso_Template_16zu9 [Schreibgeschützt]" id="{12D9A243-BF21-4950-AE3A-4348F013E656}" vid="{BEC210B0-57DE-4DE3-9ECB-A845601F9CB1}"/>
+      <thm15:themeFamily xmlns="" xmlns:thm15="http://schemas.microsoft.com/office/thememl/2012/main" name="adesso_Template_16zu9 [Schreibgeschützt]" id="{12D9A243-BF21-4950-AE3A-4348F013E656}" vid="{BEC210B0-57DE-4DE3-9ECB-A845601F9CB1}"/>
     </a:ext>
   </a:extLst>
 </a:theme>
@@ -6018,6 +9792,24 @@
 </file>
 
 <file path=customXml/item1.xml><?xml version="1.0" encoding="utf-8"?>
+<?mso-contentType ?>
+<FormTemplates xmlns="http://schemas.microsoft.com/sharepoint/v3/contenttype/forms">
+  <Display>DocumentLibraryForm</Display>
+  <Edit>DocumentLibraryForm</Edit>
+  <New>DocumentLibraryForm</New>
+</FormTemplates>
+</file>
+
+<file path=customXml/item2.xml><?xml version="1.0" encoding="utf-8"?>
+<p:properties xmlns:p="http://schemas.microsoft.com/office/2006/metadata/properties" xmlns:xsi="http://www.w3.org/2001/XMLSchema-instance" xmlns:pc="http://schemas.microsoft.com/office/infopath/2007/PartnerControls">
+  <documentManagement>
+    <PublishingExpirationDate xmlns="http://schemas.microsoft.com/sharepoint/v3" xsi:nil="true"/>
+    <PublishingStartDate xmlns="http://schemas.microsoft.com/sharepoint/v3" xsi:nil="true"/>
+  </documentManagement>
+</p:properties>
+</file>
+
+<file path=customXml/item3.xml><?xml version="1.0" encoding="utf-8"?>
 <ct:contentTypeSchema xmlns:ct="http://schemas.microsoft.com/office/2006/metadata/contentType" xmlns:ma="http://schemas.microsoft.com/office/2006/metadata/properties/metaAttributes" ct:_="" ma:_="" ma:contentTypeName="Dokument" ma:contentTypeID="0x0101003969FAE1D870D24AB1F685203B54C731" ma:contentTypeVersion="1" ma:contentTypeDescription="Ein neues Dokument erstellen." ma:contentTypeScope="" ma:versionID="49e8420ccc884b71a44dddead001aef3">
   <xsd:schema xmlns:xsd="http://www.w3.org/2001/XMLSchema" xmlns:xs="http://www.w3.org/2001/XMLSchema" xmlns:p="http://schemas.microsoft.com/office/2006/metadata/properties" xmlns:ns1="http://schemas.microsoft.com/sharepoint/v3" targetNamespace="http://schemas.microsoft.com/office/2006/metadata/properties" ma:root="true" ma:fieldsID="527feafd7c2aaee042aea6d2d3f7a934" ns1:_="">
     <xsd:import namespace="http://schemas.microsoft.com/sharepoint/v3"/>
@@ -6149,38 +9941,10 @@
 </ct:contentTypeSchema>
 </file>
 
-<file path=customXml/item2.xml><?xml version="1.0" encoding="utf-8"?>
-<p:properties xmlns:p="http://schemas.microsoft.com/office/2006/metadata/properties" xmlns:xsi="http://www.w3.org/2001/XMLSchema-instance" xmlns:pc="http://schemas.microsoft.com/office/infopath/2007/PartnerControls">
-  <documentManagement>
-    <PublishingExpirationDate xmlns="http://schemas.microsoft.com/sharepoint/v3" xsi:nil="true"/>
-    <PublishingStartDate xmlns="http://schemas.microsoft.com/sharepoint/v3" xsi:nil="true"/>
-  </documentManagement>
-</p:properties>
-</file>
-
-<file path=customXml/item3.xml><?xml version="1.0" encoding="utf-8"?>
-<?mso-contentType ?>
-<FormTemplates xmlns="http://schemas.microsoft.com/sharepoint/v3/contenttype/forms">
-  <Display>DocumentLibraryForm</Display>
-  <Edit>DocumentLibraryForm</Edit>
-  <New>DocumentLibraryForm</New>
-</FormTemplates>
-</file>
-
 <file path=customXml/itemProps1.xml><?xml version="1.0" encoding="utf-8"?>
-<ds:datastoreItem xmlns:ds="http://schemas.openxmlformats.org/officeDocument/2006/customXml" ds:itemID="{C72414D1-9F4A-4B22-ABCE-3D6ECA0CBCE9}">
+<ds:datastoreItem xmlns:ds="http://schemas.openxmlformats.org/officeDocument/2006/customXml" ds:itemID="{401277ED-440A-42EF-9B7C-98840B8D0F73}">
   <ds:schemaRefs>
-    <ds:schemaRef ds:uri="http://schemas.microsoft.com/office/2006/metadata/contentType"/>
-    <ds:schemaRef ds:uri="http://schemas.microsoft.com/office/2006/metadata/properties/metaAttributes"/>
-    <ds:schemaRef ds:uri="http://www.w3.org/2001/XMLSchema"/>
-    <ds:schemaRef ds:uri="http://schemas.microsoft.com/office/2006/metadata/properties"/>
-    <ds:schemaRef ds:uri="http://schemas.microsoft.com/sharepoint/v3"/>
-    <ds:schemaRef ds:uri="http://schemas.microsoft.com/office/2006/documentManagement/types"/>
-    <ds:schemaRef ds:uri="http://schemas.microsoft.com/office/infopath/2007/PartnerControls"/>
-    <ds:schemaRef ds:uri="http://schemas.openxmlformats.org/package/2006/metadata/core-properties"/>
-    <ds:schemaRef ds:uri="http://purl.org/dc/elements/1.1/"/>
-    <ds:schemaRef ds:uri="http://purl.org/dc/terms/"/>
-    <ds:schemaRef ds:uri="http://schemas.microsoft.com/internal/obd"/>
+    <ds:schemaRef ds:uri="http://schemas.microsoft.com/sharepoint/v3/contenttype/forms"/>
   </ds:schemaRefs>
 </ds:datastoreItem>
 </file>
@@ -6202,9 +9966,19 @@
 </file>
 
 <file path=customXml/itemProps3.xml><?xml version="1.0" encoding="utf-8"?>
-<ds:datastoreItem xmlns:ds="http://schemas.openxmlformats.org/officeDocument/2006/customXml" ds:itemID="{401277ED-440A-42EF-9B7C-98840B8D0F73}">
+<ds:datastoreItem xmlns:ds="http://schemas.openxmlformats.org/officeDocument/2006/customXml" ds:itemID="{C72414D1-9F4A-4B22-ABCE-3D6ECA0CBCE9}">
   <ds:schemaRefs>
-    <ds:schemaRef ds:uri="http://schemas.microsoft.com/sharepoint/v3/contenttype/forms"/>
+    <ds:schemaRef ds:uri="http://schemas.microsoft.com/office/2006/metadata/contentType"/>
+    <ds:schemaRef ds:uri="http://schemas.microsoft.com/office/2006/metadata/properties/metaAttributes"/>
+    <ds:schemaRef ds:uri="http://www.w3.org/2001/XMLSchema"/>
+    <ds:schemaRef ds:uri="http://schemas.microsoft.com/office/2006/metadata/properties"/>
+    <ds:schemaRef ds:uri="http://schemas.microsoft.com/sharepoint/v3"/>
+    <ds:schemaRef ds:uri="http://schemas.microsoft.com/office/2006/documentManagement/types"/>
+    <ds:schemaRef ds:uri="http://schemas.microsoft.com/office/infopath/2007/PartnerControls"/>
+    <ds:schemaRef ds:uri="http://schemas.openxmlformats.org/package/2006/metadata/core-properties"/>
+    <ds:schemaRef ds:uri="http://purl.org/dc/elements/1.1/"/>
+    <ds:schemaRef ds:uri="http://purl.org/dc/terms/"/>
+    <ds:schemaRef ds:uri="http://schemas.microsoft.com/internal/obd"/>
   </ds:schemaRefs>
 </ds:datastoreItem>
 </file>
</xml_diff>

<commit_message>
Update der Präsentation BETA
</commit_message>
<xml_diff>
--- a/doc/adesso_Template_summIT.pptx
+++ b/doc/adesso_Template_summIT.pptx
@@ -5,21 +5,22 @@
     <p:sldMasterId id="2147483673" r:id="rId4"/>
   </p:sldMasterIdLst>
   <p:notesMasterIdLst>
-    <p:notesMasterId r:id="rId17"/>
+    <p:notesMasterId r:id="rId18"/>
   </p:notesMasterIdLst>
   <p:sldIdLst>
     <p:sldId id="259" r:id="rId5"/>
     <p:sldId id="260" r:id="rId6"/>
-    <p:sldId id="258" r:id="rId7"/>
-    <p:sldId id="261" r:id="rId8"/>
-    <p:sldId id="262" r:id="rId9"/>
-    <p:sldId id="263" r:id="rId10"/>
-    <p:sldId id="267" r:id="rId11"/>
-    <p:sldId id="264" r:id="rId12"/>
-    <p:sldId id="265" r:id="rId13"/>
-    <p:sldId id="268" r:id="rId14"/>
-    <p:sldId id="266" r:id="rId15"/>
-    <p:sldId id="257" r:id="rId16"/>
+    <p:sldId id="269" r:id="rId7"/>
+    <p:sldId id="258" r:id="rId8"/>
+    <p:sldId id="261" r:id="rId9"/>
+    <p:sldId id="262" r:id="rId10"/>
+    <p:sldId id="263" r:id="rId11"/>
+    <p:sldId id="267" r:id="rId12"/>
+    <p:sldId id="264" r:id="rId13"/>
+    <p:sldId id="265" r:id="rId14"/>
+    <p:sldId id="268" r:id="rId15"/>
+    <p:sldId id="266" r:id="rId16"/>
+    <p:sldId id="257" r:id="rId17"/>
   </p:sldIdLst>
   <p:sldSz cx="11522075" cy="6480175"/>
   <p:notesSz cx="6858000" cy="9144000"/>
@@ -120,7 +121,7 @@
   </p:defaultTextStyle>
   <p:extLst>
     <p:ext uri="{EFAFB233-063F-42B5-8137-9DF3F51BA10A}">
-      <p15:sldGuideLst xmlns="" xmlns:p15="http://schemas.microsoft.com/office/powerpoint/2012/main">
+      <p15:sldGuideLst xmlns:p15="http://schemas.microsoft.com/office/powerpoint/2012/main" xmlns="">
         <p15:guide id="1" orient="horz" pos="227">
           <p15:clr>
             <a:srgbClr val="A4A3A4"/>
@@ -189,7 +190,7 @@
       </p15:sldGuideLst>
     </p:ext>
     <p:ext uri="{2D200454-40CA-4A62-9FC3-DE9A4176ACB9}">
-      <p15:notesGuideLst xmlns="" xmlns:p15="http://schemas.microsoft.com/office/powerpoint/2012/main">
+      <p15:notesGuideLst xmlns:p15="http://schemas.microsoft.com/office/powerpoint/2012/main" xmlns="">
         <p15:guide id="1" orient="horz" pos="2880">
           <p15:clr>
             <a:srgbClr val="A4A3A4"/>
@@ -288,7 +289,7 @@
           <a:p>
             <a:fld id="{05408900-6234-440B-A027-38F10FF7E2F1}" type="datetimeFigureOut">
               <a:rPr lang="de-DE" smtClean="0"/>
-              <a:t>21.11.2016</a:t>
+              <a:t>28.11.2016</a:t>
             </a:fld>
             <a:endParaRPr lang="de-DE"/>
           </a:p>
@@ -818,7 +819,7 @@
           <a:p>
             <a:fld id="{112C3873-BA08-40A5-BDCC-B6406E6CD40B}" type="slidenum">
               <a:rPr lang="de-DE" smtClean="0"/>
-              <a:t>3</a:t>
+              <a:t>4</a:t>
             </a:fld>
             <a:endParaRPr lang="de-DE"/>
           </a:p>
@@ -974,7 +975,7 @@
           <a:p>
             <a:fld id="{112C3873-BA08-40A5-BDCC-B6406E6CD40B}" type="slidenum">
               <a:rPr lang="de-DE" smtClean="0"/>
-              <a:t>4</a:t>
+              <a:t>5</a:t>
             </a:fld>
             <a:endParaRPr lang="de-DE"/>
           </a:p>
@@ -1080,7 +1081,7 @@
           <a:p>
             <a:fld id="{112C3873-BA08-40A5-BDCC-B6406E6CD40B}" type="slidenum">
               <a:rPr lang="de-DE" smtClean="0"/>
-              <a:t>5</a:t>
+              <a:t>6</a:t>
             </a:fld>
             <a:endParaRPr lang="de-DE"/>
           </a:p>
@@ -1180,7 +1181,7 @@
           <a:p>
             <a:fld id="{112C3873-BA08-40A5-BDCC-B6406E6CD40B}" type="slidenum">
               <a:rPr lang="de-DE" smtClean="0"/>
-              <a:t>6</a:t>
+              <a:t>7</a:t>
             </a:fld>
             <a:endParaRPr lang="de-DE"/>
           </a:p>
@@ -1264,7 +1265,7 @@
           <a:p>
             <a:fld id="{112C3873-BA08-40A5-BDCC-B6406E6CD40B}" type="slidenum">
               <a:rPr lang="de-DE" smtClean="0"/>
-              <a:t>8</a:t>
+              <a:t>9</a:t>
             </a:fld>
             <a:endParaRPr lang="de-DE"/>
           </a:p>
@@ -1352,7 +1353,7 @@
           <a:p>
             <a:fld id="{112C3873-BA08-40A5-BDCC-B6406E6CD40B}" type="slidenum">
               <a:rPr lang="de-DE" smtClean="0"/>
-              <a:t>9</a:t>
+              <a:t>10</a:t>
             </a:fld>
             <a:endParaRPr lang="de-DE"/>
           </a:p>
@@ -1980,7 +1981,7 @@
           <a:p>
             <a:fld id="{3B23B96D-9616-4176-AEF6-AF1317711023}" type="datetime1">
               <a:rPr lang="de-DE" smtClean="0"/>
-              <a:t>21.11.2016</a:t>
+              <a:t>28.11.2016</a:t>
             </a:fld>
             <a:endParaRPr lang="de-DE"/>
           </a:p>
@@ -2160,7 +2161,7 @@
           <a:p>
             <a:fld id="{0D71886E-8C9D-4E97-9EB5-D99BA89A8533}" type="datetime1">
               <a:rPr lang="de-DE" smtClean="0"/>
-              <a:t>21.11.2016</a:t>
+              <a:t>28.11.2016</a:t>
             </a:fld>
             <a:endParaRPr lang="de-DE"/>
           </a:p>
@@ -2302,7 +2303,7 @@
           <a:p>
             <a:fld id="{8DBF69B3-62E3-4AF4-971E-1AB7F9FB69DD}" type="datetime1">
               <a:rPr lang="de-DE" smtClean="0"/>
-              <a:t>21.11.2016</a:t>
+              <a:t>28.11.2016</a:t>
             </a:fld>
             <a:endParaRPr lang="de-DE"/>
           </a:p>
@@ -2594,7 +2595,7 @@
           <a:p>
             <a:fld id="{F898127A-2E85-486B-8AA5-E90E3CCEC0E9}" type="datetime1">
               <a:rPr lang="de-DE" smtClean="0"/>
-              <a:t>21.11.2016</a:t>
+              <a:t>28.11.2016</a:t>
             </a:fld>
             <a:endParaRPr lang="de-DE"/>
           </a:p>
@@ -3238,7 +3239,7 @@
           <a:p>
             <a:fld id="{A4FEDFCE-8709-4D76-8036-EE5278C2237F}" type="datetime1">
               <a:rPr lang="de-DE" smtClean="0"/>
-              <a:t>21.11.2016</a:t>
+              <a:t>28.11.2016</a:t>
             </a:fld>
             <a:endParaRPr lang="de-DE"/>
           </a:p>
@@ -3373,7 +3374,7 @@
           <a:p>
             <a:fld id="{48352B5A-167D-4ED6-B7C9-BDA647A8BA51}" type="datetime1">
               <a:rPr lang="de-DE" smtClean="0"/>
-              <a:t>21.11.2016</a:t>
+              <a:t>28.11.2016</a:t>
             </a:fld>
             <a:endParaRPr lang="de-DE"/>
           </a:p>
@@ -3575,7 +3576,7 @@
           <a:p>
             <a:fld id="{F782B8C6-A2A3-4B66-A839-DF7B16517350}" type="datetime1">
               <a:rPr lang="de-DE" smtClean="0"/>
-              <a:t>21.11.2016</a:t>
+              <a:t>28.11.2016</a:t>
             </a:fld>
             <a:endParaRPr lang="de-DE"/>
           </a:p>
@@ -3978,7 +3979,7 @@
           <a:p>
             <a:fld id="{649D13A7-6296-4A54-8C64-66A02EB71342}" type="datetime1">
               <a:rPr lang="de-DE" smtClean="0"/>
-              <a:t>21.11.2016</a:t>
+              <a:t>28.11.2016</a:t>
             </a:fld>
             <a:endParaRPr lang="de-DE"/>
           </a:p>
@@ -4529,7 +4530,7 @@
           <a:p>
             <a:fld id="{ED7E8129-6AB0-4316-89DD-05AD9ABD1F9D}" type="datetime1">
               <a:rPr lang="de-DE" smtClean="0"/>
-              <a:t>21.11.2016</a:t>
+              <a:t>28.11.2016</a:t>
             </a:fld>
             <a:endParaRPr lang="de-DE"/>
           </a:p>
@@ -4654,7 +4655,7 @@
           <a:p>
             <a:fld id="{4FD0AE75-8AA0-449D-989F-B1E818A5B67A}" type="datetime1">
               <a:rPr lang="de-DE" smtClean="0"/>
-              <a:t>21.11.2016</a:t>
+              <a:t>28.11.2016</a:t>
             </a:fld>
             <a:endParaRPr lang="de-DE"/>
           </a:p>
@@ -4749,7 +4750,7 @@
           <a:p>
             <a:fld id="{455D07A7-0ED1-4138-9FBD-0F4825E4365D}" type="datetime1">
               <a:rPr lang="de-DE" smtClean="0"/>
-              <a:t>21.11.2016</a:t>
+              <a:t>28.11.2016</a:t>
             </a:fld>
             <a:endParaRPr lang="de-DE"/>
           </a:p>
@@ -4844,7 +4845,7 @@
           <a:p>
             <a:fld id="{6A743ADA-15EC-46F2-B124-7B3EABB341FC}" type="datetime1">
               <a:rPr lang="de-DE" smtClean="0"/>
-              <a:t>21.11.2016</a:t>
+              <a:t>28.11.2016</a:t>
             </a:fld>
             <a:endParaRPr lang="de-DE"/>
           </a:p>
@@ -5267,7 +5268,7 @@
           <a:p>
             <a:fld id="{34F16289-DF57-4F0A-9158-80987495B444}" type="datetime1">
               <a:rPr lang="de-DE" smtClean="0"/>
-              <a:t>21.11.2016</a:t>
+              <a:t>28.11.2016</a:t>
             </a:fld>
             <a:endParaRPr lang="de-DE"/>
           </a:p>
@@ -5504,7 +5505,7 @@
           <a:p>
             <a:fld id="{30694A65-3AA1-42B9-B750-09273D0D99B8}" type="datetime1">
               <a:rPr lang="de-DE" smtClean="0"/>
-              <a:t>21.11.2016</a:t>
+              <a:t>28.11.2016</a:t>
             </a:fld>
             <a:endParaRPr lang="de-DE"/>
           </a:p>
@@ -6341,52 +6342,68 @@
           <a:lstStyle/>
           <a:p>
             <a:r>
+              <a:rPr lang="de-DE" dirty="0" smtClean="0"/>
+              <a:t>Die DEMO </a:t>
+            </a:r>
+            <a:r>
+              <a:rPr lang="de-DE" sz="1600" i="1" dirty="0" smtClean="0"/>
+              <a:t>… und los geht‘s!!!</a:t>
+            </a:r>
+            <a:endParaRPr lang="de-DE" sz="1600" i="1" dirty="0"/>
+          </a:p>
+        </p:txBody>
+      </p:sp>
+      <p:sp>
+        <p:nvSpPr>
+          <p:cNvPr id="3" name="Datumsplatzhalter 2"/>
+          <p:cNvSpPr>
+            <a:spLocks noGrp="1"/>
+          </p:cNvSpPr>
+          <p:nvPr>
+            <p:ph type="dt" sz="half" idx="10"/>
+          </p:nvPr>
+        </p:nvSpPr>
+        <p:spPr/>
+        <p:txBody>
+          <a:bodyPr/>
+          <a:lstStyle/>
+          <a:p>
+            <a:fld id="{48352B5A-167D-4ED6-B7C9-BDA647A8BA51}" type="datetime1">
+              <a:rPr lang="de-DE" smtClean="0"/>
+              <a:t>28.11.2016</a:t>
+            </a:fld>
+            <a:endParaRPr lang="de-DE"/>
+          </a:p>
+        </p:txBody>
+      </p:sp>
+      <p:sp>
+        <p:nvSpPr>
+          <p:cNvPr id="4" name="Fußzeilenplatzhalter 3"/>
+          <p:cNvSpPr>
+            <a:spLocks noGrp="1"/>
+          </p:cNvSpPr>
+          <p:nvPr>
+            <p:ph type="ftr" sz="quarter" idx="11"/>
+          </p:nvPr>
+        </p:nvSpPr>
+        <p:spPr/>
+        <p:txBody>
+          <a:bodyPr/>
+          <a:lstStyle/>
+          <a:p>
+            <a:r>
+              <a:rPr lang="de-DE" dirty="0" smtClean="0"/>
+              <a:t>Verrückte </a:t>
+            </a:r>
+            <a:r>
               <a:rPr lang="de-DE" dirty="0" err="1" smtClean="0"/>
-              <a:t>LiveDemo</a:t>
+              <a:t>IoT</a:t>
+            </a:r>
+            <a:r>
+              <a:rPr lang="de-DE" dirty="0" smtClean="0"/>
+              <a:t>-Live-Demo mit Torben und Jan</a:t>
             </a:r>
             <a:endParaRPr lang="de-DE" dirty="0"/>
-          </a:p>
-        </p:txBody>
-      </p:sp>
-      <p:sp>
-        <p:nvSpPr>
-          <p:cNvPr id="3" name="Datumsplatzhalter 2"/>
-          <p:cNvSpPr>
-            <a:spLocks noGrp="1"/>
-          </p:cNvSpPr>
-          <p:nvPr>
-            <p:ph type="dt" sz="half" idx="10"/>
-          </p:nvPr>
-        </p:nvSpPr>
-        <p:spPr/>
-        <p:txBody>
-          <a:bodyPr/>
-          <a:lstStyle/>
-          <a:p>
-            <a:fld id="{48352B5A-167D-4ED6-B7C9-BDA647A8BA51}" type="datetime1">
-              <a:rPr lang="de-DE" smtClean="0"/>
-              <a:t>21.11.2016</a:t>
-            </a:fld>
-            <a:endParaRPr lang="de-DE"/>
-          </a:p>
-        </p:txBody>
-      </p:sp>
-      <p:sp>
-        <p:nvSpPr>
-          <p:cNvPr id="4" name="Fußzeilenplatzhalter 3"/>
-          <p:cNvSpPr>
-            <a:spLocks noGrp="1"/>
-          </p:cNvSpPr>
-          <p:nvPr>
-            <p:ph type="ftr" sz="quarter" idx="11"/>
-          </p:nvPr>
-        </p:nvSpPr>
-        <p:spPr/>
-        <p:txBody>
-          <a:bodyPr/>
-          <a:lstStyle/>
-          <a:p>
-            <a:endParaRPr lang="de-DE"/>
           </a:p>
         </p:txBody>
       </p:sp>
@@ -6430,30 +6447,61 @@
           <a:p>
             <a:r>
               <a:rPr lang="de-DE" dirty="0" smtClean="0"/>
-              <a:t>Vorstellung der Devices in Persona</a:t>
-            </a:r>
+              <a:t>SSID:			summit16IOT</a:t>
+            </a:r>
+          </a:p>
+          <a:p>
+            <a:endParaRPr lang="de-DE" dirty="0"/>
           </a:p>
           <a:p>
             <a:r>
               <a:rPr lang="de-DE" dirty="0" smtClean="0"/>
-              <a:t>Zeigen, dass das Dashboard tut, was es soll</a:t>
-            </a:r>
+              <a:t>PASSWORT:		</a:t>
+            </a:r>
+            <a:r>
+              <a:rPr lang="de-DE" dirty="0" err="1" smtClean="0"/>
+              <a:t>iotdemowlan</a:t>
+            </a:r>
+            <a:endParaRPr lang="de-DE" dirty="0" smtClean="0"/>
           </a:p>
           <a:p>
             <a:endParaRPr lang="de-DE" dirty="0"/>
+          </a:p>
+          <a:p>
+            <a:r>
+              <a:rPr lang="de-DE" dirty="0" smtClean="0"/>
+              <a:t>Fragen unter: 	</a:t>
+            </a:r>
+            <a:r>
+              <a:rPr lang="de-DE" dirty="0" smtClean="0">
+                <a:hlinkClick r:id="rId3"/>
+              </a:rPr>
+              <a:t>http://dashboard/fragen</a:t>
+            </a:r>
+            <a:endParaRPr lang="de-DE" dirty="0" smtClean="0"/>
+          </a:p>
+          <a:p>
+            <a:endParaRPr lang="de-DE" dirty="0" smtClean="0"/>
           </a:p>
         </p:txBody>
       </p:sp>
     </p:spTree>
     <p:extLst>
       <p:ext uri="{BB962C8B-B14F-4D97-AF65-F5344CB8AC3E}">
-        <p14:creationId xmlns:p14="http://schemas.microsoft.com/office/powerpoint/2010/main" val="454365051"/>
+        <p14:creationId xmlns:p14="http://schemas.microsoft.com/office/powerpoint/2010/main" val="1998764375"/>
       </p:ext>
     </p:extLst>
   </p:cSld>
   <p:clrMapOvr>
     <a:masterClrMapping/>
   </p:clrMapOvr>
+  <p:timing>
+    <p:tnLst>
+      <p:par>
+        <p:cTn id="1" dur="indefinite" restart="never" nodeType="tmRoot"/>
+      </p:par>
+    </p:tnLst>
+  </p:timing>
 </p:sld>
 </file>
 
@@ -6490,12 +6538,8 @@
           <a:lstStyle/>
           <a:p>
             <a:r>
-              <a:rPr lang="de-DE" dirty="0" smtClean="0"/>
-              <a:t>LIVE-CODING: Rapid-</a:t>
-            </a:r>
-            <a:r>
               <a:rPr lang="de-DE" dirty="0" err="1" smtClean="0"/>
-              <a:t>Prototyping</a:t>
+              <a:t>LiveDemo</a:t>
             </a:r>
             <a:endParaRPr lang="de-DE" dirty="0"/>
           </a:p>
@@ -6518,7 +6562,7 @@
           <a:p>
             <a:fld id="{48352B5A-167D-4ED6-B7C9-BDA647A8BA51}" type="datetime1">
               <a:rPr lang="de-DE" smtClean="0"/>
-              <a:t>21.11.2016</a:t>
+              <a:t>28.11.2016</a:t>
             </a:fld>
             <a:endParaRPr lang="de-DE"/>
           </a:p>
@@ -6583,20 +6627,21 @@
           <a:p>
             <a:r>
               <a:rPr lang="de-DE" dirty="0" smtClean="0"/>
-              <a:t>Torben zeigt wie ?eine Zufällig gewählte Aufgabe? </a:t>
-            </a:r>
-          </a:p>
-          <a:p>
+              <a:t>Hier muss man LIVE dabei gewesen sein…</a:t>
+            </a:r>
+          </a:p>
+          <a:p>
+            <a:endParaRPr lang="de-DE" dirty="0"/>
+          </a:p>
+          <a:p>
+            <a:pPr algn="ctr"/>
             <a:r>
               <a:rPr lang="de-DE" dirty="0" smtClean="0"/>
-              <a:t>Über unsere Umgebung umgesetzt wird…</a:t>
-            </a:r>
-          </a:p>
-          <a:p>
-            <a:r>
-              <a:rPr lang="de-DE" dirty="0" smtClean="0"/>
-              <a:t>Anbindung des Würfels an das Nachrichten System</a:t>
-            </a:r>
+              <a:t>„Nützt ja nix !“</a:t>
+            </a:r>
+            <a:endParaRPr lang="de-DE" dirty="0" smtClean="0"/>
+          </a:p>
+          <a:p>
             <a:endParaRPr lang="de-DE" dirty="0"/>
           </a:p>
         </p:txBody>
@@ -6604,7 +6649,7 @@
     </p:spTree>
     <p:extLst>
       <p:ext uri="{BB962C8B-B14F-4D97-AF65-F5344CB8AC3E}">
-        <p14:creationId xmlns:p14="http://schemas.microsoft.com/office/powerpoint/2010/main" val="3035020756"/>
+        <p14:creationId xmlns:p14="http://schemas.microsoft.com/office/powerpoint/2010/main" val="454365051"/>
       </p:ext>
     </p:extLst>
   </p:cSld>
@@ -6648,7 +6693,7 @@
           <a:p>
             <a:r>
               <a:rPr lang="de-DE" dirty="0" smtClean="0"/>
-              <a:t>IOT – :+1:</a:t>
+              <a:t>LIVE-CODING …</a:t>
             </a:r>
             <a:endParaRPr lang="de-DE" dirty="0"/>
           </a:p>
@@ -6671,7 +6716,169 @@
           <a:p>
             <a:fld id="{48352B5A-167D-4ED6-B7C9-BDA647A8BA51}" type="datetime1">
               <a:rPr lang="de-DE" smtClean="0"/>
-              <a:t>21.11.2016</a:t>
+              <a:t>28.11.2016</a:t>
+            </a:fld>
+            <a:endParaRPr lang="de-DE"/>
+          </a:p>
+        </p:txBody>
+      </p:sp>
+      <p:sp>
+        <p:nvSpPr>
+          <p:cNvPr id="4" name="Fußzeilenplatzhalter 3"/>
+          <p:cNvSpPr>
+            <a:spLocks noGrp="1"/>
+          </p:cNvSpPr>
+          <p:nvPr>
+            <p:ph type="ftr" sz="quarter" idx="11"/>
+          </p:nvPr>
+        </p:nvSpPr>
+        <p:spPr/>
+        <p:txBody>
+          <a:bodyPr/>
+          <a:lstStyle/>
+          <a:p>
+            <a:endParaRPr lang="de-DE"/>
+          </a:p>
+        </p:txBody>
+      </p:sp>
+      <p:sp>
+        <p:nvSpPr>
+          <p:cNvPr id="5" name="Foliennummernplatzhalter 4"/>
+          <p:cNvSpPr>
+            <a:spLocks noGrp="1"/>
+          </p:cNvSpPr>
+          <p:nvPr>
+            <p:ph type="sldNum" sz="quarter" idx="12"/>
+          </p:nvPr>
+        </p:nvSpPr>
+        <p:spPr/>
+        <p:txBody>
+          <a:bodyPr/>
+          <a:lstStyle/>
+          <a:p>
+            <a:fld id="{E07F1749-2C29-4AD9-BF92-E70F8884412B}" type="slidenum">
+              <a:rPr lang="de-DE" smtClean="0"/>
+              <a:t>12</a:t>
+            </a:fld>
+            <a:endParaRPr lang="de-DE"/>
+          </a:p>
+        </p:txBody>
+      </p:sp>
+      <p:sp>
+        <p:nvSpPr>
+          <p:cNvPr id="6" name="Inhaltsplatzhalter 5"/>
+          <p:cNvSpPr>
+            <a:spLocks noGrp="1"/>
+          </p:cNvSpPr>
+          <p:nvPr>
+            <p:ph sz="quarter" idx="13"/>
+          </p:nvPr>
+        </p:nvSpPr>
+        <p:spPr/>
+        <p:txBody>
+          <a:bodyPr/>
+          <a:lstStyle/>
+          <a:p>
+            <a:r>
+              <a:rPr lang="de-DE" dirty="0"/>
+              <a:t>Hier muss man LIVE dabei gewesen sein…</a:t>
+            </a:r>
+          </a:p>
+          <a:p>
+            <a:endParaRPr lang="de-DE" dirty="0"/>
+          </a:p>
+          <a:p>
+            <a:pPr algn="ctr"/>
+            <a:r>
+              <a:rPr lang="de-DE" dirty="0"/>
+              <a:t>„Nützt ja nix !“</a:t>
+            </a:r>
+          </a:p>
+        </p:txBody>
+      </p:sp>
+    </p:spTree>
+    <p:extLst>
+      <p:ext uri="{BB962C8B-B14F-4D97-AF65-F5344CB8AC3E}">
+        <p14:creationId xmlns:p14="http://schemas.microsoft.com/office/powerpoint/2010/main" val="3035020756"/>
+      </p:ext>
+    </p:extLst>
+  </p:cSld>
+  <p:clrMapOvr>
+    <a:masterClrMapping/>
+  </p:clrMapOvr>
+</p:sld>
+</file>
+
+<file path=ppt/slides/slide13.xml><?xml version="1.0" encoding="utf-8"?>
+<p:sld xmlns:a="http://schemas.openxmlformats.org/drawingml/2006/main" xmlns:r="http://schemas.openxmlformats.org/officeDocument/2006/relationships" xmlns:p="http://schemas.openxmlformats.org/presentationml/2006/main">
+  <p:cSld>
+    <p:spTree>
+      <p:nvGrpSpPr>
+        <p:cNvPr id="1" name=""/>
+        <p:cNvGrpSpPr/>
+        <p:nvPr/>
+      </p:nvGrpSpPr>
+      <p:grpSpPr>
+        <a:xfrm>
+          <a:off x="0" y="0"/>
+          <a:ext cx="0" cy="0"/>
+          <a:chOff x="0" y="0"/>
+          <a:chExt cx="0" cy="0"/>
+        </a:xfrm>
+      </p:grpSpPr>
+      <p:sp>
+        <p:nvSpPr>
+          <p:cNvPr id="2" name="Titel 1"/>
+          <p:cNvSpPr>
+            <a:spLocks noGrp="1"/>
+          </p:cNvSpPr>
+          <p:nvPr>
+            <p:ph type="title"/>
+          </p:nvPr>
+        </p:nvSpPr>
+        <p:spPr>
+          <a:xfrm>
+            <a:off x="576460" y="647799"/>
+            <a:ext cx="9648627" cy="691737"/>
+          </a:xfrm>
+        </p:spPr>
+        <p:txBody>
+          <a:bodyPr/>
+          <a:lstStyle/>
+          <a:p>
+            <a:pPr algn="ctr"/>
+            <a:r>
+              <a:rPr lang="de-DE" b="1" dirty="0" smtClean="0"/>
+              <a:t>Hat es euch gefallen? Dann Daumen hoch </a:t>
+            </a:r>
+            <a:r>
+              <a:rPr lang="de-DE" b="1" dirty="0" smtClean="0">
+                <a:sym typeface="Wingdings" panose="05000000000000000000" pitchFamily="2" charset="2"/>
+              </a:rPr>
+              <a:t></a:t>
+            </a:r>
+            <a:endParaRPr lang="de-DE" b="1" dirty="0"/>
+          </a:p>
+        </p:txBody>
+      </p:sp>
+      <p:sp>
+        <p:nvSpPr>
+          <p:cNvPr id="3" name="Datumsplatzhalter 2"/>
+          <p:cNvSpPr>
+            <a:spLocks noGrp="1"/>
+          </p:cNvSpPr>
+          <p:nvPr>
+            <p:ph type="dt" sz="half" idx="10"/>
+          </p:nvPr>
+        </p:nvSpPr>
+        <p:spPr/>
+        <p:txBody>
+          <a:bodyPr/>
+          <a:lstStyle/>
+          <a:p>
+            <a:fld id="{48352B5A-167D-4ED6-B7C9-BDA647A8BA51}" type="datetime1">
+              <a:rPr lang="de-DE" smtClean="0"/>
+              <a:t>28.11.2016</a:t>
             </a:fld>
             <a:endParaRPr lang="de-DE"/>
           </a:p>
@@ -6733,7 +6940,7 @@
           <a:p>
             <a:fld id="{E07F1749-2C29-4AD9-BF92-E70F8884412B}" type="slidenum">
               <a:rPr lang="de-DE" smtClean="0"/>
-              <a:t>12</a:t>
+              <a:t>13</a:t>
             </a:fld>
             <a:endParaRPr lang="de-DE"/>
           </a:p>
@@ -6750,7 +6957,7 @@
           </p:nvPr>
         </p:nvPicPr>
         <p:blipFill>
-          <a:blip r:embed="rId2">
+          <a:blip r:embed="rId2" cstate="print">
             <a:extLst>
               <a:ext uri="{28A0092B-C50C-407E-A947-70E740481C1C}">
                 <a14:useLocalDpi xmlns:a14="http://schemas.microsoft.com/office/drawing/2010/main" val="0"/>
@@ -6764,8 +6971,8 @@
         </p:blipFill>
         <p:spPr bwMode="auto">
           <a:xfrm>
-            <a:off x="3059906" y="1511300"/>
-            <a:ext cx="4681538" cy="4681538"/>
+            <a:off x="3564151" y="1367879"/>
+            <a:ext cx="3673244" cy="3672580"/>
           </a:xfrm>
           <a:prstGeom prst="rect">
             <a:avLst/>
@@ -6805,6 +7012,37 @@
           </a:extLst>
         </p:spPr>
       </p:pic>
+      <p:sp>
+        <p:nvSpPr>
+          <p:cNvPr id="6" name="Textfeld 5"/>
+          <p:cNvSpPr txBox="1"/>
+          <p:nvPr/>
+        </p:nvSpPr>
+        <p:spPr>
+          <a:xfrm>
+            <a:off x="4596867" y="5278466"/>
+            <a:ext cx="1607812" cy="184666"/>
+          </a:xfrm>
+          <a:prstGeom prst="rect">
+            <a:avLst/>
+          </a:prstGeom>
+          <a:noFill/>
+        </p:spPr>
+        <p:txBody>
+          <a:bodyPr wrap="none" lIns="0" tIns="0" rIns="0" bIns="0" rtlCol="0" anchor="ctr" anchorCtr="0">
+            <a:spAutoFit/>
+          </a:bodyPr>
+          <a:lstStyle/>
+          <a:p>
+            <a:pPr algn="ctr"/>
+            <a:r>
+              <a:rPr lang="de-DE" sz="1200" dirty="0"/>
+              <a:t>http://bit.ly/adsum033</a:t>
+            </a:r>
+            <a:endParaRPr lang="de-DE" sz="1200" b="1" dirty="0" smtClean="0"/>
+          </a:p>
+        </p:txBody>
+      </p:sp>
     </p:spTree>
     <p:extLst>
       <p:ext uri="{BB962C8B-B14F-4D97-AF65-F5344CB8AC3E}">
@@ -6904,12 +7142,30 @@
           <a:lstStyle/>
           <a:p>
             <a:pPr marL="342900" indent="-342900">
+              <a:lnSpc>
+                <a:spcPct val="200000"/>
+              </a:lnSpc>
               <a:buFont typeface="Arial" panose="020B0604020202020204" pitchFamily="34" charset="0"/>
               <a:buChar char="•"/>
             </a:pPr>
             <a:r>
               <a:rPr lang="it-IT" sz="2000" b="0" dirty="0"/>
-              <a:t>adesso Hamburg - Java CC CI - Uwe </a:t>
+              <a:t>adesso Hamburg </a:t>
+            </a:r>
+            <a:r>
+              <a:rPr lang="it-IT" sz="2000" b="0" dirty="0" smtClean="0"/>
+              <a:t/>
+            </a:r>
+            <a:br>
+              <a:rPr lang="it-IT" sz="2000" b="0" dirty="0" smtClean="0"/>
+            </a:br>
+            <a:r>
+              <a:rPr lang="it-IT" sz="2000" b="0" dirty="0" smtClean="0"/>
+              <a:t>Java </a:t>
+            </a:r>
+            <a:r>
+              <a:rPr lang="it-IT" sz="2000" b="0" dirty="0"/>
+              <a:t>CC CI - Uwe </a:t>
             </a:r>
             <a:r>
               <a:rPr lang="it-IT" sz="2000" b="0" dirty="0" smtClean="0"/>
@@ -6918,6 +7174,9 @@
           </a:p>
           <a:p>
             <a:pPr marL="342900" indent="-342900">
+              <a:lnSpc>
+                <a:spcPct val="200000"/>
+              </a:lnSpc>
               <a:buFont typeface="Arial" panose="020B0604020202020204" pitchFamily="34" charset="0"/>
               <a:buChar char="•"/>
             </a:pPr>
@@ -6979,6 +7238,9 @@
           <a:lstStyle/>
           <a:p>
             <a:pPr marL="342900" indent="-342900">
+              <a:lnSpc>
+                <a:spcPct val="200000"/>
+              </a:lnSpc>
               <a:buFont typeface="Arial" panose="020B0604020202020204" pitchFamily="34" charset="0"/>
               <a:buChar char="•"/>
             </a:pPr>
@@ -7008,6 +7270,9 @@
           </a:p>
           <a:p>
             <a:pPr marL="342900" indent="-342900">
+              <a:lnSpc>
+                <a:spcPct val="200000"/>
+              </a:lnSpc>
               <a:buFont typeface="Arial" panose="020B0604020202020204" pitchFamily="34" charset="0"/>
               <a:buChar char="•"/>
             </a:pPr>
@@ -7030,17 +7295,7 @@
               <a:rPr lang="de-DE" sz="2000" b="0" dirty="0" smtClean="0"/>
               <a:t>HAW-Hamburg</a:t>
             </a:r>
-          </a:p>
-          <a:p>
-            <a:pPr marL="342900" indent="-342900">
-              <a:buFont typeface="Arial" panose="020B0604020202020204" pitchFamily="34" charset="0"/>
-              <a:buChar char="•"/>
-            </a:pPr>
-            <a:r>
-              <a:rPr lang="de-DE" sz="2000" b="0" i="1" dirty="0"/>
-              <a:t>#VogelDesJahres2016</a:t>
-            </a:r>
-            <a:endParaRPr lang="de-DE" sz="2000" dirty="0"/>
+            <a:endParaRPr lang="de-DE" sz="2000" b="0" dirty="0" smtClean="0"/>
           </a:p>
         </p:txBody>
       </p:sp>
@@ -7061,7 +7316,7 @@
           <a:p>
             <a:fld id="{48352B5A-167D-4ED6-B7C9-BDA647A8BA51}" type="datetime1">
               <a:rPr lang="de-DE" smtClean="0"/>
-              <a:t>21.11.2016</a:t>
+              <a:t>28.11.2016</a:t>
             </a:fld>
             <a:endParaRPr lang="de-DE"/>
           </a:p>
@@ -7106,6 +7361,50 @@
               <a:t>2</a:t>
             </a:fld>
             <a:endParaRPr lang="de-DE"/>
+          </a:p>
+        </p:txBody>
+      </p:sp>
+      <p:sp>
+        <p:nvSpPr>
+          <p:cNvPr id="6" name="Rechteck 5"/>
+          <p:cNvSpPr/>
+          <p:nvPr/>
+        </p:nvSpPr>
+        <p:spPr>
+          <a:xfrm rot="1800000">
+            <a:off x="7472773" y="2023257"/>
+            <a:ext cx="2664296" cy="360040"/>
+          </a:xfrm>
+          <a:prstGeom prst="rect">
+            <a:avLst/>
+          </a:prstGeom>
+        </p:spPr>
+        <p:style>
+          <a:lnRef idx="2">
+            <a:schemeClr val="accent1">
+              <a:shade val="50000"/>
+            </a:schemeClr>
+          </a:lnRef>
+          <a:fillRef idx="1">
+            <a:schemeClr val="accent1"/>
+          </a:fillRef>
+          <a:effectRef idx="0">
+            <a:schemeClr val="accent1"/>
+          </a:effectRef>
+          <a:fontRef idx="minor">
+            <a:schemeClr val="lt1"/>
+          </a:fontRef>
+        </p:style>
+        <p:txBody>
+          <a:bodyPr rtlCol="0" anchor="ctr"/>
+          <a:lstStyle/>
+          <a:p>
+            <a:pPr algn="ctr"/>
+            <a:r>
+              <a:rPr lang="de-DE" i="1" dirty="0"/>
+              <a:t>#VogelDesJahres2016</a:t>
+            </a:r>
+            <a:endParaRPr lang="de-DE" dirty="0"/>
           </a:p>
         </p:txBody>
       </p:sp>
@@ -7148,6 +7447,201 @@
       </p:grpSpPr>
       <p:sp>
         <p:nvSpPr>
+          <p:cNvPr id="10" name="Titel 9"/>
+          <p:cNvSpPr>
+            <a:spLocks noGrp="1"/>
+          </p:cNvSpPr>
+          <p:nvPr>
+            <p:ph type="title"/>
+          </p:nvPr>
+        </p:nvSpPr>
+        <p:spPr/>
+        <p:txBody>
+          <a:bodyPr/>
+          <a:lstStyle/>
+          <a:p>
+            <a:r>
+              <a:rPr lang="de-DE" dirty="0" smtClean="0"/>
+              <a:t>Agenda</a:t>
+            </a:r>
+            <a:endParaRPr lang="de-DE" dirty="0"/>
+          </a:p>
+        </p:txBody>
+      </p:sp>
+      <p:sp>
+        <p:nvSpPr>
+          <p:cNvPr id="7" name="Datumsplatzhalter 6"/>
+          <p:cNvSpPr>
+            <a:spLocks noGrp="1"/>
+          </p:cNvSpPr>
+          <p:nvPr>
+            <p:ph type="dt" sz="half" idx="10"/>
+          </p:nvPr>
+        </p:nvSpPr>
+        <p:spPr/>
+        <p:txBody>
+          <a:bodyPr/>
+          <a:lstStyle/>
+          <a:p>
+            <a:fld id="{ED7E8129-6AB0-4316-89DD-05AD9ABD1F9D}" type="datetime1">
+              <a:rPr lang="de-DE" smtClean="0"/>
+              <a:t>28.11.2016</a:t>
+            </a:fld>
+            <a:endParaRPr lang="de-DE"/>
+          </a:p>
+        </p:txBody>
+      </p:sp>
+      <p:sp>
+        <p:nvSpPr>
+          <p:cNvPr id="8" name="Fußzeilenplatzhalter 7"/>
+          <p:cNvSpPr>
+            <a:spLocks noGrp="1"/>
+          </p:cNvSpPr>
+          <p:nvPr>
+            <p:ph type="ftr" sz="quarter" idx="11"/>
+          </p:nvPr>
+        </p:nvSpPr>
+        <p:spPr/>
+        <p:txBody>
+          <a:bodyPr/>
+          <a:lstStyle/>
+          <a:p>
+            <a:endParaRPr lang="de-DE"/>
+          </a:p>
+        </p:txBody>
+      </p:sp>
+      <p:sp>
+        <p:nvSpPr>
+          <p:cNvPr id="9" name="Foliennummernplatzhalter 8"/>
+          <p:cNvSpPr>
+            <a:spLocks noGrp="1"/>
+          </p:cNvSpPr>
+          <p:nvPr>
+            <p:ph type="sldNum" sz="quarter" idx="12"/>
+          </p:nvPr>
+        </p:nvSpPr>
+        <p:spPr/>
+        <p:txBody>
+          <a:bodyPr/>
+          <a:lstStyle/>
+          <a:p>
+            <a:fld id="{E07F1749-2C29-4AD9-BF92-E70F8884412B}" type="slidenum">
+              <a:rPr lang="de-DE" smtClean="0"/>
+              <a:t>3</a:t>
+            </a:fld>
+            <a:endParaRPr lang="de-DE"/>
+          </a:p>
+        </p:txBody>
+      </p:sp>
+      <p:sp>
+        <p:nvSpPr>
+          <p:cNvPr id="11" name="Inhaltsplatzhalter 10"/>
+          <p:cNvSpPr>
+            <a:spLocks noGrp="1"/>
+          </p:cNvSpPr>
+          <p:nvPr>
+            <p:ph sz="quarter" idx="13"/>
+          </p:nvPr>
+        </p:nvSpPr>
+        <p:spPr/>
+        <p:txBody>
+          <a:bodyPr anchor="t"/>
+          <a:lstStyle/>
+          <a:p>
+            <a:pPr algn="ctr"/>
+            <a:r>
+              <a:rPr lang="de-DE" dirty="0" smtClean="0"/>
+              <a:t>Was?</a:t>
+            </a:r>
+          </a:p>
+          <a:p>
+            <a:pPr algn="ctr"/>
+            <a:r>
+              <a:rPr lang="de-DE" dirty="0" smtClean="0"/>
+              <a:t>Der Weg</a:t>
+            </a:r>
+          </a:p>
+          <a:p>
+            <a:pPr algn="ctr"/>
+            <a:r>
+              <a:rPr lang="de-DE" dirty="0" smtClean="0"/>
+              <a:t>Ein Rezept</a:t>
+            </a:r>
+          </a:p>
+          <a:p>
+            <a:pPr algn="ctr"/>
+            <a:r>
+              <a:rPr lang="de-DE" dirty="0" smtClean="0"/>
+              <a:t>Eine Architektur</a:t>
+            </a:r>
+          </a:p>
+          <a:p>
+            <a:pPr algn="ctr"/>
+            <a:r>
+              <a:rPr lang="de-DE" dirty="0" smtClean="0"/>
+              <a:t>Der Aufbau</a:t>
+            </a:r>
+          </a:p>
+          <a:p>
+            <a:pPr algn="ctr"/>
+            <a:r>
+              <a:rPr lang="de-DE" dirty="0" smtClean="0"/>
+              <a:t>Die Demo</a:t>
+            </a:r>
+          </a:p>
+          <a:p>
+            <a:pPr algn="ctr"/>
+            <a:r>
+              <a:rPr lang="de-DE" dirty="0" smtClean="0"/>
+              <a:t>Q &amp; A</a:t>
+            </a:r>
+          </a:p>
+          <a:p>
+            <a:pPr algn="ctr"/>
+            <a:endParaRPr lang="de-DE" dirty="0" smtClean="0"/>
+          </a:p>
+          <a:p>
+            <a:pPr algn="ctr"/>
+            <a:endParaRPr lang="de-DE" dirty="0" smtClean="0"/>
+          </a:p>
+          <a:p>
+            <a:pPr algn="ctr"/>
+            <a:endParaRPr lang="de-DE" dirty="0"/>
+          </a:p>
+        </p:txBody>
+      </p:sp>
+    </p:spTree>
+    <p:extLst>
+      <p:ext uri="{BB962C8B-B14F-4D97-AF65-F5344CB8AC3E}">
+        <p14:creationId xmlns:p14="http://schemas.microsoft.com/office/powerpoint/2010/main" val="866081572"/>
+      </p:ext>
+    </p:extLst>
+  </p:cSld>
+  <p:clrMapOvr>
+    <a:masterClrMapping/>
+  </p:clrMapOvr>
+</p:sld>
+</file>
+
+<file path=ppt/slides/slide4.xml><?xml version="1.0" encoding="utf-8"?>
+<p:sld xmlns:a="http://schemas.openxmlformats.org/drawingml/2006/main" xmlns:r="http://schemas.openxmlformats.org/officeDocument/2006/relationships" xmlns:p="http://schemas.openxmlformats.org/presentationml/2006/main">
+  <p:cSld>
+    <p:spTree>
+      <p:nvGrpSpPr>
+        <p:cNvPr id="1" name=""/>
+        <p:cNvGrpSpPr/>
+        <p:nvPr/>
+      </p:nvGrpSpPr>
+      <p:grpSpPr>
+        <a:xfrm>
+          <a:off x="0" y="0"/>
+          <a:ext cx="0" cy="0"/>
+          <a:chOff x="0" y="0"/>
+          <a:chExt cx="0" cy="0"/>
+        </a:xfrm>
+      </p:grpSpPr>
+      <p:sp>
+        <p:nvSpPr>
           <p:cNvPr id="2049" name="Ellipse 2048"/>
           <p:cNvSpPr/>
           <p:nvPr/>
@@ -7225,7 +7719,7 @@
           <a:p>
             <a:fld id="{48352B5A-167D-4ED6-B7C9-BDA647A8BA51}" type="datetime1">
               <a:rPr lang="de-DE" smtClean="0"/>
-              <a:t>21.11.2016</a:t>
+              <a:t>28.11.2016</a:t>
             </a:fld>
             <a:endParaRPr lang="de-DE"/>
           </a:p>
@@ -7271,7 +7765,7 @@
           <a:p>
             <a:fld id="{E07F1749-2C29-4AD9-BF92-E70F8884412B}" type="slidenum">
               <a:rPr lang="de-DE" smtClean="0"/>
-              <a:t>3</a:t>
+              <a:t>4</a:t>
             </a:fld>
             <a:endParaRPr lang="de-DE"/>
           </a:p>
@@ -7587,219 +8081,6 @@
 </p:sld>
 </file>
 
-<file path=ppt/slides/slide4.xml><?xml version="1.0" encoding="utf-8"?>
-<p:sld xmlns:a="http://schemas.openxmlformats.org/drawingml/2006/main" xmlns:r="http://schemas.openxmlformats.org/officeDocument/2006/relationships" xmlns:p="http://schemas.openxmlformats.org/presentationml/2006/main">
-  <p:cSld>
-    <p:spTree>
-      <p:nvGrpSpPr>
-        <p:cNvPr id="1" name=""/>
-        <p:cNvGrpSpPr/>
-        <p:nvPr/>
-      </p:nvGrpSpPr>
-      <p:grpSpPr>
-        <a:xfrm>
-          <a:off x="0" y="0"/>
-          <a:ext cx="0" cy="0"/>
-          <a:chOff x="0" y="0"/>
-          <a:chExt cx="0" cy="0"/>
-        </a:xfrm>
-      </p:grpSpPr>
-      <p:sp>
-        <p:nvSpPr>
-          <p:cNvPr id="2" name="Titel 1"/>
-          <p:cNvSpPr>
-            <a:spLocks noGrp="1"/>
-          </p:cNvSpPr>
-          <p:nvPr>
-            <p:ph type="title"/>
-          </p:nvPr>
-        </p:nvSpPr>
-        <p:spPr/>
-        <p:txBody>
-          <a:bodyPr/>
-          <a:lstStyle/>
-          <a:p>
-            <a:r>
-              <a:rPr lang="de-DE" dirty="0" smtClean="0"/>
-              <a:t>Wie wir angefangen haben</a:t>
-            </a:r>
-            <a:endParaRPr lang="de-DE" dirty="0"/>
-          </a:p>
-        </p:txBody>
-      </p:sp>
-      <p:sp>
-        <p:nvSpPr>
-          <p:cNvPr id="3" name="Datumsplatzhalter 2"/>
-          <p:cNvSpPr>
-            <a:spLocks noGrp="1"/>
-          </p:cNvSpPr>
-          <p:nvPr>
-            <p:ph type="dt" sz="half" idx="10"/>
-          </p:nvPr>
-        </p:nvSpPr>
-        <p:spPr/>
-        <p:txBody>
-          <a:bodyPr/>
-          <a:lstStyle/>
-          <a:p>
-            <a:fld id="{48352B5A-167D-4ED6-B7C9-BDA647A8BA51}" type="datetime1">
-              <a:rPr lang="de-DE" smtClean="0"/>
-              <a:t>21.11.2016</a:t>
-            </a:fld>
-            <a:endParaRPr lang="de-DE"/>
-          </a:p>
-        </p:txBody>
-      </p:sp>
-      <p:sp>
-        <p:nvSpPr>
-          <p:cNvPr id="4" name="Fußzeilenplatzhalter 3"/>
-          <p:cNvSpPr>
-            <a:spLocks noGrp="1"/>
-          </p:cNvSpPr>
-          <p:nvPr>
-            <p:ph type="ftr" sz="quarter" idx="11"/>
-          </p:nvPr>
-        </p:nvSpPr>
-        <p:spPr/>
-        <p:txBody>
-          <a:bodyPr/>
-          <a:lstStyle/>
-          <a:p>
-            <a:endParaRPr lang="de-DE"/>
-          </a:p>
-        </p:txBody>
-      </p:sp>
-      <p:sp>
-        <p:nvSpPr>
-          <p:cNvPr id="5" name="Foliennummernplatzhalter 4"/>
-          <p:cNvSpPr>
-            <a:spLocks noGrp="1"/>
-          </p:cNvSpPr>
-          <p:nvPr>
-            <p:ph type="sldNum" sz="quarter" idx="12"/>
-          </p:nvPr>
-        </p:nvSpPr>
-        <p:spPr/>
-        <p:txBody>
-          <a:bodyPr/>
-          <a:lstStyle/>
-          <a:p>
-            <a:fld id="{E07F1749-2C29-4AD9-BF92-E70F8884412B}" type="slidenum">
-              <a:rPr lang="de-DE" smtClean="0"/>
-              <a:t>4</a:t>
-            </a:fld>
-            <a:endParaRPr lang="de-DE"/>
-          </a:p>
-        </p:txBody>
-      </p:sp>
-      <p:sp>
-        <p:nvSpPr>
-          <p:cNvPr id="6" name="Inhaltsplatzhalter 5"/>
-          <p:cNvSpPr>
-            <a:spLocks noGrp="1"/>
-          </p:cNvSpPr>
-          <p:nvPr>
-            <p:ph sz="quarter" idx="13"/>
-          </p:nvPr>
-        </p:nvSpPr>
-        <p:spPr/>
-        <p:txBody>
-          <a:bodyPr/>
-          <a:lstStyle/>
-          <a:p>
-            <a:pPr marL="342900" indent="-342900">
-              <a:buFont typeface="Arial" panose="020B0604020202020204" pitchFamily="34" charset="0"/>
-              <a:buChar char="•"/>
-            </a:pPr>
-            <a:r>
-              <a:rPr lang="de-DE" b="0" dirty="0" smtClean="0"/>
-              <a:t>Arbeiten am Forschungsprojekt </a:t>
-            </a:r>
-            <a:r>
-              <a:rPr lang="de-DE" b="0" dirty="0" err="1" smtClean="0"/>
-              <a:t>Symphony</a:t>
-            </a:r>
-            <a:endParaRPr lang="de-DE" b="0" dirty="0" smtClean="0"/>
-          </a:p>
-          <a:p>
-            <a:pPr marL="342900" indent="-342900">
-              <a:buFont typeface="Arial" panose="020B0604020202020204" pitchFamily="34" charset="0"/>
-              <a:buChar char="•"/>
-            </a:pPr>
-            <a:r>
-              <a:rPr lang="de-DE" b="0" dirty="0" smtClean="0"/>
-              <a:t>Agiles vorgehen?!</a:t>
-            </a:r>
-          </a:p>
-          <a:p>
-            <a:pPr marL="594900" lvl="2" indent="-342900">
-              <a:buFont typeface="Arial" panose="020B0604020202020204" pitchFamily="34" charset="0"/>
-              <a:buChar char="•"/>
-            </a:pPr>
-            <a:r>
-              <a:rPr lang="de-DE" dirty="0" err="1" smtClean="0"/>
-              <a:t>MockUpWeiche</a:t>
-            </a:r>
-            <a:r>
-              <a:rPr lang="de-DE" dirty="0" smtClean="0"/>
-              <a:t> für (noch) nicht Implementiertes</a:t>
-            </a:r>
-          </a:p>
-          <a:p>
-            <a:pPr marL="342900" lvl="1" indent="-342900">
-              <a:buFont typeface="Arial" panose="020B0604020202020204" pitchFamily="34" charset="0"/>
-              <a:buChar char="•"/>
-            </a:pPr>
-            <a:r>
-              <a:rPr lang="de-DE" b="0" dirty="0" err="1" smtClean="0"/>
-              <a:t>Mockups</a:t>
-            </a:r>
-            <a:r>
-              <a:rPr lang="de-DE" b="0" dirty="0" smtClean="0"/>
-              <a:t> mit </a:t>
-            </a:r>
-            <a:r>
-              <a:rPr lang="de-DE" b="0" dirty="0" err="1" smtClean="0"/>
-              <a:t>NodeJS</a:t>
-            </a:r>
-            <a:endParaRPr lang="de-DE" b="0" dirty="0" smtClean="0"/>
-          </a:p>
-          <a:p>
-            <a:pPr marL="594900" lvl="2" indent="-342900">
-              <a:buFont typeface="Arial" panose="020B0604020202020204" pitchFamily="34" charset="0"/>
-              <a:buChar char="•"/>
-            </a:pPr>
-            <a:r>
-              <a:rPr lang="de-DE" dirty="0" smtClean="0"/>
-              <a:t>… und dann kam der Spieltrieb…</a:t>
-            </a:r>
-            <a:endParaRPr lang="de-DE" b="0" dirty="0" smtClean="0"/>
-          </a:p>
-          <a:p>
-            <a:endParaRPr lang="de-DE" b="0" dirty="0"/>
-          </a:p>
-        </p:txBody>
-      </p:sp>
-    </p:spTree>
-    <p:extLst>
-      <p:ext uri="{BB962C8B-B14F-4D97-AF65-F5344CB8AC3E}">
-        <p14:creationId xmlns:p14="http://schemas.microsoft.com/office/powerpoint/2010/main" val="4198500984"/>
-      </p:ext>
-    </p:extLst>
-  </p:cSld>
-  <p:clrMapOvr>
-    <a:masterClrMapping/>
-  </p:clrMapOvr>
-  <p:timing>
-    <p:tnLst>
-      <p:par>
-        <p:cTn id="1" dur="indefinite" restart="never" nodeType="tmRoot"/>
-      </p:par>
-    </p:tnLst>
-  </p:timing>
-</p:sld>
-</file>
-
 <file path=ppt/slides/slide5.xml><?xml version="1.0" encoding="utf-8"?>
 <p:sld xmlns:a="http://schemas.openxmlformats.org/drawingml/2006/main" xmlns:r="http://schemas.openxmlformats.org/officeDocument/2006/relationships" xmlns:p="http://schemas.openxmlformats.org/presentationml/2006/main">
   <p:cSld>
@@ -7834,9 +8115,17 @@
           <a:p>
             <a:r>
               <a:rPr lang="de-DE" dirty="0" smtClean="0"/>
-              <a:t>…Spieltrieb</a:t>
-            </a:r>
-            <a:endParaRPr lang="de-DE" dirty="0"/>
+              <a:t>Der Weg </a:t>
+            </a:r>
+            <a:r>
+              <a:rPr lang="de-DE" sz="1600" dirty="0" smtClean="0"/>
+              <a:t>…wie </a:t>
+            </a:r>
+            <a:r>
+              <a:rPr lang="de-DE" sz="1600" dirty="0" smtClean="0"/>
+              <a:t>wir angefangen haben</a:t>
+            </a:r>
+            <a:endParaRPr lang="de-DE" sz="1600" dirty="0"/>
           </a:p>
         </p:txBody>
       </p:sp>
@@ -7857,7 +8146,7 @@
           <a:p>
             <a:fld id="{48352B5A-167D-4ED6-B7C9-BDA647A8BA51}" type="datetime1">
               <a:rPr lang="de-DE" smtClean="0"/>
-              <a:t>21.11.2016</a:t>
+              <a:t>28.11.2016</a:t>
             </a:fld>
             <a:endParaRPr lang="de-DE"/>
           </a:p>
@@ -7920,96 +8209,103 @@
           <a:bodyPr/>
           <a:lstStyle/>
           <a:p>
-            <a:r>
-              <a:rPr lang="de-DE" dirty="0" smtClean="0"/>
-              <a:t>Man nehme…</a:t>
-            </a:r>
-          </a:p>
-          <a:p>
             <a:pPr marL="342900" indent="-342900">
+              <a:lnSpc>
+                <a:spcPct val="200000"/>
+              </a:lnSpc>
               <a:buFont typeface="Arial" panose="020B0604020202020204" pitchFamily="34" charset="0"/>
               <a:buChar char="•"/>
             </a:pPr>
             <a:r>
               <a:rPr lang="de-DE" b="0" dirty="0" smtClean="0"/>
-              <a:t>2 Studenten</a:t>
-            </a:r>
+              <a:t>Forschungsprojekt </a:t>
+            </a:r>
+            <a:r>
+              <a:rPr lang="de-DE" b="0" dirty="0" err="1" smtClean="0"/>
+              <a:t>Symphony</a:t>
+            </a:r>
+            <a:endParaRPr lang="de-DE" b="0" dirty="0" smtClean="0"/>
           </a:p>
           <a:p>
             <a:pPr marL="342900" indent="-342900">
+              <a:lnSpc>
+                <a:spcPct val="200000"/>
+              </a:lnSpc>
               <a:buFont typeface="Arial" panose="020B0604020202020204" pitchFamily="34" charset="0"/>
               <a:buChar char="•"/>
             </a:pPr>
             <a:r>
               <a:rPr lang="de-DE" b="0" dirty="0" smtClean="0"/>
-              <a:t>Etwas Hardware</a:t>
-            </a:r>
-          </a:p>
-          <a:p>
-            <a:pPr marL="342900" indent="-342900">
+              <a:t>Agiles vorgehen?!</a:t>
+            </a:r>
+          </a:p>
+          <a:p>
+            <a:pPr marL="594900" lvl="2" indent="-342900">
+              <a:lnSpc>
+                <a:spcPct val="200000"/>
+              </a:lnSpc>
               <a:buFont typeface="Arial" panose="020B0604020202020204" pitchFamily="34" charset="0"/>
               <a:buChar char="•"/>
             </a:pPr>
             <a:r>
-              <a:rPr lang="de-DE" b="0" dirty="0" smtClean="0"/>
-              <a:t>Eine priese Neugier</a:t>
-            </a:r>
-          </a:p>
-          <a:p>
-            <a:pPr marL="342900" indent="-342900">
+              <a:rPr lang="de-DE" dirty="0" err="1" smtClean="0"/>
+              <a:t>MockUpWeiche</a:t>
+            </a:r>
+            <a:r>
+              <a:rPr lang="de-DE" dirty="0" smtClean="0"/>
+              <a:t> für (noch) nicht Implementiertes</a:t>
+            </a:r>
+          </a:p>
+          <a:p>
+            <a:pPr marL="342900" lvl="1" indent="-342900">
+              <a:lnSpc>
+                <a:spcPct val="200000"/>
+              </a:lnSpc>
               <a:buFont typeface="Arial" panose="020B0604020202020204" pitchFamily="34" charset="0"/>
               <a:buChar char="•"/>
             </a:pPr>
             <a:r>
+              <a:rPr lang="de-DE" b="0" dirty="0" err="1" smtClean="0"/>
+              <a:t>Mockups</a:t>
+            </a:r>
+            <a:r>
               <a:rPr lang="de-DE" b="0" dirty="0" smtClean="0"/>
-              <a:t>Die ein oder andere Portion Node.JS</a:t>
-            </a:r>
-          </a:p>
-          <a:p>
-            <a:pPr marL="342900" indent="-342900">
+              <a:t> mit </a:t>
+            </a:r>
+            <a:r>
+              <a:rPr lang="de-DE" b="0" dirty="0" err="1" smtClean="0"/>
+              <a:t>NodeJS</a:t>
+            </a:r>
+            <a:endParaRPr lang="de-DE" b="0" dirty="0" smtClean="0"/>
+          </a:p>
+          <a:p>
+            <a:pPr marL="594900" lvl="2" indent="-342900">
+              <a:lnSpc>
+                <a:spcPct val="200000"/>
+              </a:lnSpc>
               <a:buFont typeface="Arial" panose="020B0604020202020204" pitchFamily="34" charset="0"/>
               <a:buChar char="•"/>
             </a:pPr>
             <a:r>
-              <a:rPr lang="de-DE" b="0" dirty="0" smtClean="0"/>
-              <a:t>Kräftig spielen…</a:t>
-            </a:r>
-          </a:p>
-          <a:p>
-            <a:pPr algn="ctr"/>
-            <a:r>
-              <a:rPr lang="de-DE" b="0" dirty="0" smtClean="0"/>
-              <a:t>… fertig ist das </a:t>
-            </a:r>
-            <a:r>
-              <a:rPr lang="de-DE" b="0" dirty="0" err="1" smtClean="0"/>
-              <a:t>IoT</a:t>
-            </a:r>
-            <a:r>
-              <a:rPr lang="de-DE" b="0" dirty="0" smtClean="0"/>
-              <a:t>?</a:t>
-            </a:r>
-          </a:p>
-          <a:p>
-            <a:pPr algn="ctr"/>
-            <a:r>
-              <a:rPr lang="de-DE" b="0" dirty="0" smtClean="0"/>
-              <a:t>Nicht ganz aber fast!</a:t>
-            </a:r>
-          </a:p>
-          <a:p>
-            <a:pPr marL="342900" indent="-342900">
-              <a:buFont typeface="Arial" panose="020B0604020202020204" pitchFamily="34" charset="0"/>
-              <a:buChar char="•"/>
+              <a:rPr lang="de-DE" dirty="0" smtClean="0"/>
+              <a:t>… und dann kam der Spieltrieb…</a:t>
+            </a:r>
+            <a:endParaRPr lang="de-DE" b="0" dirty="0" smtClean="0"/>
+          </a:p>
+          <a:p>
+            <a:pPr>
+              <a:lnSpc>
+                <a:spcPct val="200000"/>
+              </a:lnSpc>
             </a:pPr>
-            <a:endParaRPr lang="de-DE" dirty="0"/>
+            <a:endParaRPr lang="de-DE" b="0" dirty="0"/>
           </a:p>
         </p:txBody>
       </p:sp>
     </p:spTree>
     <p:extLst>
       <p:ext uri="{BB962C8B-B14F-4D97-AF65-F5344CB8AC3E}">
-        <p14:creationId xmlns:p14="http://schemas.microsoft.com/office/powerpoint/2010/main" val="34334879"/>
+        <p14:creationId xmlns:p14="http://schemas.microsoft.com/office/powerpoint/2010/main" val="4198500984"/>
       </p:ext>
     </p:extLst>
   </p:cSld>
@@ -8059,22 +8355,18 @@
           <a:lstStyle/>
           <a:p>
             <a:r>
-              <a:rPr lang="de-DE" dirty="0"/>
-              <a:t>Für unsere </a:t>
+              <a:rPr lang="de-DE" b="1" dirty="0" smtClean="0"/>
+              <a:t>Ein Rezept</a:t>
             </a:r>
             <a:r>
               <a:rPr lang="de-DE" dirty="0" smtClean="0"/>
-              <a:t>Demo</a:t>
-            </a:r>
-            <a:r>
-              <a:rPr lang="de-DE" dirty="0"/>
               <a:t> </a:t>
             </a:r>
             <a:r>
-              <a:rPr lang="de-DE" dirty="0" smtClean="0"/>
-              <a:t>verwenden wir:</a:t>
-            </a:r>
-            <a:endParaRPr lang="de-DE" dirty="0"/>
+              <a:rPr lang="de-DE" sz="1600" dirty="0" smtClean="0"/>
+              <a:t>… für Spieltrieb</a:t>
+            </a:r>
+            <a:endParaRPr lang="de-DE" sz="1600" dirty="0"/>
           </a:p>
         </p:txBody>
       </p:sp>
@@ -8095,7 +8387,7 @@
           <a:p>
             <a:fld id="{48352B5A-167D-4ED6-B7C9-BDA647A8BA51}" type="datetime1">
               <a:rPr lang="de-DE" smtClean="0"/>
-              <a:t>21.11.2016</a:t>
+              <a:t>28.11.2016</a:t>
             </a:fld>
             <a:endParaRPr lang="de-DE"/>
           </a:p>
@@ -8159,135 +8451,95 @@
           <a:lstStyle/>
           <a:p>
             <a:r>
-              <a:rPr lang="de-DE" dirty="0" err="1" smtClean="0"/>
-              <a:t>Fritz.Box</a:t>
-            </a:r>
+              <a:rPr lang="de-DE" dirty="0" smtClean="0"/>
+              <a:t>Man nehme…</a:t>
+            </a:r>
+          </a:p>
+          <a:p>
+            <a:pPr marL="342900" indent="-342900">
+              <a:buFont typeface="Arial" panose="020B0604020202020204" pitchFamily="34" charset="0"/>
+              <a:buChar char="•"/>
+            </a:pPr>
             <a:r>
               <a:rPr lang="de-DE" b="0" dirty="0" smtClean="0"/>
-              <a:t> </a:t>
-            </a:r>
-            <a:r>
-              <a:rPr lang="de-DE" b="0" dirty="0"/>
-              <a:t>als </a:t>
-            </a:r>
+              <a:t>2 Studenten</a:t>
+            </a:r>
+          </a:p>
+          <a:p>
+            <a:pPr marL="342900" indent="-342900">
+              <a:buFont typeface="Arial" panose="020B0604020202020204" pitchFamily="34" charset="0"/>
+              <a:buChar char="•"/>
+            </a:pPr>
             <a:r>
               <a:rPr lang="de-DE" b="0" dirty="0" smtClean="0"/>
-              <a:t>Access-Point </a:t>
-            </a:r>
-            <a:r>
-              <a:rPr lang="de-DE" b="0" dirty="0"/>
-              <a:t>und </a:t>
-            </a:r>
+              <a:t>Etwas Hardware</a:t>
+            </a:r>
+          </a:p>
+          <a:p>
+            <a:pPr marL="342900" indent="-342900">
+              <a:buFont typeface="Arial" panose="020B0604020202020204" pitchFamily="34" charset="0"/>
+              <a:buChar char="•"/>
+            </a:pPr>
             <a:r>
               <a:rPr lang="de-DE" b="0" dirty="0" smtClean="0"/>
-              <a:t>Router</a:t>
-            </a:r>
-          </a:p>
-          <a:p>
-            <a:endParaRPr lang="de-DE" b="0" dirty="0"/>
-          </a:p>
-          <a:p>
-            <a:r>
-              <a:rPr lang="de-DE" dirty="0" err="1" smtClean="0"/>
-              <a:t>Raspberry</a:t>
-            </a:r>
-            <a:r>
-              <a:rPr lang="de-DE" dirty="0"/>
-              <a:t>-</a:t>
-            </a:r>
-            <a:r>
-              <a:rPr lang="de-DE" dirty="0" smtClean="0"/>
-              <a:t>PI 2B </a:t>
-            </a:r>
+              <a:t>Eine priese Neugier</a:t>
+            </a:r>
+          </a:p>
+          <a:p>
+            <a:pPr marL="342900" indent="-342900">
+              <a:buFont typeface="Arial" panose="020B0604020202020204" pitchFamily="34" charset="0"/>
+              <a:buChar char="•"/>
+            </a:pPr>
             <a:r>
               <a:rPr lang="de-DE" b="0" dirty="0" smtClean="0"/>
-              <a:t>als Host</a:t>
-            </a:r>
-          </a:p>
-          <a:p>
-            <a:r>
-              <a:rPr lang="de-DE" b="0" dirty="0"/>
-              <a:t>	</a:t>
+              <a:t>Die ein oder andere Portion Node.JS</a:t>
+            </a:r>
+          </a:p>
+          <a:p>
+            <a:pPr marL="342900" indent="-342900">
+              <a:buFont typeface="Arial" panose="020B0604020202020204" pitchFamily="34" charset="0"/>
+              <a:buChar char="•"/>
+            </a:pPr>
+            <a:r>
+              <a:rPr lang="de-DE" b="0" dirty="0" smtClean="0"/>
+              <a:t>Kräftig spielen…</a:t>
+            </a:r>
+          </a:p>
+          <a:p>
+            <a:pPr algn="ctr"/>
+            <a:r>
+              <a:rPr lang="de-DE" b="0" dirty="0" smtClean="0"/>
+              <a:t>… fertig ist das </a:t>
             </a:r>
             <a:r>
               <a:rPr lang="de-DE" b="0" dirty="0" err="1" smtClean="0"/>
-              <a:t>NodeJS</a:t>
+              <a:t>IoT</a:t>
             </a:r>
             <a:r>
               <a:rPr lang="de-DE" b="0" dirty="0" smtClean="0"/>
-              <a:t>, </a:t>
-            </a:r>
-            <a:r>
-              <a:rPr lang="de-DE" b="0" dirty="0" err="1" smtClean="0"/>
-              <a:t>ExpressJS</a:t>
-            </a:r>
+              <a:t>?</a:t>
+            </a:r>
+          </a:p>
+          <a:p>
+            <a:pPr algn="ctr"/>
             <a:r>
               <a:rPr lang="de-DE" b="0" dirty="0" smtClean="0"/>
-              <a:t>, …</a:t>
-            </a:r>
-          </a:p>
-          <a:p>
-            <a:endParaRPr lang="de-DE" b="0" dirty="0" smtClean="0"/>
-          </a:p>
-          <a:p>
-            <a:r>
-              <a:rPr lang="de-DE" dirty="0" smtClean="0"/>
-              <a:t>ESP8266</a:t>
-            </a:r>
-            <a:r>
-              <a:rPr lang="de-DE" b="0" dirty="0" smtClean="0"/>
-              <a:t> als programmierbare </a:t>
-            </a:r>
-            <a:r>
-              <a:rPr lang="de-DE" b="0" dirty="0" err="1" smtClean="0"/>
-              <a:t>WiFi</a:t>
-            </a:r>
-            <a:r>
-              <a:rPr lang="de-DE" b="0" dirty="0" smtClean="0"/>
-              <a:t>-Devices</a:t>
-            </a:r>
-            <a:endParaRPr lang="de-DE" b="0" dirty="0"/>
-          </a:p>
-          <a:p>
-            <a:r>
-              <a:rPr lang="de-DE" b="0" dirty="0"/>
-              <a:t>	</a:t>
-            </a:r>
-            <a:r>
-              <a:rPr lang="de-DE" b="0" dirty="0" err="1"/>
-              <a:t>Arduino</a:t>
-            </a:r>
-            <a:r>
-              <a:rPr lang="de-DE" b="0" dirty="0"/>
-              <a:t>-IDE, C, C</a:t>
-            </a:r>
-            <a:r>
-              <a:rPr lang="de-DE" b="0" dirty="0" smtClean="0"/>
-              <a:t>++</a:t>
-            </a:r>
-          </a:p>
-          <a:p>
-            <a:r>
-              <a:rPr lang="de-DE" b="0" dirty="0"/>
-              <a:t>	</a:t>
-            </a:r>
-            <a:r>
-              <a:rPr lang="de-DE" b="0" dirty="0" smtClean="0"/>
-              <a:t>Diverse Hardware zur Demonstration</a:t>
-            </a:r>
-          </a:p>
-          <a:p>
-            <a:endParaRPr lang="de-DE" b="0" dirty="0" smtClean="0"/>
-          </a:p>
-          <a:p>
-            <a:endParaRPr lang="de-DE" dirty="0" smtClean="0"/>
+              <a:t>Nicht ganz aber fast!</a:t>
+            </a:r>
+          </a:p>
+          <a:p>
+            <a:pPr marL="342900" indent="-342900">
+              <a:buFont typeface="Arial" panose="020B0604020202020204" pitchFamily="34" charset="0"/>
+              <a:buChar char="•"/>
+            </a:pPr>
+            <a:endParaRPr lang="de-DE" dirty="0"/>
           </a:p>
         </p:txBody>
       </p:sp>
     </p:spTree>
     <p:extLst>
       <p:ext uri="{BB962C8B-B14F-4D97-AF65-F5344CB8AC3E}">
-        <p14:creationId xmlns:p14="http://schemas.microsoft.com/office/powerpoint/2010/main" val="3325320967"/>
+        <p14:creationId xmlns:p14="http://schemas.microsoft.com/office/powerpoint/2010/main" val="34334879"/>
       </p:ext>
     </p:extLst>
   </p:cSld>
@@ -8338,11 +8590,407 @@
           <a:p>
             <a:r>
               <a:rPr lang="de-DE" dirty="0" smtClean="0"/>
-              <a:t>Präsentation Dashboard und </a:t>
-            </a:r>
+              <a:t>Eine Architektur </a:t>
+            </a:r>
+            <a:r>
+              <a:rPr lang="de-DE" sz="1600" dirty="0" smtClean="0"/>
+              <a:t>… für </a:t>
+            </a:r>
+            <a:r>
+              <a:rPr lang="de-DE" sz="1600" dirty="0"/>
+              <a:t>unsere </a:t>
+            </a:r>
+            <a:r>
+              <a:rPr lang="de-DE" sz="1600" dirty="0" smtClean="0"/>
+              <a:t>Demo</a:t>
+            </a:r>
+            <a:r>
+              <a:rPr lang="de-DE" sz="1600" dirty="0"/>
+              <a:t> </a:t>
+            </a:r>
+            <a:r>
+              <a:rPr lang="de-DE" sz="1600" dirty="0" smtClean="0"/>
+              <a:t>verwenden wir:</a:t>
+            </a:r>
+            <a:endParaRPr lang="de-DE" sz="1600" dirty="0"/>
+          </a:p>
+        </p:txBody>
+      </p:sp>
+      <p:sp>
+        <p:nvSpPr>
+          <p:cNvPr id="3" name="Datumsplatzhalter 2"/>
+          <p:cNvSpPr>
+            <a:spLocks noGrp="1"/>
+          </p:cNvSpPr>
+          <p:nvPr>
+            <p:ph type="dt" sz="half" idx="10"/>
+          </p:nvPr>
+        </p:nvSpPr>
+        <p:spPr/>
+        <p:txBody>
+          <a:bodyPr/>
+          <a:lstStyle/>
+          <a:p>
+            <a:fld id="{48352B5A-167D-4ED6-B7C9-BDA647A8BA51}" type="datetime1">
+              <a:rPr lang="de-DE" smtClean="0"/>
+              <a:t>28.11.2016</a:t>
+            </a:fld>
+            <a:endParaRPr lang="de-DE"/>
+          </a:p>
+        </p:txBody>
+      </p:sp>
+      <p:sp>
+        <p:nvSpPr>
+          <p:cNvPr id="4" name="Fußzeilenplatzhalter 3"/>
+          <p:cNvSpPr>
+            <a:spLocks noGrp="1"/>
+          </p:cNvSpPr>
+          <p:nvPr>
+            <p:ph type="ftr" sz="quarter" idx="11"/>
+          </p:nvPr>
+        </p:nvSpPr>
+        <p:spPr/>
+        <p:txBody>
+          <a:bodyPr/>
+          <a:lstStyle/>
+          <a:p>
+            <a:endParaRPr lang="de-DE"/>
+          </a:p>
+        </p:txBody>
+      </p:sp>
+      <p:sp>
+        <p:nvSpPr>
+          <p:cNvPr id="5" name="Foliennummernplatzhalter 4"/>
+          <p:cNvSpPr>
+            <a:spLocks noGrp="1"/>
+          </p:cNvSpPr>
+          <p:nvPr>
+            <p:ph type="sldNum" sz="quarter" idx="12"/>
+          </p:nvPr>
+        </p:nvSpPr>
+        <p:spPr/>
+        <p:txBody>
+          <a:bodyPr/>
+          <a:lstStyle/>
+          <a:p>
+            <a:fld id="{E07F1749-2C29-4AD9-BF92-E70F8884412B}" type="slidenum">
+              <a:rPr lang="de-DE" smtClean="0"/>
+              <a:t>7</a:t>
+            </a:fld>
+            <a:endParaRPr lang="de-DE"/>
+          </a:p>
+        </p:txBody>
+      </p:sp>
+      <p:sp>
+        <p:nvSpPr>
+          <p:cNvPr id="6" name="Inhaltsplatzhalter 5"/>
+          <p:cNvSpPr>
+            <a:spLocks noGrp="1"/>
+          </p:cNvSpPr>
+          <p:nvPr>
+            <p:ph sz="quarter" idx="13"/>
+          </p:nvPr>
+        </p:nvSpPr>
+        <p:spPr>
+          <a:xfrm>
+            <a:off x="576263" y="1511300"/>
+            <a:ext cx="4679950" cy="2664891"/>
+          </a:xfrm>
+        </p:spPr>
+        <p:txBody>
+          <a:bodyPr/>
+          <a:lstStyle/>
+          <a:p>
+            <a:pPr>
+              <a:lnSpc>
+                <a:spcPct val="200000"/>
+              </a:lnSpc>
+            </a:pPr>
             <a:r>
               <a:rPr lang="de-DE" dirty="0" err="1" smtClean="0"/>
-              <a:t>SystemArchitektur</a:t>
+              <a:t>Fritz.Box</a:t>
+            </a:r>
+            <a:endParaRPr lang="de-DE" b="0" dirty="0"/>
+          </a:p>
+          <a:p>
+            <a:pPr>
+              <a:lnSpc>
+                <a:spcPct val="200000"/>
+              </a:lnSpc>
+            </a:pPr>
+            <a:r>
+              <a:rPr lang="de-DE" dirty="0" err="1" smtClean="0"/>
+              <a:t>Raspberry</a:t>
+            </a:r>
+            <a:r>
+              <a:rPr lang="de-DE" dirty="0"/>
+              <a:t>-</a:t>
+            </a:r>
+            <a:r>
+              <a:rPr lang="de-DE" dirty="0" smtClean="0"/>
+              <a:t>PI </a:t>
+            </a:r>
+            <a:r>
+              <a:rPr lang="de-DE" dirty="0" smtClean="0"/>
+              <a:t>2B</a:t>
+            </a:r>
+            <a:endParaRPr lang="de-DE" b="0" dirty="0" smtClean="0"/>
+          </a:p>
+          <a:p>
+            <a:pPr>
+              <a:lnSpc>
+                <a:spcPct val="200000"/>
+              </a:lnSpc>
+            </a:pPr>
+            <a:r>
+              <a:rPr lang="de-DE" dirty="0" smtClean="0"/>
+              <a:t>ESP8266</a:t>
+            </a:r>
+            <a:endParaRPr lang="de-DE" b="0" dirty="0" smtClean="0"/>
+          </a:p>
+        </p:txBody>
+      </p:sp>
+      <p:sp>
+        <p:nvSpPr>
+          <p:cNvPr id="7" name="Inhaltsplatzhalter 6"/>
+          <p:cNvSpPr>
+            <a:spLocks noGrp="1"/>
+          </p:cNvSpPr>
+          <p:nvPr>
+            <p:ph sz="quarter" idx="14"/>
+          </p:nvPr>
+        </p:nvSpPr>
+        <p:spPr>
+          <a:xfrm>
+            <a:off x="5545138" y="1503874"/>
+            <a:ext cx="4679950" cy="2672317"/>
+          </a:xfrm>
+        </p:spPr>
+        <p:txBody>
+          <a:bodyPr/>
+          <a:lstStyle/>
+          <a:p>
+            <a:pPr>
+              <a:lnSpc>
+                <a:spcPct val="200000"/>
+              </a:lnSpc>
+            </a:pPr>
+            <a:r>
+              <a:rPr lang="de-DE" b="0" dirty="0"/>
+              <a:t>als Access-Point und Router</a:t>
+            </a:r>
+          </a:p>
+          <a:p>
+            <a:pPr>
+              <a:lnSpc>
+                <a:spcPct val="200000"/>
+              </a:lnSpc>
+            </a:pPr>
+            <a:r>
+              <a:rPr lang="de-DE" b="0" dirty="0"/>
+              <a:t>als </a:t>
+            </a:r>
+            <a:r>
+              <a:rPr lang="de-DE" b="0" dirty="0" smtClean="0"/>
+              <a:t>Host [</a:t>
+            </a:r>
+            <a:r>
+              <a:rPr lang="de-DE" b="0" dirty="0" err="1" smtClean="0"/>
+              <a:t>NodeJS</a:t>
+            </a:r>
+            <a:r>
+              <a:rPr lang="de-DE" b="0" dirty="0"/>
+              <a:t>, </a:t>
+            </a:r>
+            <a:r>
+              <a:rPr lang="de-DE" b="0" dirty="0" err="1"/>
+              <a:t>ExpressJS</a:t>
+            </a:r>
+            <a:r>
+              <a:rPr lang="de-DE" b="0" dirty="0"/>
+              <a:t>, </a:t>
+            </a:r>
+            <a:r>
+              <a:rPr lang="de-DE" b="0" dirty="0" smtClean="0"/>
+              <a:t>…]</a:t>
+            </a:r>
+            <a:endParaRPr lang="de-DE" b="0" dirty="0"/>
+          </a:p>
+          <a:p>
+            <a:pPr>
+              <a:lnSpc>
+                <a:spcPct val="200000"/>
+              </a:lnSpc>
+            </a:pPr>
+            <a:r>
+              <a:rPr lang="de-DE" b="0" dirty="0" smtClean="0"/>
+              <a:t>Als </a:t>
+            </a:r>
+            <a:r>
+              <a:rPr lang="de-DE" b="0" dirty="0" err="1" smtClean="0"/>
+              <a:t>IoT</a:t>
+            </a:r>
+            <a:r>
+              <a:rPr lang="de-DE" b="0" dirty="0" smtClean="0"/>
+              <a:t>-Device [</a:t>
+            </a:r>
+            <a:r>
+              <a:rPr lang="de-DE" b="0" dirty="0" err="1" smtClean="0"/>
+              <a:t>WiFi</a:t>
+            </a:r>
+            <a:r>
+              <a:rPr lang="de-DE" b="0" dirty="0" smtClean="0"/>
+              <a:t>-MCU]</a:t>
+            </a:r>
+            <a:endParaRPr lang="de-DE" b="0" dirty="0"/>
+          </a:p>
+        </p:txBody>
+      </p:sp>
+      <p:sp>
+        <p:nvSpPr>
+          <p:cNvPr id="10" name="Textfeld 9"/>
+          <p:cNvSpPr txBox="1"/>
+          <p:nvPr/>
+        </p:nvSpPr>
+        <p:spPr>
+          <a:xfrm>
+            <a:off x="648469" y="5688359"/>
+            <a:ext cx="9577064" cy="276999"/>
+          </a:xfrm>
+          <a:prstGeom prst="rect">
+            <a:avLst/>
+          </a:prstGeom>
+          <a:noFill/>
+        </p:spPr>
+        <p:txBody>
+          <a:bodyPr wrap="square" lIns="0" tIns="0" rIns="0" bIns="0" rtlCol="0" anchor="ctr" anchorCtr="0">
+            <a:spAutoFit/>
+          </a:bodyPr>
+          <a:lstStyle/>
+          <a:p>
+            <a:r>
+              <a:rPr lang="de-DE" dirty="0" smtClean="0">
+                <a:solidFill>
+                  <a:schemeClr val="bg2"/>
+                </a:solidFill>
+              </a:rPr>
+              <a:t>Atom und </a:t>
+            </a:r>
+            <a:r>
+              <a:rPr lang="de-DE" dirty="0" err="1" smtClean="0">
+                <a:solidFill>
+                  <a:schemeClr val="bg2"/>
+                </a:solidFill>
+              </a:rPr>
+              <a:t>Arduino</a:t>
+            </a:r>
+            <a:r>
+              <a:rPr lang="de-DE" dirty="0" smtClean="0">
+                <a:solidFill>
+                  <a:schemeClr val="bg2"/>
+                </a:solidFill>
+              </a:rPr>
+              <a:t>-IDE; </a:t>
+            </a:r>
+            <a:r>
+              <a:rPr lang="de-DE" dirty="0">
+                <a:solidFill>
+                  <a:schemeClr val="bg2"/>
+                </a:solidFill>
+              </a:rPr>
+              <a:t>C, C</a:t>
+            </a:r>
+            <a:r>
+              <a:rPr lang="de-DE" dirty="0" smtClean="0">
+                <a:solidFill>
+                  <a:schemeClr val="bg2"/>
+                </a:solidFill>
+              </a:rPr>
+              <a:t>++, </a:t>
+            </a:r>
+            <a:r>
+              <a:rPr lang="de-DE" dirty="0" err="1" smtClean="0">
+                <a:solidFill>
+                  <a:schemeClr val="bg2"/>
+                </a:solidFill>
+              </a:rPr>
+              <a:t>NodeJS</a:t>
+            </a:r>
+            <a:r>
+              <a:rPr lang="de-DE" dirty="0" smtClean="0">
+                <a:solidFill>
+                  <a:schemeClr val="bg2"/>
+                </a:solidFill>
+              </a:rPr>
+              <a:t>, TS; Diverse Hardware</a:t>
+            </a:r>
+            <a:endParaRPr lang="de-DE" b="1" dirty="0" smtClean="0">
+              <a:solidFill>
+                <a:schemeClr val="bg2"/>
+              </a:solidFill>
+            </a:endParaRPr>
+          </a:p>
+        </p:txBody>
+      </p:sp>
+    </p:spTree>
+    <p:extLst>
+      <p:ext uri="{BB962C8B-B14F-4D97-AF65-F5344CB8AC3E}">
+        <p14:creationId xmlns:p14="http://schemas.microsoft.com/office/powerpoint/2010/main" val="3325320967"/>
+      </p:ext>
+    </p:extLst>
+  </p:cSld>
+  <p:clrMapOvr>
+    <a:masterClrMapping/>
+  </p:clrMapOvr>
+  <p:timing>
+    <p:tnLst>
+      <p:par>
+        <p:cTn id="1" dur="indefinite" restart="never" nodeType="tmRoot"/>
+      </p:par>
+    </p:tnLst>
+  </p:timing>
+</p:sld>
+</file>
+
+<file path=ppt/slides/slide8.xml><?xml version="1.0" encoding="utf-8"?>
+<p:sld xmlns:a="http://schemas.openxmlformats.org/drawingml/2006/main" xmlns:r="http://schemas.openxmlformats.org/officeDocument/2006/relationships" xmlns:p="http://schemas.openxmlformats.org/presentationml/2006/main">
+  <p:cSld>
+    <p:spTree>
+      <p:nvGrpSpPr>
+        <p:cNvPr id="1" name=""/>
+        <p:cNvGrpSpPr/>
+        <p:nvPr/>
+      </p:nvGrpSpPr>
+      <p:grpSpPr>
+        <a:xfrm>
+          <a:off x="0" y="0"/>
+          <a:ext cx="0" cy="0"/>
+          <a:chOff x="0" y="0"/>
+          <a:chExt cx="0" cy="0"/>
+        </a:xfrm>
+      </p:grpSpPr>
+      <p:sp>
+        <p:nvSpPr>
+          <p:cNvPr id="2" name="Titel 1"/>
+          <p:cNvSpPr>
+            <a:spLocks noGrp="1"/>
+          </p:cNvSpPr>
+          <p:nvPr>
+            <p:ph type="title"/>
+          </p:nvPr>
+        </p:nvSpPr>
+        <p:spPr/>
+        <p:txBody>
+          <a:bodyPr/>
+          <a:lstStyle/>
+          <a:p>
+            <a:r>
+              <a:rPr lang="de-DE" dirty="0" smtClean="0"/>
+              <a:t>Eine Architektur II </a:t>
+            </a:r>
+            <a:r>
+              <a:rPr lang="de-DE" sz="1600" dirty="0" smtClean="0"/>
+              <a:t>… Der Netzwerkbauplan </a:t>
             </a:r>
             <a:endParaRPr lang="de-DE" dirty="0"/>
           </a:p>
@@ -8365,7 +9013,7 @@
           <a:p>
             <a:fld id="{48352B5A-167D-4ED6-B7C9-BDA647A8BA51}" type="datetime1">
               <a:rPr lang="de-DE" smtClean="0"/>
-              <a:t>21.11.2016</a:t>
+              <a:t>28.11.2016</a:t>
             </a:fld>
             <a:endParaRPr lang="de-DE"/>
           </a:p>
@@ -8451,7 +9099,7 @@
           <a:p>
             <a:fld id="{E07F1749-2C29-4AD9-BF92-E70F8884412B}" type="slidenum">
               <a:rPr lang="de-DE" smtClean="0"/>
-              <a:t>7</a:t>
+              <a:t>8</a:t>
             </a:fld>
             <a:endParaRPr lang="de-DE"/>
           </a:p>
@@ -8857,254 +9505,6 @@
 </p:sld>
 </file>
 
-<file path=ppt/slides/slide8.xml><?xml version="1.0" encoding="utf-8"?>
-<p:sld xmlns:a="http://schemas.openxmlformats.org/drawingml/2006/main" xmlns:r="http://schemas.openxmlformats.org/officeDocument/2006/relationships" xmlns:p="http://schemas.openxmlformats.org/presentationml/2006/main">
-  <p:cSld>
-    <p:spTree>
-      <p:nvGrpSpPr>
-        <p:cNvPr id="1" name=""/>
-        <p:cNvGrpSpPr/>
-        <p:nvPr/>
-      </p:nvGrpSpPr>
-      <p:grpSpPr>
-        <a:xfrm>
-          <a:off x="0" y="0"/>
-          <a:ext cx="0" cy="0"/>
-          <a:chOff x="0" y="0"/>
-          <a:chExt cx="0" cy="0"/>
-        </a:xfrm>
-      </p:grpSpPr>
-      <p:sp>
-        <p:nvSpPr>
-          <p:cNvPr id="2" name="Titel 1"/>
-          <p:cNvSpPr>
-            <a:spLocks noGrp="1"/>
-          </p:cNvSpPr>
-          <p:nvPr>
-            <p:ph type="title"/>
-          </p:nvPr>
-        </p:nvSpPr>
-        <p:spPr/>
-        <p:txBody>
-          <a:bodyPr/>
-          <a:lstStyle/>
-          <a:p>
-            <a:r>
-              <a:rPr lang="de-DE" dirty="0" smtClean="0"/>
-              <a:t>Das Szenario</a:t>
-            </a:r>
-            <a:endParaRPr lang="de-DE" dirty="0"/>
-          </a:p>
-        </p:txBody>
-      </p:sp>
-      <p:sp>
-        <p:nvSpPr>
-          <p:cNvPr id="3" name="Datumsplatzhalter 2"/>
-          <p:cNvSpPr>
-            <a:spLocks noGrp="1"/>
-          </p:cNvSpPr>
-          <p:nvPr>
-            <p:ph type="dt" sz="half" idx="10"/>
-          </p:nvPr>
-        </p:nvSpPr>
-        <p:spPr/>
-        <p:txBody>
-          <a:bodyPr/>
-          <a:lstStyle/>
-          <a:p>
-            <a:fld id="{48352B5A-167D-4ED6-B7C9-BDA647A8BA51}" type="datetime1">
-              <a:rPr lang="de-DE" smtClean="0"/>
-              <a:t>21.11.2016</a:t>
-            </a:fld>
-            <a:endParaRPr lang="de-DE"/>
-          </a:p>
-        </p:txBody>
-      </p:sp>
-      <p:sp>
-        <p:nvSpPr>
-          <p:cNvPr id="4" name="Fußzeilenplatzhalter 3"/>
-          <p:cNvSpPr>
-            <a:spLocks noGrp="1"/>
-          </p:cNvSpPr>
-          <p:nvPr>
-            <p:ph type="ftr" sz="quarter" idx="11"/>
-          </p:nvPr>
-        </p:nvSpPr>
-        <p:spPr/>
-        <p:txBody>
-          <a:bodyPr/>
-          <a:lstStyle/>
-          <a:p>
-            <a:endParaRPr lang="de-DE" dirty="0"/>
-          </a:p>
-        </p:txBody>
-      </p:sp>
-      <p:sp>
-        <p:nvSpPr>
-          <p:cNvPr id="5" name="Foliennummernplatzhalter 4"/>
-          <p:cNvSpPr>
-            <a:spLocks noGrp="1"/>
-          </p:cNvSpPr>
-          <p:nvPr>
-            <p:ph type="sldNum" sz="quarter" idx="12"/>
-          </p:nvPr>
-        </p:nvSpPr>
-        <p:spPr/>
-        <p:txBody>
-          <a:bodyPr/>
-          <a:lstStyle/>
-          <a:p>
-            <a:fld id="{E07F1749-2C29-4AD9-BF92-E70F8884412B}" type="slidenum">
-              <a:rPr lang="de-DE" smtClean="0"/>
-              <a:t>8</a:t>
-            </a:fld>
-            <a:endParaRPr lang="de-DE"/>
-          </a:p>
-        </p:txBody>
-      </p:sp>
-      <p:sp>
-        <p:nvSpPr>
-          <p:cNvPr id="6" name="Inhaltsplatzhalter 5"/>
-          <p:cNvSpPr>
-            <a:spLocks noGrp="1"/>
-          </p:cNvSpPr>
-          <p:nvPr>
-            <p:ph sz="quarter" idx="13"/>
-          </p:nvPr>
-        </p:nvSpPr>
-        <p:spPr/>
-        <p:txBody>
-          <a:bodyPr/>
-          <a:lstStyle/>
-          <a:p>
-            <a:r>
-              <a:rPr lang="de-DE" dirty="0" smtClean="0"/>
-              <a:t>Der Farbwürfel</a:t>
-            </a:r>
-          </a:p>
-          <a:p>
-            <a:r>
-              <a:rPr lang="de-DE" dirty="0"/>
-              <a:t>	</a:t>
-            </a:r>
-            <a:r>
-              <a:rPr lang="de-DE" b="0" dirty="0" smtClean="0"/>
-              <a:t>Dient der Zustandsanzeige, durch RGB-</a:t>
-            </a:r>
-            <a:r>
-              <a:rPr lang="de-DE" b="0" dirty="0" err="1" smtClean="0"/>
-              <a:t>LEDs</a:t>
-            </a:r>
-            <a:r>
-              <a:rPr lang="de-DE" dirty="0" err="1" smtClean="0"/>
-              <a:t>Das</a:t>
-            </a:r>
-            <a:r>
-              <a:rPr lang="de-DE" dirty="0" smtClean="0"/>
-              <a:t> Thermometer</a:t>
-            </a:r>
-          </a:p>
-          <a:p>
-            <a:r>
-              <a:rPr lang="de-DE" dirty="0"/>
-              <a:t>	</a:t>
-            </a:r>
-            <a:r>
-              <a:rPr lang="de-DE" b="0" dirty="0" smtClean="0"/>
-              <a:t>Misst Temperatur, Luftfeuchtigkeit und Helligkeit</a:t>
-            </a:r>
-          </a:p>
-          <a:p>
-            <a:r>
-              <a:rPr lang="de-DE" dirty="0" smtClean="0"/>
-              <a:t>Das LED-Display</a:t>
-            </a:r>
-          </a:p>
-          <a:p>
-            <a:r>
-              <a:rPr lang="de-DE" b="0" dirty="0"/>
-              <a:t>	</a:t>
-            </a:r>
-            <a:r>
-              <a:rPr lang="de-DE" b="0" dirty="0" smtClean="0"/>
-              <a:t>Zeigt Texte und Symbole an…</a:t>
-            </a:r>
-            <a:endParaRPr lang="de-DE" b="0" dirty="0"/>
-          </a:p>
-          <a:p>
-            <a:r>
-              <a:rPr lang="de-DE" dirty="0"/>
-              <a:t>Der </a:t>
-            </a:r>
-            <a:r>
-              <a:rPr lang="de-DE" dirty="0" smtClean="0"/>
-              <a:t>Briefkasten</a:t>
-            </a:r>
-          </a:p>
-          <a:p>
-            <a:r>
-              <a:rPr lang="de-DE" dirty="0"/>
-              <a:t>	</a:t>
-            </a:r>
-            <a:r>
-              <a:rPr lang="de-DE" b="0" dirty="0" smtClean="0"/>
-              <a:t>Dient der Beantwortung eurer Fragen</a:t>
-            </a:r>
-          </a:p>
-          <a:p>
-            <a:r>
-              <a:rPr lang="de-DE" b="0" dirty="0"/>
-              <a:t>	</a:t>
-            </a:r>
-            <a:r>
-              <a:rPr lang="de-DE" b="0" dirty="0" smtClean="0"/>
-              <a:t>	</a:t>
-            </a:r>
-            <a:r>
-              <a:rPr lang="de-DE" b="0" dirty="0" smtClean="0">
-                <a:hlinkClick r:id="rId3"/>
-              </a:rPr>
-              <a:t>http://dashboard/Fragen</a:t>
-            </a:r>
-            <a:endParaRPr lang="de-DE" b="0" dirty="0" smtClean="0"/>
-          </a:p>
-          <a:p>
-            <a:endParaRPr lang="de-DE" b="0" dirty="0"/>
-          </a:p>
-          <a:p>
-            <a:r>
-              <a:rPr lang="de-DE" dirty="0"/>
-              <a:t>	</a:t>
-            </a:r>
-          </a:p>
-          <a:p>
-            <a:endParaRPr lang="de-DE" dirty="0" smtClean="0"/>
-          </a:p>
-          <a:p>
-            <a:endParaRPr lang="de-DE" dirty="0"/>
-          </a:p>
-        </p:txBody>
-      </p:sp>
-    </p:spTree>
-    <p:extLst>
-      <p:ext uri="{BB962C8B-B14F-4D97-AF65-F5344CB8AC3E}">
-        <p14:creationId xmlns:p14="http://schemas.microsoft.com/office/powerpoint/2010/main" val="4083865870"/>
-      </p:ext>
-    </p:extLst>
-  </p:cSld>
-  <p:clrMapOvr>
-    <a:masterClrMapping/>
-  </p:clrMapOvr>
-  <p:timing>
-    <p:tnLst>
-      <p:par>
-        <p:cTn id="1" dur="indefinite" restart="never" nodeType="tmRoot"/>
-      </p:par>
-    </p:tnLst>
-  </p:timing>
-</p:sld>
-</file>
-
 <file path=ppt/slides/slide9.xml><?xml version="1.0" encoding="utf-8"?>
 <p:sld xmlns:a="http://schemas.openxmlformats.org/drawingml/2006/main" xmlns:r="http://schemas.openxmlformats.org/officeDocument/2006/relationships" xmlns:p="http://schemas.openxmlformats.org/presentationml/2006/main">
   <p:cSld>
@@ -9139,9 +9539,25 @@
           <a:p>
             <a:r>
               <a:rPr lang="de-DE" dirty="0" smtClean="0"/>
-              <a:t>LIVE DEMO RUNNING…</a:t>
-            </a:r>
-            <a:endParaRPr lang="de-DE" dirty="0"/>
+              <a:t>Der Aufbau </a:t>
+            </a:r>
+            <a:r>
+              <a:rPr lang="de-DE" sz="1600" b="1" dirty="0" smtClean="0"/>
+              <a:t>… Vorsicht, </a:t>
+            </a:r>
+            <a:r>
+              <a:rPr lang="de-DE" sz="1600" b="1" dirty="0" smtClean="0">
+                <a:solidFill>
+                  <a:schemeClr val="accent2"/>
+                </a:solidFill>
+              </a:rPr>
+              <a:t>Realitätsgefahr</a:t>
+            </a:r>
+            <a:endParaRPr lang="de-DE" b="1" dirty="0">
+              <a:solidFill>
+                <a:schemeClr val="accent2"/>
+              </a:solidFill>
+            </a:endParaRPr>
           </a:p>
         </p:txBody>
       </p:sp>
@@ -9162,7 +9578,7 @@
           <a:p>
             <a:fld id="{48352B5A-167D-4ED6-B7C9-BDA647A8BA51}" type="datetime1">
               <a:rPr lang="de-DE" smtClean="0"/>
-              <a:t>21.11.2016</a:t>
+              <a:t>28.11.2016</a:t>
             </a:fld>
             <a:endParaRPr lang="de-DE"/>
           </a:p>
@@ -9183,18 +9599,6 @@
           <a:bodyPr/>
           <a:lstStyle/>
           <a:p>
-            <a:r>
-              <a:rPr lang="de-DE" dirty="0" smtClean="0"/>
-              <a:t>Verrückte </a:t>
-            </a:r>
-            <a:r>
-              <a:rPr lang="de-DE" dirty="0" err="1" smtClean="0"/>
-              <a:t>IoT</a:t>
-            </a:r>
-            <a:r>
-              <a:rPr lang="de-DE" dirty="0" smtClean="0"/>
-              <a:t>-Live-Demo mit Torben und Jan</a:t>
-            </a:r>
             <a:endParaRPr lang="de-DE" dirty="0"/>
           </a:p>
         </p:txBody>
@@ -9239,48 +9643,116 @@
           <a:p>
             <a:r>
               <a:rPr lang="de-DE" dirty="0" smtClean="0"/>
-              <a:t>SSID:			summit16IOT</a:t>
-            </a:r>
-          </a:p>
-          <a:p>
-            <a:endParaRPr lang="de-DE" dirty="0"/>
-          </a:p>
-          <a:p>
+              <a:t>Der Farbwürfel</a:t>
+            </a:r>
+          </a:p>
+          <a:p>
+            <a:r>
+              <a:rPr lang="de-DE" dirty="0"/>
+              <a:t>	</a:t>
+            </a:r>
+            <a:r>
+              <a:rPr lang="de-DE" b="0" dirty="0" smtClean="0"/>
+              <a:t>Dient der Zustandsanzeige, durch RGB-</a:t>
+            </a:r>
+            <a:r>
+              <a:rPr lang="de-DE" b="0" dirty="0" err="1" smtClean="0"/>
+              <a:t>LEDs</a:t>
+            </a:r>
+            <a:r>
+              <a:rPr lang="de-DE" dirty="0" err="1" smtClean="0"/>
+              <a:t>Das</a:t>
+            </a:r>
             <a:r>
               <a:rPr lang="de-DE" dirty="0" smtClean="0"/>
-              <a:t>PASSWORT:		</a:t>
-            </a:r>
-            <a:r>
-              <a:rPr lang="de-DE" dirty="0" err="1" smtClean="0"/>
-              <a:t>iotdemowlan</a:t>
-            </a:r>
-            <a:endParaRPr lang="de-DE" dirty="0" smtClean="0"/>
-          </a:p>
-          <a:p>
-            <a:endParaRPr lang="de-DE" dirty="0"/>
+              <a:t> Thermometer</a:t>
+            </a:r>
+          </a:p>
+          <a:p>
+            <a:r>
+              <a:rPr lang="de-DE" dirty="0"/>
+              <a:t>	</a:t>
+            </a:r>
+            <a:r>
+              <a:rPr lang="de-DE" b="0" dirty="0" smtClean="0"/>
+              <a:t>Misst Temperatur, Luftfeuchtigkeit und Helligkeit</a:t>
+            </a:r>
           </a:p>
           <a:p>
             <a:r>
               <a:rPr lang="de-DE" dirty="0" smtClean="0"/>
-              <a:t>Fragen unter: 	</a:t>
-            </a:r>
-            <a:r>
-              <a:rPr lang="de-DE" dirty="0" smtClean="0">
+              <a:t>Das LED-Display</a:t>
+            </a:r>
+          </a:p>
+          <a:p>
+            <a:r>
+              <a:rPr lang="de-DE" b="0" dirty="0"/>
+              <a:t>	</a:t>
+            </a:r>
+            <a:r>
+              <a:rPr lang="de-DE" b="0" dirty="0" smtClean="0"/>
+              <a:t>Zeigt Texte und Symbole an…</a:t>
+            </a:r>
+            <a:endParaRPr lang="de-DE" b="0" dirty="0"/>
+          </a:p>
+          <a:p>
+            <a:r>
+              <a:rPr lang="de-DE" dirty="0"/>
+              <a:t>Der </a:t>
+            </a:r>
+            <a:r>
+              <a:rPr lang="de-DE" dirty="0" smtClean="0"/>
+              <a:t>Briefkasten</a:t>
+            </a:r>
+          </a:p>
+          <a:p>
+            <a:r>
+              <a:rPr lang="de-DE" dirty="0"/>
+              <a:t>	</a:t>
+            </a:r>
+            <a:r>
+              <a:rPr lang="de-DE" b="0" dirty="0" smtClean="0"/>
+              <a:t>Dient der Beantwortung eurer Fragen</a:t>
+            </a:r>
+          </a:p>
+          <a:p>
+            <a:r>
+              <a:rPr lang="de-DE" b="0" dirty="0"/>
+              <a:t>	</a:t>
+            </a:r>
+            <a:r>
+              <a:rPr lang="de-DE" b="0" dirty="0" smtClean="0"/>
+              <a:t>	</a:t>
+            </a:r>
+            <a:r>
+              <a:rPr lang="de-DE" b="0" dirty="0" smtClean="0">
                 <a:hlinkClick r:id="rId3"/>
               </a:rPr>
-              <a:t>http://dashboard/fragen</a:t>
-            </a:r>
+              <a:t>http://dashboard/Fragen</a:t>
+            </a:r>
+            <a:endParaRPr lang="de-DE" b="0" dirty="0" smtClean="0"/>
+          </a:p>
+          <a:p>
+            <a:endParaRPr lang="de-DE" b="0" dirty="0"/>
+          </a:p>
+          <a:p>
+            <a:r>
+              <a:rPr lang="de-DE" dirty="0"/>
+              <a:t>	</a:t>
+            </a:r>
+          </a:p>
+          <a:p>
             <a:endParaRPr lang="de-DE" dirty="0" smtClean="0"/>
           </a:p>
           <a:p>
-            <a:endParaRPr lang="de-DE" dirty="0" smtClean="0"/>
+            <a:endParaRPr lang="de-DE" dirty="0"/>
           </a:p>
         </p:txBody>
       </p:sp>
     </p:spTree>
     <p:extLst>
       <p:ext uri="{BB962C8B-B14F-4D97-AF65-F5344CB8AC3E}">
-        <p14:creationId xmlns:p14="http://schemas.microsoft.com/office/powerpoint/2010/main" val="1998764375"/>
+        <p14:creationId xmlns:p14="http://schemas.microsoft.com/office/powerpoint/2010/main" val="4083865870"/>
       </p:ext>
     </p:extLst>
   </p:cSld>
@@ -9560,7 +10032,7 @@
   <a:extraClrSchemeLst/>
   <a:extLst>
     <a:ext uri="{05A4C25C-085E-4340-85A3-A5531E510DB2}">
-      <thm15:themeFamily xmlns="" xmlns:thm15="http://schemas.microsoft.com/office/thememl/2012/main" name="adesso_Template_16zu9 [Schreibgeschützt]" id="{12D9A243-BF21-4950-AE3A-4348F013E656}" vid="{BEC210B0-57DE-4DE3-9ECB-A845601F9CB1}"/>
+      <thm15:themeFamily xmlns:thm15="http://schemas.microsoft.com/office/thememl/2012/main" xmlns="" name="adesso_Template_16zu9 [Schreibgeschützt]" id="{12D9A243-BF21-4950-AE3A-4348F013E656}" vid="{BEC210B0-57DE-4DE3-9ECB-A845601F9CB1}"/>
     </a:ext>
   </a:extLst>
 </a:theme>
@@ -9792,24 +10264,6 @@
 </file>
 
 <file path=customXml/item1.xml><?xml version="1.0" encoding="utf-8"?>
-<?mso-contentType ?>
-<FormTemplates xmlns="http://schemas.microsoft.com/sharepoint/v3/contenttype/forms">
-  <Display>DocumentLibraryForm</Display>
-  <Edit>DocumentLibraryForm</Edit>
-  <New>DocumentLibraryForm</New>
-</FormTemplates>
-</file>
-
-<file path=customXml/item2.xml><?xml version="1.0" encoding="utf-8"?>
-<p:properties xmlns:p="http://schemas.microsoft.com/office/2006/metadata/properties" xmlns:xsi="http://www.w3.org/2001/XMLSchema-instance" xmlns:pc="http://schemas.microsoft.com/office/infopath/2007/PartnerControls">
-  <documentManagement>
-    <PublishingExpirationDate xmlns="http://schemas.microsoft.com/sharepoint/v3" xsi:nil="true"/>
-    <PublishingStartDate xmlns="http://schemas.microsoft.com/sharepoint/v3" xsi:nil="true"/>
-  </documentManagement>
-</p:properties>
-</file>
-
-<file path=customXml/item3.xml><?xml version="1.0" encoding="utf-8"?>
 <ct:contentTypeSchema xmlns:ct="http://schemas.microsoft.com/office/2006/metadata/contentType" xmlns:ma="http://schemas.microsoft.com/office/2006/metadata/properties/metaAttributes" ct:_="" ma:_="" ma:contentTypeName="Dokument" ma:contentTypeID="0x0101003969FAE1D870D24AB1F685203B54C731" ma:contentTypeVersion="1" ma:contentTypeDescription="Ein neues Dokument erstellen." ma:contentTypeScope="" ma:versionID="49e8420ccc884b71a44dddead001aef3">
   <xsd:schema xmlns:xsd="http://www.w3.org/2001/XMLSchema" xmlns:xs="http://www.w3.org/2001/XMLSchema" xmlns:p="http://schemas.microsoft.com/office/2006/metadata/properties" xmlns:ns1="http://schemas.microsoft.com/sharepoint/v3" targetNamespace="http://schemas.microsoft.com/office/2006/metadata/properties" ma:root="true" ma:fieldsID="527feafd7c2aaee042aea6d2d3f7a934" ns1:_="">
     <xsd:import namespace="http://schemas.microsoft.com/sharepoint/v3"/>
@@ -9941,10 +10395,38 @@
 </ct:contentTypeSchema>
 </file>
 
+<file path=customXml/item2.xml><?xml version="1.0" encoding="utf-8"?>
+<p:properties xmlns:p="http://schemas.microsoft.com/office/2006/metadata/properties" xmlns:xsi="http://www.w3.org/2001/XMLSchema-instance" xmlns:pc="http://schemas.microsoft.com/office/infopath/2007/PartnerControls">
+  <documentManagement>
+    <PublishingExpirationDate xmlns="http://schemas.microsoft.com/sharepoint/v3" xsi:nil="true"/>
+    <PublishingStartDate xmlns="http://schemas.microsoft.com/sharepoint/v3" xsi:nil="true"/>
+  </documentManagement>
+</p:properties>
+</file>
+
+<file path=customXml/item3.xml><?xml version="1.0" encoding="utf-8"?>
+<?mso-contentType ?>
+<FormTemplates xmlns="http://schemas.microsoft.com/sharepoint/v3/contenttype/forms">
+  <Display>DocumentLibraryForm</Display>
+  <Edit>DocumentLibraryForm</Edit>
+  <New>DocumentLibraryForm</New>
+</FormTemplates>
+</file>
+
 <file path=customXml/itemProps1.xml><?xml version="1.0" encoding="utf-8"?>
-<ds:datastoreItem xmlns:ds="http://schemas.openxmlformats.org/officeDocument/2006/customXml" ds:itemID="{401277ED-440A-42EF-9B7C-98840B8D0F73}">
+<ds:datastoreItem xmlns:ds="http://schemas.openxmlformats.org/officeDocument/2006/customXml" ds:itemID="{C72414D1-9F4A-4B22-ABCE-3D6ECA0CBCE9}">
   <ds:schemaRefs>
-    <ds:schemaRef ds:uri="http://schemas.microsoft.com/sharepoint/v3/contenttype/forms"/>
+    <ds:schemaRef ds:uri="http://schemas.microsoft.com/office/2006/metadata/contentType"/>
+    <ds:schemaRef ds:uri="http://schemas.microsoft.com/office/2006/metadata/properties/metaAttributes"/>
+    <ds:schemaRef ds:uri="http://www.w3.org/2001/XMLSchema"/>
+    <ds:schemaRef ds:uri="http://schemas.microsoft.com/office/2006/metadata/properties"/>
+    <ds:schemaRef ds:uri="http://schemas.microsoft.com/sharepoint/v3"/>
+    <ds:schemaRef ds:uri="http://schemas.microsoft.com/office/2006/documentManagement/types"/>
+    <ds:schemaRef ds:uri="http://schemas.microsoft.com/office/infopath/2007/PartnerControls"/>
+    <ds:schemaRef ds:uri="http://schemas.openxmlformats.org/package/2006/metadata/core-properties"/>
+    <ds:schemaRef ds:uri="http://purl.org/dc/elements/1.1/"/>
+    <ds:schemaRef ds:uri="http://purl.org/dc/terms/"/>
+    <ds:schemaRef ds:uri="http://schemas.microsoft.com/internal/obd"/>
   </ds:schemaRefs>
 </ds:datastoreItem>
 </file>
@@ -9966,19 +10448,9 @@
 </file>
 
 <file path=customXml/itemProps3.xml><?xml version="1.0" encoding="utf-8"?>
-<ds:datastoreItem xmlns:ds="http://schemas.openxmlformats.org/officeDocument/2006/customXml" ds:itemID="{C72414D1-9F4A-4B22-ABCE-3D6ECA0CBCE9}">
+<ds:datastoreItem xmlns:ds="http://schemas.openxmlformats.org/officeDocument/2006/customXml" ds:itemID="{401277ED-440A-42EF-9B7C-98840B8D0F73}">
   <ds:schemaRefs>
-    <ds:schemaRef ds:uri="http://schemas.microsoft.com/office/2006/metadata/contentType"/>
-    <ds:schemaRef ds:uri="http://schemas.microsoft.com/office/2006/metadata/properties/metaAttributes"/>
-    <ds:schemaRef ds:uri="http://www.w3.org/2001/XMLSchema"/>
-    <ds:schemaRef ds:uri="http://schemas.microsoft.com/office/2006/metadata/properties"/>
-    <ds:schemaRef ds:uri="http://schemas.microsoft.com/sharepoint/v3"/>
-    <ds:schemaRef ds:uri="http://schemas.microsoft.com/office/2006/documentManagement/types"/>
-    <ds:schemaRef ds:uri="http://schemas.microsoft.com/office/infopath/2007/PartnerControls"/>
-    <ds:schemaRef ds:uri="http://schemas.openxmlformats.org/package/2006/metadata/core-properties"/>
-    <ds:schemaRef ds:uri="http://purl.org/dc/elements/1.1/"/>
-    <ds:schemaRef ds:uri="http://purl.org/dc/terms/"/>
-    <ds:schemaRef ds:uri="http://schemas.microsoft.com/internal/obd"/>
+    <ds:schemaRef ds:uri="http://schemas.microsoft.com/sharepoint/v3/contenttype/forms"/>
   </ds:schemaRefs>
 </ds:datastoreItem>
 </file>
</xml_diff>

<commit_message>
Präsi ist nun Interaktiv aus dem Webserver unter /folien zu finden
</commit_message>
<xml_diff>
--- a/doc/adesso_Template_summIT.pptx
+++ b/doc/adesso_Template_summIT.pptx
@@ -644,6 +644,98 @@
 </p:notes>
 </file>
 
+<file path=ppt/notesSlides/notesSlide10.xml><?xml version="1.0" encoding="utf-8"?>
+<p:notes xmlns:a="http://schemas.openxmlformats.org/drawingml/2006/main" xmlns:r="http://schemas.openxmlformats.org/officeDocument/2006/relationships" xmlns:p="http://schemas.openxmlformats.org/presentationml/2006/main">
+  <p:cSld>
+    <p:spTree>
+      <p:nvGrpSpPr>
+        <p:cNvPr id="1" name=""/>
+        <p:cNvGrpSpPr/>
+        <p:nvPr/>
+      </p:nvGrpSpPr>
+      <p:grpSpPr>
+        <a:xfrm>
+          <a:off x="0" y="0"/>
+          <a:ext cx="0" cy="0"/>
+          <a:chOff x="0" y="0"/>
+          <a:chExt cx="0" cy="0"/>
+        </a:xfrm>
+      </p:grpSpPr>
+      <p:sp>
+        <p:nvSpPr>
+          <p:cNvPr id="2" name="Folienbildplatzhalter 1"/>
+          <p:cNvSpPr>
+            <a:spLocks noGrp="1" noRot="1" noChangeAspect="1"/>
+          </p:cNvSpPr>
+          <p:nvPr>
+            <p:ph type="sldImg"/>
+          </p:nvPr>
+        </p:nvSpPr>
+        <p:spPr/>
+      </p:sp>
+      <p:sp>
+        <p:nvSpPr>
+          <p:cNvPr id="3" name="Notizenplatzhalter 2"/>
+          <p:cNvSpPr>
+            <a:spLocks noGrp="1"/>
+          </p:cNvSpPr>
+          <p:nvPr>
+            <p:ph type="body" idx="1"/>
+          </p:nvPr>
+        </p:nvSpPr>
+        <p:spPr/>
+        <p:txBody>
+          <a:bodyPr/>
+          <a:lstStyle/>
+          <a:p>
+            <a:r>
+              <a:rPr lang="de-DE" dirty="0" smtClean="0"/>
+              <a:t>Q &amp; A,</a:t>
+            </a:r>
+            <a:r>
+              <a:rPr lang="de-DE" baseline="0" dirty="0" smtClean="0"/>
+              <a:t> Dank etc.</a:t>
+            </a:r>
+            <a:endParaRPr lang="de-DE" dirty="0"/>
+          </a:p>
+        </p:txBody>
+      </p:sp>
+      <p:sp>
+        <p:nvSpPr>
+          <p:cNvPr id="4" name="Foliennummernplatzhalter 3"/>
+          <p:cNvSpPr>
+            <a:spLocks noGrp="1"/>
+          </p:cNvSpPr>
+          <p:nvPr>
+            <p:ph type="sldNum" sz="quarter" idx="10"/>
+          </p:nvPr>
+        </p:nvSpPr>
+        <p:spPr/>
+        <p:txBody>
+          <a:bodyPr/>
+          <a:lstStyle/>
+          <a:p>
+            <a:fld id="{112C3873-BA08-40A5-BDCC-B6406E6CD40B}" type="slidenum">
+              <a:rPr lang="de-DE" smtClean="0"/>
+              <a:t>13</a:t>
+            </a:fld>
+            <a:endParaRPr lang="de-DE"/>
+          </a:p>
+        </p:txBody>
+      </p:sp>
+    </p:spTree>
+    <p:extLst>
+      <p:ext uri="{BB962C8B-B14F-4D97-AF65-F5344CB8AC3E}">
+        <p14:creationId xmlns:p14="http://schemas.microsoft.com/office/powerpoint/2010/main" val="1844765492"/>
+      </p:ext>
+    </p:extLst>
+  </p:cSld>
+  <p:clrMapOvr>
+    <a:masterClrMapping/>
+  </p:clrMapOvr>
+</p:notes>
+</file>
+
 <file path=ppt/notesSlides/notesSlide2.xml><?xml version="1.0" encoding="utf-8"?>
 <p:notes xmlns:a="http://schemas.openxmlformats.org/drawingml/2006/main" xmlns:r="http://schemas.openxmlformats.org/officeDocument/2006/relationships" xmlns:p="http://schemas.openxmlformats.org/presentationml/2006/main">
   <p:cSld>
@@ -1244,6 +1336,14 @@
           <a:bodyPr/>
           <a:lstStyle/>
           <a:p>
+            <a:r>
+              <a:rPr lang="de-DE" dirty="0" smtClean="0"/>
+              <a:t>Und das ist Jetzt</a:t>
+            </a:r>
+            <a:r>
+              <a:rPr lang="de-DE" baseline="0" dirty="0" smtClean="0"/>
+              <a:t> wichtig, ab hier sollte man nicht allergisch auf Hardware reagieren…</a:t>
+            </a:r>
             <a:endParaRPr lang="de-DE" dirty="0"/>
           </a:p>
         </p:txBody>
@@ -1363,6 +1463,90 @@
     <p:extLst>
       <p:ext uri="{BB962C8B-B14F-4D97-AF65-F5344CB8AC3E}">
         <p14:creationId xmlns:p14="http://schemas.microsoft.com/office/powerpoint/2010/main" val="2844586462"/>
+      </p:ext>
+    </p:extLst>
+  </p:cSld>
+  <p:clrMapOvr>
+    <a:masterClrMapping/>
+  </p:clrMapOvr>
+</p:notes>
+</file>
+
+<file path=ppt/notesSlides/notesSlide9.xml><?xml version="1.0" encoding="utf-8"?>
+<p:notes xmlns:a="http://schemas.openxmlformats.org/drawingml/2006/main" xmlns:r="http://schemas.openxmlformats.org/officeDocument/2006/relationships" xmlns:p="http://schemas.openxmlformats.org/presentationml/2006/main">
+  <p:cSld>
+    <p:spTree>
+      <p:nvGrpSpPr>
+        <p:cNvPr id="1" name=""/>
+        <p:cNvGrpSpPr/>
+        <p:nvPr/>
+      </p:nvGrpSpPr>
+      <p:grpSpPr>
+        <a:xfrm>
+          <a:off x="0" y="0"/>
+          <a:ext cx="0" cy="0"/>
+          <a:chOff x="0" y="0"/>
+          <a:chExt cx="0" cy="0"/>
+        </a:xfrm>
+      </p:grpSpPr>
+      <p:sp>
+        <p:nvSpPr>
+          <p:cNvPr id="2" name="Folienbildplatzhalter 1"/>
+          <p:cNvSpPr>
+            <a:spLocks noGrp="1" noRot="1" noChangeAspect="1"/>
+          </p:cNvSpPr>
+          <p:nvPr>
+            <p:ph type="sldImg"/>
+          </p:nvPr>
+        </p:nvSpPr>
+        <p:spPr/>
+      </p:sp>
+      <p:sp>
+        <p:nvSpPr>
+          <p:cNvPr id="3" name="Notizenplatzhalter 2"/>
+          <p:cNvSpPr>
+            <a:spLocks noGrp="1"/>
+          </p:cNvSpPr>
+          <p:nvPr>
+            <p:ph type="body" idx="1"/>
+          </p:nvPr>
+        </p:nvSpPr>
+        <p:spPr/>
+        <p:txBody>
+          <a:bodyPr/>
+          <a:lstStyle/>
+          <a:p>
+            <a:endParaRPr lang="de-DE" dirty="0"/>
+          </a:p>
+        </p:txBody>
+      </p:sp>
+      <p:sp>
+        <p:nvSpPr>
+          <p:cNvPr id="4" name="Foliennummernplatzhalter 3"/>
+          <p:cNvSpPr>
+            <a:spLocks noGrp="1"/>
+          </p:cNvSpPr>
+          <p:nvPr>
+            <p:ph type="sldNum" sz="quarter" idx="10"/>
+          </p:nvPr>
+        </p:nvSpPr>
+        <p:spPr/>
+        <p:txBody>
+          <a:bodyPr/>
+          <a:lstStyle/>
+          <a:p>
+            <a:fld id="{112C3873-BA08-40A5-BDCC-B6406E6CD40B}" type="slidenum">
+              <a:rPr lang="de-DE" smtClean="0"/>
+              <a:t>11</a:t>
+            </a:fld>
+            <a:endParaRPr lang="de-DE"/>
+          </a:p>
+        </p:txBody>
+      </p:sp>
+    </p:spTree>
+    <p:extLst>
+      <p:ext uri="{BB962C8B-B14F-4D97-AF65-F5344CB8AC3E}">
+        <p14:creationId xmlns:p14="http://schemas.microsoft.com/office/powerpoint/2010/main" val="2338443756"/>
       </p:ext>
     </p:extLst>
   </p:cSld>
@@ -6148,8 +6332,20 @@
           <a:lstStyle/>
           <a:p>
             <a:r>
+              <a:rPr lang="de-DE" dirty="0" smtClean="0"/>
+              <a:t>Agil von Null Ahnung zu etwas </a:t>
+            </a:r>
+            <a:r>
+              <a:rPr lang="de-DE" dirty="0" err="1" smtClean="0"/>
+              <a:t>IoT</a:t>
+            </a:r>
+            <a:r>
+              <a:rPr lang="de-DE" dirty="0" smtClean="0"/>
+              <a:t> - mit </a:t>
+            </a:r>
+            <a:r>
               <a:rPr lang="de-DE" dirty="0"/>
-              <a:t>mit Jan und Torben</a:t>
+              <a:t>Jan und Torben</a:t>
             </a:r>
           </a:p>
         </p:txBody>
@@ -6506,7 +6702,7 @@
 </file>
 
 <file path=ppt/slides/slide11.xml><?xml version="1.0" encoding="utf-8"?>
-<p:sld xmlns:a="http://schemas.openxmlformats.org/drawingml/2006/main" xmlns:r="http://schemas.openxmlformats.org/officeDocument/2006/relationships" xmlns:p="http://schemas.openxmlformats.org/presentationml/2006/main">
+<p:sld xmlns:a="http://schemas.openxmlformats.org/drawingml/2006/main" xmlns:r="http://schemas.openxmlformats.org/officeDocument/2006/relationships" xmlns:p="http://schemas.openxmlformats.org/presentationml/2006/main" show="0">
   <p:cSld>
     <p:spTree>
       <p:nvGrpSpPr>
@@ -6656,11 +6852,19 @@
   <p:clrMapOvr>
     <a:masterClrMapping/>
   </p:clrMapOvr>
+  <mc:AlternateContent xmlns:mc="http://schemas.openxmlformats.org/markup-compatibility/2006">
+    <mc:Choice xmlns:p14="http://schemas.microsoft.com/office/powerpoint/2010/main" Requires="p14">
+      <p:transition spd="slow" p14:dur="2000"/>
+    </mc:Choice>
+    <mc:Fallback>
+      <p:transition spd="slow"/>
+    </mc:Fallback>
+  </mc:AlternateContent>
 </p:sld>
 </file>
 
 <file path=ppt/slides/slide12.xml><?xml version="1.0" encoding="utf-8"?>
-<p:sld xmlns:a="http://schemas.openxmlformats.org/drawingml/2006/main" xmlns:r="http://schemas.openxmlformats.org/officeDocument/2006/relationships" xmlns:p="http://schemas.openxmlformats.org/presentationml/2006/main">
+<p:sld xmlns:a="http://schemas.openxmlformats.org/drawingml/2006/main" xmlns:r="http://schemas.openxmlformats.org/officeDocument/2006/relationships" xmlns:p="http://schemas.openxmlformats.org/presentationml/2006/main" show="0">
   <p:cSld>
     <p:spTree>
       <p:nvGrpSpPr>
@@ -6806,6 +7010,14 @@
   <p:clrMapOvr>
     <a:masterClrMapping/>
   </p:clrMapOvr>
+  <mc:AlternateContent xmlns:mc="http://schemas.openxmlformats.org/markup-compatibility/2006">
+    <mc:Choice xmlns:p14="http://schemas.microsoft.com/office/powerpoint/2010/main" Requires="p14">
+      <p:transition spd="slow" p14:dur="2000"/>
+    </mc:Choice>
+    <mc:Fallback>
+      <p:transition spd="slow"/>
+    </mc:Fallback>
+  </mc:AlternateContent>
 </p:sld>
 </file>
 
@@ -6900,24 +7112,8 @@
           <a:lstStyle/>
           <a:p>
             <a:r>
-              <a:rPr lang="de-DE" b="1" dirty="0"/>
-              <a:t>Live-Demo </a:t>
-            </a:r>
-            <a:r>
-              <a:rPr lang="de-DE" b="1" dirty="0" err="1"/>
-              <a:t>IoT</a:t>
-            </a:r>
-            <a:r>
-              <a:rPr lang="de-DE" b="1" dirty="0"/>
-              <a:t> (Internet </a:t>
-            </a:r>
-            <a:r>
-              <a:rPr lang="de-DE" b="1" dirty="0" err="1"/>
-              <a:t>of</a:t>
-            </a:r>
-            <a:r>
-              <a:rPr lang="de-DE" b="1" dirty="0"/>
-              <a:t> Things)</a:t>
+              <a:rPr lang="de-DE" b="1" dirty="0" smtClean="0"/>
+              <a:t>Vielen Dank ihr seid ein wundervolles Publikum</a:t>
             </a:r>
             <a:endParaRPr lang="de-DE" dirty="0"/>
           </a:p>
@@ -6957,7 +7153,7 @@
           </p:nvPr>
         </p:nvPicPr>
         <p:blipFill>
-          <a:blip r:embed="rId2" cstate="print">
+          <a:blip r:embed="rId3" cstate="print">
             <a:extLst>
               <a:ext uri="{28A0092B-C50C-407E-A947-70E740481C1C}">
                 <a14:useLocalDpi xmlns:a14="http://schemas.microsoft.com/office/drawing/2010/main" val="0"/>
@@ -7696,7 +7892,19 @@
           <a:p>
             <a:r>
               <a:rPr lang="de-DE" dirty="0" smtClean="0"/>
-              <a:t>Internet der Dinge</a:t>
+              <a:t>Was? </a:t>
+            </a:r>
+            <a:r>
+              <a:rPr lang="de-DE" sz="1600" dirty="0" smtClean="0"/>
+              <a:t>… Internet </a:t>
+            </a:r>
+            <a:r>
+              <a:rPr lang="de-DE" sz="1600" dirty="0" smtClean="0"/>
+              <a:t>der </a:t>
+            </a:r>
+            <a:r>
+              <a:rPr lang="de-DE" sz="1600" dirty="0" smtClean="0"/>
+              <a:t>Dinge ist …</a:t>
             </a:r>
             <a:endParaRPr lang="de-DE" dirty="0"/>
           </a:p>
@@ -8119,7 +8327,7 @@
             </a:r>
             <a:r>
               <a:rPr lang="de-DE" sz="1600" dirty="0" smtClean="0"/>
-              <a:t>…wie </a:t>
+              <a:t>… wie </a:t>
             </a:r>
             <a:r>
               <a:rPr lang="de-DE" sz="1600" dirty="0" smtClean="0"/>
@@ -8355,12 +8563,8 @@
           <a:lstStyle/>
           <a:p>
             <a:r>
-              <a:rPr lang="de-DE" b="1" dirty="0" smtClean="0"/>
-              <a:t>Ein Rezept</a:t>
-            </a:r>
-            <a:r>
               <a:rPr lang="de-DE" dirty="0" smtClean="0"/>
-              <a:t> </a:t>
+              <a:t>Ein Rezept </a:t>
             </a:r>
             <a:r>
               <a:rPr lang="de-DE" sz="1600" dirty="0" smtClean="0"/>
@@ -8710,7 +8914,7 @@
               <a:rPr lang="de-DE" dirty="0" err="1" smtClean="0"/>
               <a:t>Fritz.Box</a:t>
             </a:r>
-            <a:endParaRPr lang="de-DE" b="0" dirty="0"/>
+            <a:endParaRPr lang="de-DE" dirty="0" smtClean="0"/>
           </a:p>
           <a:p>
             <a:pPr>
@@ -8723,16 +8927,8 @@
               <a:t>Raspberry</a:t>
             </a:r>
             <a:r>
-              <a:rPr lang="de-DE" dirty="0"/>
-              <a:t>-</a:t>
-            </a:r>
-            <a:r>
               <a:rPr lang="de-DE" dirty="0" smtClean="0"/>
-              <a:t>PI </a:t>
-            </a:r>
-            <a:r>
-              <a:rPr lang="de-DE" dirty="0" smtClean="0"/>
-              <a:t>2B</a:t>
+              <a:t>-PI 2B</a:t>
             </a:r>
             <a:endParaRPr lang="de-DE" b="0" dirty="0" smtClean="0"/>
           </a:p>
@@ -8746,7 +8942,21 @@
               <a:rPr lang="de-DE" dirty="0" smtClean="0"/>
               <a:t>ESP8266</a:t>
             </a:r>
-            <a:endParaRPr lang="de-DE" b="0" dirty="0" smtClean="0"/>
+          </a:p>
+          <a:p>
+            <a:pPr>
+              <a:lnSpc>
+                <a:spcPct val="200000"/>
+              </a:lnSpc>
+            </a:pPr>
+            <a:r>
+              <a:rPr lang="de-DE" dirty="0" smtClean="0"/>
+              <a:t>Laptops </a:t>
+            </a:r>
+            <a:r>
+              <a:rPr lang="de-DE" b="0" dirty="0" smtClean="0"/>
+              <a:t>etc.</a:t>
+            </a:r>
           </a:p>
         </p:txBody>
       </p:sp>
@@ -9034,7 +9244,11 @@
           <a:bodyPr/>
           <a:lstStyle/>
           <a:p>
-            <a:endParaRPr lang="de-DE"/>
+            <a:r>
+              <a:rPr lang="de-DE" dirty="0" smtClean="0"/>
+              <a:t>In wenigen Folien endet die Theorie ! ! !</a:t>
+            </a:r>
+            <a:endParaRPr lang="de-DE" dirty="0"/>
           </a:p>
         </p:txBody>
       </p:sp>
@@ -9599,6 +9813,10 @@
           <a:bodyPr/>
           <a:lstStyle/>
           <a:p>
+            <a:r>
+              <a:rPr lang="de-DE" dirty="0" smtClean="0"/>
+              <a:t>Jetzt wird’s ernst</a:t>
+            </a:r>
             <a:endParaRPr lang="de-DE" dirty="0"/>
           </a:p>
         </p:txBody>
@@ -9653,19 +9871,21 @@
             </a:r>
             <a:r>
               <a:rPr lang="de-DE" b="0" dirty="0" smtClean="0"/>
-              <a:t>Dient der Zustandsanzeige, durch RGB-</a:t>
-            </a:r>
-            <a:r>
-              <a:rPr lang="de-DE" b="0" dirty="0" err="1" smtClean="0"/>
-              <a:t>LEDs</a:t>
-            </a:r>
-            <a:r>
-              <a:rPr lang="de-DE" dirty="0" err="1" smtClean="0"/>
-              <a:t>Das</a:t>
-            </a:r>
+              <a:t>Dient der Zustandsanzeige, durch </a:t>
+            </a:r>
+            <a:r>
+              <a:rPr lang="de-DE" b="0" dirty="0" smtClean="0"/>
+              <a:t>RGB-LEDs</a:t>
+            </a:r>
+          </a:p>
+          <a:p>
             <a:r>
               <a:rPr lang="de-DE" dirty="0" smtClean="0"/>
-              <a:t> Thermometer</a:t>
+              <a:t>Das </a:t>
+            </a:r>
+            <a:r>
+              <a:rPr lang="de-DE" dirty="0" smtClean="0"/>
+              <a:t>Thermometer</a:t>
             </a:r>
           </a:p>
           <a:p>

</xml_diff>